<commit_message>
update ppt presentation + slx yolo test
</commit_message>
<xml_diff>
--- a/Referentiel_Drone.pptx
+++ b/Referentiel_Drone.pptx
@@ -6,6 +6,7 @@
   </p:sldMasterIdLst>
   <p:sldIdLst>
     <p:sldId id="256" r:id="rId2"/>
+    <p:sldId id="257" r:id="rId3"/>
   </p:sldIdLst>
   <p:sldSz cx="12192000" cy="6858000"/>
   <p:notesSz cx="6858000" cy="9144000"/>
@@ -104,15 +105,400 @@
       </a:defRPr>
     </a:lvl9pPr>
   </p:defaultTextStyle>
+  <p:extLst>
+    <p:ext uri="{EFAFB233-063F-42B5-8137-9DF3F51BA10A}">
+      <p15:sldGuideLst xmlns:p15="http://schemas.microsoft.com/office/powerpoint/2012/main"/>
+    </p:ext>
+  </p:extLst>
 </p:presentation>
 </file>
 
 <file path=ppt/revisionInfo.xml><?xml version="1.0" encoding="utf-8"?>
 <p1510:revInfo xmlns:a="http://schemas.openxmlformats.org/drawingml/2006/main" xmlns:r="http://schemas.openxmlformats.org/officeDocument/2006/relationships" xmlns:p1510="http://schemas.microsoft.com/office/powerpoint/2015/10/main">
   <p1510:revLst>
-    <p1510:client id="{69936BA1-B803-1841-961F-D9E0EE5E15FE}" v="29" dt="2024-05-21T16:03:28.709"/>
+    <p1510:client id="{07E99882-B2BF-4008-9622-A79916673A23}" v="208" dt="2024-06-18T07:08:34.967"/>
   </p1510:revLst>
 </p1510:revInfo>
+</file>
+
+<file path=ppt/changesInfos/changesInfo1.xml><?xml version="1.0" encoding="utf-8"?>
+<pc:chgInfo xmlns:a="http://schemas.openxmlformats.org/drawingml/2006/main" xmlns:r="http://schemas.openxmlformats.org/officeDocument/2006/relationships" xmlns:ac="http://schemas.microsoft.com/office/drawing/2013/main/command" xmlns:pc="http://schemas.microsoft.com/office/powerpoint/2013/main/command">
+  <pc:docChgLst>
+    <pc:chgData name="Quentin LANDON" userId="ebdf6100-7026-48c0-a530-f25f8df816c1" providerId="ADAL" clId="{07E99882-B2BF-4008-9622-A79916673A23}"/>
+    <pc:docChg chg="undo custSel addSld modSld">
+      <pc:chgData name="Quentin LANDON" userId="ebdf6100-7026-48c0-a530-f25f8df816c1" providerId="ADAL" clId="{07E99882-B2BF-4008-9622-A79916673A23}" dt="2024-06-18T07:10:18.885" v="810" actId="1076"/>
+      <pc:docMkLst>
+        <pc:docMk/>
+      </pc:docMkLst>
+      <pc:sldChg chg="addSp delSp modSp mod">
+        <pc:chgData name="Quentin LANDON" userId="ebdf6100-7026-48c0-a530-f25f8df816c1" providerId="ADAL" clId="{07E99882-B2BF-4008-9622-A79916673A23}" dt="2024-06-17T14:23:37.317" v="164" actId="1076"/>
+        <pc:sldMkLst>
+          <pc:docMk/>
+          <pc:sldMk cId="1611700085" sldId="256"/>
+        </pc:sldMkLst>
+        <pc:spChg chg="add del">
+          <ac:chgData name="Quentin LANDON" userId="ebdf6100-7026-48c0-a530-f25f8df816c1" providerId="ADAL" clId="{07E99882-B2BF-4008-9622-A79916673A23}" dt="2024-06-17T13:20:46.228" v="1" actId="478"/>
+          <ac:spMkLst>
+            <pc:docMk/>
+            <pc:sldMk cId="1611700085" sldId="256"/>
+            <ac:spMk id="3" creationId="{1CCEE719-AF67-9A06-C069-0F40EB13447F}"/>
+          </ac:spMkLst>
+        </pc:spChg>
+        <pc:spChg chg="add mod">
+          <ac:chgData name="Quentin LANDON" userId="ebdf6100-7026-48c0-a530-f25f8df816c1" providerId="ADAL" clId="{07E99882-B2BF-4008-9622-A79916673A23}" dt="2024-06-17T14:23:37.317" v="164" actId="1076"/>
+          <ac:spMkLst>
+            <pc:docMk/>
+            <pc:sldMk cId="1611700085" sldId="256"/>
+            <ac:spMk id="4" creationId="{D457D0B1-5220-5E34-1DDD-B568E150562B}"/>
+          </ac:spMkLst>
+        </pc:spChg>
+        <pc:spChg chg="mod">
+          <ac:chgData name="Quentin LANDON" userId="ebdf6100-7026-48c0-a530-f25f8df816c1" providerId="ADAL" clId="{07E99882-B2BF-4008-9622-A79916673A23}" dt="2024-06-17T14:23:07.940" v="149" actId="1076"/>
+          <ac:spMkLst>
+            <pc:docMk/>
+            <pc:sldMk cId="1611700085" sldId="256"/>
+            <ac:spMk id="91" creationId="{AE964F85-C054-93A5-BE75-C8538F849BFC}"/>
+          </ac:spMkLst>
+        </pc:spChg>
+      </pc:sldChg>
+      <pc:sldChg chg="addSp delSp modSp add mod">
+        <pc:chgData name="Quentin LANDON" userId="ebdf6100-7026-48c0-a530-f25f8df816c1" providerId="ADAL" clId="{07E99882-B2BF-4008-9622-A79916673A23}" dt="2024-06-18T07:10:18.885" v="810" actId="1076"/>
+        <pc:sldMkLst>
+          <pc:docMk/>
+          <pc:sldMk cId="1428980678" sldId="257"/>
+        </pc:sldMkLst>
+        <pc:spChg chg="add mod">
+          <ac:chgData name="Quentin LANDON" userId="ebdf6100-7026-48c0-a530-f25f8df816c1" providerId="ADAL" clId="{07E99882-B2BF-4008-9622-A79916673A23}" dt="2024-06-17T14:35:44.627" v="500" actId="20577"/>
+          <ac:spMkLst>
+            <pc:docMk/>
+            <pc:sldMk cId="1428980678" sldId="257"/>
+            <ac:spMk id="2" creationId="{60FDB903-3FAE-90D1-0AA2-68A23F7A13E7}"/>
+          </ac:spMkLst>
+        </pc:spChg>
+        <pc:spChg chg="add mod">
+          <ac:chgData name="Quentin LANDON" userId="ebdf6100-7026-48c0-a530-f25f8df816c1" providerId="ADAL" clId="{07E99882-B2BF-4008-9622-A79916673A23}" dt="2024-06-18T06:49:25.035" v="727" actId="113"/>
+          <ac:spMkLst>
+            <pc:docMk/>
+            <pc:sldMk cId="1428980678" sldId="257"/>
+            <ac:spMk id="3" creationId="{80DCF76A-8FD6-9D33-3C43-C72B5B8364EC}"/>
+          </ac:spMkLst>
+        </pc:spChg>
+        <pc:spChg chg="mod">
+          <ac:chgData name="Quentin LANDON" userId="ebdf6100-7026-48c0-a530-f25f8df816c1" providerId="ADAL" clId="{07E99882-B2BF-4008-9622-A79916673A23}" dt="2024-06-17T14:28:52.195" v="355" actId="1076"/>
+          <ac:spMkLst>
+            <pc:docMk/>
+            <pc:sldMk cId="1428980678" sldId="257"/>
+            <ac:spMk id="4" creationId="{7F649F48-7067-2B06-F730-DFCAF59249E7}"/>
+          </ac:spMkLst>
+        </pc:spChg>
+        <pc:spChg chg="mod">
+          <ac:chgData name="Quentin LANDON" userId="ebdf6100-7026-48c0-a530-f25f8df816c1" providerId="ADAL" clId="{07E99882-B2BF-4008-9622-A79916673A23}" dt="2024-06-17T14:29:52.908" v="378" actId="207"/>
+          <ac:spMkLst>
+            <pc:docMk/>
+            <pc:sldMk cId="1428980678" sldId="257"/>
+            <ac:spMk id="5" creationId="{8C74829C-CB10-45F7-EC89-794B88204646}"/>
+          </ac:spMkLst>
+        </pc:spChg>
+        <pc:spChg chg="add mod">
+          <ac:chgData name="Quentin LANDON" userId="ebdf6100-7026-48c0-a530-f25f8df816c1" providerId="ADAL" clId="{07E99882-B2BF-4008-9622-A79916673A23}" dt="2024-06-18T07:08:34.967" v="809" actId="20577"/>
+          <ac:spMkLst>
+            <pc:docMk/>
+            <pc:sldMk cId="1428980678" sldId="257"/>
+            <ac:spMk id="6" creationId="{8AE2CB02-C9BD-B489-E5D2-A37F06FBB50E}"/>
+          </ac:spMkLst>
+        </pc:spChg>
+        <pc:spChg chg="del">
+          <ac:chgData name="Quentin LANDON" userId="ebdf6100-7026-48c0-a530-f25f8df816c1" providerId="ADAL" clId="{07E99882-B2BF-4008-9622-A79916673A23}" dt="2024-06-17T13:21:07.798" v="4" actId="478"/>
+          <ac:spMkLst>
+            <pc:docMk/>
+            <pc:sldMk cId="1428980678" sldId="257"/>
+            <ac:spMk id="6" creationId="{EB22A2D2-76EE-A37A-408A-B50FA4B5D757}"/>
+          </ac:spMkLst>
+        </pc:spChg>
+        <pc:spChg chg="add mod">
+          <ac:chgData name="Quentin LANDON" userId="ebdf6100-7026-48c0-a530-f25f8df816c1" providerId="ADAL" clId="{07E99882-B2BF-4008-9622-A79916673A23}" dt="2024-06-18T06:50:19.782" v="801" actId="1076"/>
+          <ac:spMkLst>
+            <pc:docMk/>
+            <pc:sldMk cId="1428980678" sldId="257"/>
+            <ac:spMk id="7" creationId="{AC02EE02-BB33-939E-8F02-B016CE8503F4}"/>
+          </ac:spMkLst>
+        </pc:spChg>
+        <pc:spChg chg="add mod">
+          <ac:chgData name="Quentin LANDON" userId="ebdf6100-7026-48c0-a530-f25f8df816c1" providerId="ADAL" clId="{07E99882-B2BF-4008-9622-A79916673A23}" dt="2024-06-18T06:49:09.909" v="725" actId="113"/>
+          <ac:spMkLst>
+            <pc:docMk/>
+            <pc:sldMk cId="1428980678" sldId="257"/>
+            <ac:spMk id="9" creationId="{487C2527-DCF8-21AE-D6C5-C03C0E9473D3}"/>
+          </ac:spMkLst>
+        </pc:spChg>
+        <pc:spChg chg="add mod">
+          <ac:chgData name="Quentin LANDON" userId="ebdf6100-7026-48c0-a530-f25f8df816c1" providerId="ADAL" clId="{07E99882-B2BF-4008-9622-A79916673A23}" dt="2024-06-18T07:01:00.788" v="803" actId="1035"/>
+          <ac:spMkLst>
+            <pc:docMk/>
+            <pc:sldMk cId="1428980678" sldId="257"/>
+            <ac:spMk id="10" creationId="{9278EE38-407B-73FD-752F-1F19E3AFC9E3}"/>
+          </ac:spMkLst>
+        </pc:spChg>
+        <pc:spChg chg="add mod">
+          <ac:chgData name="Quentin LANDON" userId="ebdf6100-7026-48c0-a530-f25f8df816c1" providerId="ADAL" clId="{07E99882-B2BF-4008-9622-A79916673A23}" dt="2024-06-18T06:50:19.782" v="801" actId="1076"/>
+          <ac:spMkLst>
+            <pc:docMk/>
+            <pc:sldMk cId="1428980678" sldId="257"/>
+            <ac:spMk id="11" creationId="{70D825BB-8081-DD88-88DB-AB45E09D7668}"/>
+          </ac:spMkLst>
+        </pc:spChg>
+        <pc:spChg chg="add mod">
+          <ac:chgData name="Quentin LANDON" userId="ebdf6100-7026-48c0-a530-f25f8df816c1" providerId="ADAL" clId="{07E99882-B2BF-4008-9622-A79916673A23}" dt="2024-06-18T06:50:19.782" v="801" actId="1076"/>
+          <ac:spMkLst>
+            <pc:docMk/>
+            <pc:sldMk cId="1428980678" sldId="257"/>
+            <ac:spMk id="12" creationId="{79727652-B570-89DB-86E7-2186F7C4F27F}"/>
+          </ac:spMkLst>
+        </pc:spChg>
+        <pc:spChg chg="add mod">
+          <ac:chgData name="Quentin LANDON" userId="ebdf6100-7026-48c0-a530-f25f8df816c1" providerId="ADAL" clId="{07E99882-B2BF-4008-9622-A79916673A23}" dt="2024-06-18T07:08:28.836" v="805" actId="1076"/>
+          <ac:spMkLst>
+            <pc:docMk/>
+            <pc:sldMk cId="1428980678" sldId="257"/>
+            <ac:spMk id="14" creationId="{C023C1A6-5973-D904-0C61-394A1587F015}"/>
+          </ac:spMkLst>
+        </pc:spChg>
+        <pc:spChg chg="add mod">
+          <ac:chgData name="Quentin LANDON" userId="ebdf6100-7026-48c0-a530-f25f8df816c1" providerId="ADAL" clId="{07E99882-B2BF-4008-9622-A79916673A23}" dt="2024-06-17T14:30:33.971" v="386" actId="13926"/>
+          <ac:spMkLst>
+            <pc:docMk/>
+            <pc:sldMk cId="1428980678" sldId="257"/>
+            <ac:spMk id="21" creationId="{B8DDC20C-3948-2114-045F-7C9BC9702457}"/>
+          </ac:spMkLst>
+        </pc:spChg>
+        <pc:spChg chg="add mod">
+          <ac:chgData name="Quentin LANDON" userId="ebdf6100-7026-48c0-a530-f25f8df816c1" providerId="ADAL" clId="{07E99882-B2BF-4008-9622-A79916673A23}" dt="2024-06-17T14:30:31.427" v="385" actId="13926"/>
+          <ac:spMkLst>
+            <pc:docMk/>
+            <pc:sldMk cId="1428980678" sldId="257"/>
+            <ac:spMk id="22" creationId="{C157BBBF-C28A-D317-E157-6A39B5DA7BB2}"/>
+          </ac:spMkLst>
+        </pc:spChg>
+        <pc:spChg chg="add mod">
+          <ac:chgData name="Quentin LANDON" userId="ebdf6100-7026-48c0-a530-f25f8df816c1" providerId="ADAL" clId="{07E99882-B2BF-4008-9622-A79916673A23}" dt="2024-06-17T14:28:52.195" v="355" actId="1076"/>
+          <ac:spMkLst>
+            <pc:docMk/>
+            <pc:sldMk cId="1428980678" sldId="257"/>
+            <ac:spMk id="23" creationId="{052B2D82-7987-010C-133F-BD9B9A4E0B06}"/>
+          </ac:spMkLst>
+        </pc:spChg>
+        <pc:spChg chg="add mod">
+          <ac:chgData name="Quentin LANDON" userId="ebdf6100-7026-48c0-a530-f25f8df816c1" providerId="ADAL" clId="{07E99882-B2BF-4008-9622-A79916673A23}" dt="2024-06-17T14:30:10.124" v="380" actId="207"/>
+          <ac:spMkLst>
+            <pc:docMk/>
+            <pc:sldMk cId="1428980678" sldId="257"/>
+            <ac:spMk id="24" creationId="{65B8FD1B-8B1C-46F8-17A5-87C00511F036}"/>
+          </ac:spMkLst>
+        </pc:spChg>
+        <pc:spChg chg="add mod">
+          <ac:chgData name="Quentin LANDON" userId="ebdf6100-7026-48c0-a530-f25f8df816c1" providerId="ADAL" clId="{07E99882-B2BF-4008-9622-A79916673A23}" dt="2024-06-17T14:30:37.875" v="387" actId="13926"/>
+          <ac:spMkLst>
+            <pc:docMk/>
+            <pc:sldMk cId="1428980678" sldId="257"/>
+            <ac:spMk id="25" creationId="{BD1E62DE-DA0D-7DBB-E152-D302A27E98B6}"/>
+          </ac:spMkLst>
+        </pc:spChg>
+        <pc:spChg chg="add mod">
+          <ac:chgData name="Quentin LANDON" userId="ebdf6100-7026-48c0-a530-f25f8df816c1" providerId="ADAL" clId="{07E99882-B2BF-4008-9622-A79916673A23}" dt="2024-06-17T14:30:39.917" v="388" actId="13926"/>
+          <ac:spMkLst>
+            <pc:docMk/>
+            <pc:sldMk cId="1428980678" sldId="257"/>
+            <ac:spMk id="26" creationId="{6573CF39-CF47-B53F-14F1-2487937FB826}"/>
+          </ac:spMkLst>
+        </pc:spChg>
+        <pc:spChg chg="add del mod">
+          <ac:chgData name="Quentin LANDON" userId="ebdf6100-7026-48c0-a530-f25f8df816c1" providerId="ADAL" clId="{07E99882-B2BF-4008-9622-A79916673A23}" dt="2024-06-17T14:25:03.141" v="200" actId="478"/>
+          <ac:spMkLst>
+            <pc:docMk/>
+            <pc:sldMk cId="1428980678" sldId="257"/>
+            <ac:spMk id="27" creationId="{565C3704-5B10-B5DA-E86E-327FC5CAAB58}"/>
+          </ac:spMkLst>
+        </pc:spChg>
+        <pc:spChg chg="add mod">
+          <ac:chgData name="Quentin LANDON" userId="ebdf6100-7026-48c0-a530-f25f8df816c1" providerId="ADAL" clId="{07E99882-B2BF-4008-9622-A79916673A23}" dt="2024-06-18T07:10:18.885" v="810" actId="1076"/>
+          <ac:spMkLst>
+            <pc:docMk/>
+            <pc:sldMk cId="1428980678" sldId="257"/>
+            <ac:spMk id="28" creationId="{4A31C3FA-1F53-7F9C-B608-95BC82D65CC6}"/>
+          </ac:spMkLst>
+        </pc:spChg>
+        <pc:spChg chg="add mod">
+          <ac:chgData name="Quentin LANDON" userId="ebdf6100-7026-48c0-a530-f25f8df816c1" providerId="ADAL" clId="{07E99882-B2BF-4008-9622-A79916673A23}" dt="2024-06-17T14:30:03.291" v="379" actId="13822"/>
+          <ac:spMkLst>
+            <pc:docMk/>
+            <pc:sldMk cId="1428980678" sldId="257"/>
+            <ac:spMk id="35" creationId="{9B90BEC4-9A92-2CEB-366A-C07C68926EE0}"/>
+          </ac:spMkLst>
+        </pc:spChg>
+        <pc:spChg chg="add mod">
+          <ac:chgData name="Quentin LANDON" userId="ebdf6100-7026-48c0-a530-f25f8df816c1" providerId="ADAL" clId="{07E99882-B2BF-4008-9622-A79916673A23}" dt="2024-06-17T14:28:52.195" v="355" actId="1076"/>
+          <ac:spMkLst>
+            <pc:docMk/>
+            <pc:sldMk cId="1428980678" sldId="257"/>
+            <ac:spMk id="39" creationId="{85847318-6F14-2F6A-EA1A-19493D864118}"/>
+          </ac:spMkLst>
+        </pc:spChg>
+        <pc:spChg chg="add del mod">
+          <ac:chgData name="Quentin LANDON" userId="ebdf6100-7026-48c0-a530-f25f8df816c1" providerId="ADAL" clId="{07E99882-B2BF-4008-9622-A79916673A23}" dt="2024-06-17T14:28:10.097" v="296"/>
+          <ac:spMkLst>
+            <pc:docMk/>
+            <pc:sldMk cId="1428980678" sldId="257"/>
+            <ac:spMk id="40" creationId="{58E8CDA0-2EAD-C370-156E-19AA93BA328F}"/>
+          </ac:spMkLst>
+        </pc:spChg>
+        <pc:spChg chg="add mod">
+          <ac:chgData name="Quentin LANDON" userId="ebdf6100-7026-48c0-a530-f25f8df816c1" providerId="ADAL" clId="{07E99882-B2BF-4008-9622-A79916673A23}" dt="2024-06-17T14:29:24.754" v="370" actId="13926"/>
+          <ac:spMkLst>
+            <pc:docMk/>
+            <pc:sldMk cId="1428980678" sldId="257"/>
+            <ac:spMk id="41" creationId="{4F894FEF-A480-F6D0-7043-909935286757}"/>
+          </ac:spMkLst>
+        </pc:spChg>
+        <pc:spChg chg="add mod">
+          <ac:chgData name="Quentin LANDON" userId="ebdf6100-7026-48c0-a530-f25f8df816c1" providerId="ADAL" clId="{07E99882-B2BF-4008-9622-A79916673A23}" dt="2024-06-17T14:29:47.572" v="377" actId="207"/>
+          <ac:spMkLst>
+            <pc:docMk/>
+            <pc:sldMk cId="1428980678" sldId="257"/>
+            <ac:spMk id="42" creationId="{A4CFC3C2-7BBD-A4EB-6CC3-ADB6031CF36C}"/>
+          </ac:spMkLst>
+        </pc:spChg>
+        <pc:spChg chg="add mod">
+          <ac:chgData name="Quentin LANDON" userId="ebdf6100-7026-48c0-a530-f25f8df816c1" providerId="ADAL" clId="{07E99882-B2BF-4008-9622-A79916673A23}" dt="2024-06-17T14:30:54.530" v="417" actId="1076"/>
+          <ac:spMkLst>
+            <pc:docMk/>
+            <pc:sldMk cId="1428980678" sldId="257"/>
+            <ac:spMk id="43" creationId="{4A93B967-3B53-0690-1857-A51F0A52822F}"/>
+          </ac:spMkLst>
+        </pc:spChg>
+        <pc:spChg chg="add mod">
+          <ac:chgData name="Quentin LANDON" userId="ebdf6100-7026-48c0-a530-f25f8df816c1" providerId="ADAL" clId="{07E99882-B2BF-4008-9622-A79916673A23}" dt="2024-06-18T06:42:51.735" v="608" actId="1076"/>
+          <ac:spMkLst>
+            <pc:docMk/>
+            <pc:sldMk cId="1428980678" sldId="257"/>
+            <ac:spMk id="44" creationId="{1F232B7B-F177-793D-4D93-7A4A37A20FC5}"/>
+          </ac:spMkLst>
+        </pc:spChg>
+        <pc:spChg chg="add mod">
+          <ac:chgData name="Quentin LANDON" userId="ebdf6100-7026-48c0-a530-f25f8df816c1" providerId="ADAL" clId="{07E99882-B2BF-4008-9622-A79916673A23}" dt="2024-06-18T06:43:14.516" v="611" actId="1076"/>
+          <ac:spMkLst>
+            <pc:docMk/>
+            <pc:sldMk cId="1428980678" sldId="257"/>
+            <ac:spMk id="45" creationId="{C804A102-7676-8754-C38C-D11FBE697320}"/>
+          </ac:spMkLst>
+        </pc:spChg>
+        <pc:spChg chg="add mod">
+          <ac:chgData name="Quentin LANDON" userId="ebdf6100-7026-48c0-a530-f25f8df816c1" providerId="ADAL" clId="{07E99882-B2BF-4008-9622-A79916673A23}" dt="2024-06-18T06:43:17.094" v="612" actId="1076"/>
+          <ac:spMkLst>
+            <pc:docMk/>
+            <pc:sldMk cId="1428980678" sldId="257"/>
+            <ac:spMk id="46" creationId="{950D597A-727E-C16B-0C9D-485F334A65D2}"/>
+          </ac:spMkLst>
+        </pc:spChg>
+        <pc:spChg chg="add mod">
+          <ac:chgData name="Quentin LANDON" userId="ebdf6100-7026-48c0-a530-f25f8df816c1" providerId="ADAL" clId="{07E99882-B2BF-4008-9622-A79916673A23}" dt="2024-06-18T06:43:24.779" v="626" actId="20577"/>
+          <ac:spMkLst>
+            <pc:docMk/>
+            <pc:sldMk cId="1428980678" sldId="257"/>
+            <ac:spMk id="47" creationId="{16B49964-5BAE-74FC-ABCA-C2D07050D051}"/>
+          </ac:spMkLst>
+        </pc:spChg>
+        <pc:cxnChg chg="add mod">
+          <ac:chgData name="Quentin LANDON" userId="ebdf6100-7026-48c0-a530-f25f8df816c1" providerId="ADAL" clId="{07E99882-B2BF-4008-9622-A79916673A23}" dt="2024-06-17T14:28:52.195" v="355" actId="1076"/>
+          <ac:cxnSpMkLst>
+            <pc:docMk/>
+            <pc:sldMk cId="1428980678" sldId="257"/>
+            <ac:cxnSpMk id="8" creationId="{53D59A6E-BA4A-7658-3F0B-E00C007927AC}"/>
+          </ac:cxnSpMkLst>
+        </pc:cxnChg>
+        <pc:cxnChg chg="add del mod">
+          <ac:chgData name="Quentin LANDON" userId="ebdf6100-7026-48c0-a530-f25f8df816c1" providerId="ADAL" clId="{07E99882-B2BF-4008-9622-A79916673A23}" dt="2024-06-17T13:22:59.892" v="92" actId="478"/>
+          <ac:cxnSpMkLst>
+            <pc:docMk/>
+            <pc:sldMk cId="1428980678" sldId="257"/>
+            <ac:cxnSpMk id="9" creationId="{04CDAA06-D32D-38EF-8B75-08F0FB972D6F}"/>
+          </ac:cxnSpMkLst>
+        </pc:cxnChg>
+        <pc:cxnChg chg="add mod">
+          <ac:chgData name="Quentin LANDON" userId="ebdf6100-7026-48c0-a530-f25f8df816c1" providerId="ADAL" clId="{07E99882-B2BF-4008-9622-A79916673A23}" dt="2024-06-17T14:28:52.195" v="355" actId="1076"/>
+          <ac:cxnSpMkLst>
+            <pc:docMk/>
+            <pc:sldMk cId="1428980678" sldId="257"/>
+            <ac:cxnSpMk id="13" creationId="{FC1540CD-1859-E4EE-612F-2C2230E3A1DF}"/>
+          </ac:cxnSpMkLst>
+        </pc:cxnChg>
+        <pc:cxnChg chg="add mod">
+          <ac:chgData name="Quentin LANDON" userId="ebdf6100-7026-48c0-a530-f25f8df816c1" providerId="ADAL" clId="{07E99882-B2BF-4008-9622-A79916673A23}" dt="2024-06-17T14:28:52.195" v="355" actId="1076"/>
+          <ac:cxnSpMkLst>
+            <pc:docMk/>
+            <pc:sldMk cId="1428980678" sldId="257"/>
+            <ac:cxnSpMk id="15" creationId="{EEB17CBA-E776-A9AF-0690-B01AF7A6B787}"/>
+          </ac:cxnSpMkLst>
+        </pc:cxnChg>
+        <pc:cxnChg chg="add mod">
+          <ac:chgData name="Quentin LANDON" userId="ebdf6100-7026-48c0-a530-f25f8df816c1" providerId="ADAL" clId="{07E99882-B2BF-4008-9622-A79916673A23}" dt="2024-06-17T14:28:52.195" v="355" actId="1076"/>
+          <ac:cxnSpMkLst>
+            <pc:docMk/>
+            <pc:sldMk cId="1428980678" sldId="257"/>
+            <ac:cxnSpMk id="16" creationId="{608582AE-AF30-1729-E712-9429BC229BAE}"/>
+          </ac:cxnSpMkLst>
+        </pc:cxnChg>
+        <pc:cxnChg chg="add mod">
+          <ac:chgData name="Quentin LANDON" userId="ebdf6100-7026-48c0-a530-f25f8df816c1" providerId="ADAL" clId="{07E99882-B2BF-4008-9622-A79916673A23}" dt="2024-06-17T14:28:52.195" v="355" actId="1076"/>
+          <ac:cxnSpMkLst>
+            <pc:docMk/>
+            <pc:sldMk cId="1428980678" sldId="257"/>
+            <ac:cxnSpMk id="17" creationId="{2647DC8B-ADA1-D767-60B6-F15115A87C2E}"/>
+          </ac:cxnSpMkLst>
+        </pc:cxnChg>
+        <pc:cxnChg chg="add mod">
+          <ac:chgData name="Quentin LANDON" userId="ebdf6100-7026-48c0-a530-f25f8df816c1" providerId="ADAL" clId="{07E99882-B2BF-4008-9622-A79916673A23}" dt="2024-06-17T14:28:52.195" v="355" actId="1076"/>
+          <ac:cxnSpMkLst>
+            <pc:docMk/>
+            <pc:sldMk cId="1428980678" sldId="257"/>
+            <ac:cxnSpMk id="20" creationId="{2B613D94-58AF-56BF-F925-6284DDAC1768}"/>
+          </ac:cxnSpMkLst>
+        </pc:cxnChg>
+        <pc:cxnChg chg="add mod">
+          <ac:chgData name="Quentin LANDON" userId="ebdf6100-7026-48c0-a530-f25f8df816c1" providerId="ADAL" clId="{07E99882-B2BF-4008-9622-A79916673A23}" dt="2024-06-17T14:30:03.291" v="379" actId="13822"/>
+          <ac:cxnSpMkLst>
+            <pc:docMk/>
+            <pc:sldMk cId="1428980678" sldId="257"/>
+            <ac:cxnSpMk id="30" creationId="{9C51AE01-15C7-53CF-09D8-D6F0BD621882}"/>
+          </ac:cxnSpMkLst>
+        </pc:cxnChg>
+        <pc:cxnChg chg="add del mod">
+          <ac:chgData name="Quentin LANDON" userId="ebdf6100-7026-48c0-a530-f25f8df816c1" providerId="ADAL" clId="{07E99882-B2BF-4008-9622-A79916673A23}" dt="2024-06-17T14:26:03.081" v="219" actId="478"/>
+          <ac:cxnSpMkLst>
+            <pc:docMk/>
+            <pc:sldMk cId="1428980678" sldId="257"/>
+            <ac:cxnSpMk id="33" creationId="{2A712583-576C-4EAD-4EE5-13981BC8BF84}"/>
+          </ac:cxnSpMkLst>
+        </pc:cxnChg>
+        <pc:cxnChg chg="add del mod">
+          <ac:chgData name="Quentin LANDON" userId="ebdf6100-7026-48c0-a530-f25f8df816c1" providerId="ADAL" clId="{07E99882-B2BF-4008-9622-A79916673A23}" dt="2024-06-17T14:26:31.527" v="225" actId="478"/>
+          <ac:cxnSpMkLst>
+            <pc:docMk/>
+            <pc:sldMk cId="1428980678" sldId="257"/>
+            <ac:cxnSpMk id="36" creationId="{2C0F33F7-2A90-F0FF-D14F-2E59D07CDAAB}"/>
+          </ac:cxnSpMkLst>
+        </pc:cxnChg>
+        <pc:cxnChg chg="add mod">
+          <ac:chgData name="Quentin LANDON" userId="ebdf6100-7026-48c0-a530-f25f8df816c1" providerId="ADAL" clId="{07E99882-B2BF-4008-9622-A79916673A23}" dt="2024-06-17T14:30:03.291" v="379" actId="13822"/>
+          <ac:cxnSpMkLst>
+            <pc:docMk/>
+            <pc:sldMk cId="1428980678" sldId="257"/>
+            <ac:cxnSpMk id="38" creationId="{EFA7B8B4-F77A-7D6F-00CA-921C1C22056F}"/>
+          </ac:cxnSpMkLst>
+        </pc:cxnChg>
+      </pc:sldChg>
+    </pc:docChg>
+  </pc:docChgLst>
+</pc:chgInfo>
 </file>
 
 <file path=ppt/slideLayouts/slideLayout1.xml><?xml version="1.0" encoding="utf-8"?>
@@ -262,7 +648,7 @@
           <a:p>
             <a:fld id="{0397A277-8FA9-694E-B483-394C5BB43F1B}" type="datetimeFigureOut">
               <a:rPr lang="fr-FR" smtClean="0"/>
-              <a:t>21/05/2024</a:t>
+              <a:t>18/06/2024</a:t>
             </a:fld>
             <a:endParaRPr lang="fr-FR"/>
           </a:p>
@@ -460,7 +846,7 @@
           <a:p>
             <a:fld id="{0397A277-8FA9-694E-B483-394C5BB43F1B}" type="datetimeFigureOut">
               <a:rPr lang="fr-FR" smtClean="0"/>
-              <a:t>21/05/2024</a:t>
+              <a:t>18/06/2024</a:t>
             </a:fld>
             <a:endParaRPr lang="fr-FR"/>
           </a:p>
@@ -668,7 +1054,7 @@
           <a:p>
             <a:fld id="{0397A277-8FA9-694E-B483-394C5BB43F1B}" type="datetimeFigureOut">
               <a:rPr lang="fr-FR" smtClean="0"/>
-              <a:t>21/05/2024</a:t>
+              <a:t>18/06/2024</a:t>
             </a:fld>
             <a:endParaRPr lang="fr-FR"/>
           </a:p>
@@ -866,7 +1252,7 @@
           <a:p>
             <a:fld id="{0397A277-8FA9-694E-B483-394C5BB43F1B}" type="datetimeFigureOut">
               <a:rPr lang="fr-FR" smtClean="0"/>
-              <a:t>21/05/2024</a:t>
+              <a:t>18/06/2024</a:t>
             </a:fld>
             <a:endParaRPr lang="fr-FR"/>
           </a:p>
@@ -1141,7 +1527,7 @@
           <a:p>
             <a:fld id="{0397A277-8FA9-694E-B483-394C5BB43F1B}" type="datetimeFigureOut">
               <a:rPr lang="fr-FR" smtClean="0"/>
-              <a:t>21/05/2024</a:t>
+              <a:t>18/06/2024</a:t>
             </a:fld>
             <a:endParaRPr lang="fr-FR"/>
           </a:p>
@@ -1406,7 +1792,7 @@
           <a:p>
             <a:fld id="{0397A277-8FA9-694E-B483-394C5BB43F1B}" type="datetimeFigureOut">
               <a:rPr lang="fr-FR" smtClean="0"/>
-              <a:t>21/05/2024</a:t>
+              <a:t>18/06/2024</a:t>
             </a:fld>
             <a:endParaRPr lang="fr-FR"/>
           </a:p>
@@ -1818,7 +2204,7 @@
           <a:p>
             <a:fld id="{0397A277-8FA9-694E-B483-394C5BB43F1B}" type="datetimeFigureOut">
               <a:rPr lang="fr-FR" smtClean="0"/>
-              <a:t>21/05/2024</a:t>
+              <a:t>18/06/2024</a:t>
             </a:fld>
             <a:endParaRPr lang="fr-FR"/>
           </a:p>
@@ -1959,7 +2345,7 @@
           <a:p>
             <a:fld id="{0397A277-8FA9-694E-B483-394C5BB43F1B}" type="datetimeFigureOut">
               <a:rPr lang="fr-FR" smtClean="0"/>
-              <a:t>21/05/2024</a:t>
+              <a:t>18/06/2024</a:t>
             </a:fld>
             <a:endParaRPr lang="fr-FR"/>
           </a:p>
@@ -2072,7 +2458,7 @@
           <a:p>
             <a:fld id="{0397A277-8FA9-694E-B483-394C5BB43F1B}" type="datetimeFigureOut">
               <a:rPr lang="fr-FR" smtClean="0"/>
-              <a:t>21/05/2024</a:t>
+              <a:t>18/06/2024</a:t>
             </a:fld>
             <a:endParaRPr lang="fr-FR"/>
           </a:p>
@@ -2383,7 +2769,7 @@
           <a:p>
             <a:fld id="{0397A277-8FA9-694E-B483-394C5BB43F1B}" type="datetimeFigureOut">
               <a:rPr lang="fr-FR" smtClean="0"/>
-              <a:t>21/05/2024</a:t>
+              <a:t>18/06/2024</a:t>
             </a:fld>
             <a:endParaRPr lang="fr-FR"/>
           </a:p>
@@ -2671,7 +3057,7 @@
           <a:p>
             <a:fld id="{0397A277-8FA9-694E-B483-394C5BB43F1B}" type="datetimeFigureOut">
               <a:rPr lang="fr-FR" smtClean="0"/>
-              <a:t>21/05/2024</a:t>
+              <a:t>18/06/2024</a:t>
             </a:fld>
             <a:endParaRPr lang="fr-FR"/>
           </a:p>
@@ -2912,7 +3298,7 @@
           <a:p>
             <a:fld id="{0397A277-8FA9-694E-B483-394C5BB43F1B}" type="datetimeFigureOut">
               <a:rPr lang="fr-FR" smtClean="0"/>
-              <a:t>21/05/2024</a:t>
+              <a:t>18/06/2024</a:t>
             </a:fld>
             <a:endParaRPr lang="fr-FR"/>
           </a:p>
@@ -5017,7 +5403,7 @@
         </p:nvSpPr>
         <p:spPr>
           <a:xfrm>
-            <a:off x="4605336" y="186780"/>
+            <a:off x="4264122" y="123293"/>
             <a:ext cx="1823256" cy="369332"/>
           </a:xfrm>
           <a:prstGeom prst="rect">
@@ -5039,10 +5425,2703 @@
           </a:p>
         </p:txBody>
       </p:sp>
+      <p:sp>
+        <p:nvSpPr>
+          <p:cNvPr id="4" name="ZoneTexte 3">
+            <a:extLst>
+              <a:ext uri="{FF2B5EF4-FFF2-40B4-BE49-F238E27FC236}">
+                <a16:creationId xmlns:a16="http://schemas.microsoft.com/office/drawing/2014/main" id="{D457D0B1-5220-5E34-1DDD-B568E150562B}"/>
+              </a:ext>
+            </a:extLst>
+          </p:cNvPr>
+          <p:cNvSpPr txBox="1"/>
+          <p:nvPr/>
+        </p:nvSpPr>
+        <p:spPr>
+          <a:xfrm>
+            <a:off x="6263185" y="5789334"/>
+            <a:ext cx="2244397" cy="369332"/>
+          </a:xfrm>
+          <a:prstGeom prst="rect">
+            <a:avLst/>
+          </a:prstGeom>
+          <a:noFill/>
+        </p:spPr>
+        <p:txBody>
+          <a:bodyPr wrap="none" rtlCol="0">
+            <a:spAutoFit/>
+          </a:bodyPr>
+          <a:lstStyle/>
+          <a:p>
+            <a:r>
+              <a:rPr lang="fr-FR" u="sng" dirty="0"/>
+              <a:t>Référentiel </a:t>
+            </a:r>
+            <a:r>
+              <a:rPr lang="fr-FR" u="sng" dirty="0" err="1"/>
+              <a:t>Optitrack</a:t>
+            </a:r>
+            <a:endParaRPr lang="fr-FR" u="sng" dirty="0"/>
+          </a:p>
+        </p:txBody>
+      </p:sp>
     </p:spTree>
     <p:extLst>
       <p:ext uri="{BB962C8B-B14F-4D97-AF65-F5344CB8AC3E}">
         <p14:creationId xmlns:p14="http://schemas.microsoft.com/office/powerpoint/2010/main" val="1611700085"/>
+      </p:ext>
+    </p:extLst>
+  </p:cSld>
+  <p:clrMapOvr>
+    <a:masterClrMapping/>
+  </p:clrMapOvr>
+</p:sld>
+</file>
+
+<file path=ppt/slides/slide2.xml><?xml version="1.0" encoding="utf-8"?>
+<p:sld xmlns:a="http://schemas.openxmlformats.org/drawingml/2006/main" xmlns:r="http://schemas.openxmlformats.org/officeDocument/2006/relationships" xmlns:p="http://schemas.openxmlformats.org/presentationml/2006/main">
+  <p:cSld>
+    <p:spTree>
+      <p:nvGrpSpPr>
+        <p:cNvPr id="1" name=""/>
+        <p:cNvGrpSpPr/>
+        <p:nvPr/>
+      </p:nvGrpSpPr>
+      <p:grpSpPr>
+        <a:xfrm>
+          <a:off x="0" y="0"/>
+          <a:ext cx="0" cy="0"/>
+          <a:chOff x="0" y="0"/>
+          <a:chExt cx="0" cy="0"/>
+        </a:xfrm>
+      </p:grpSpPr>
+      <p:sp>
+        <p:nvSpPr>
+          <p:cNvPr id="4" name="Rectangle 3">
+            <a:extLst>
+              <a:ext uri="{FF2B5EF4-FFF2-40B4-BE49-F238E27FC236}">
+                <a16:creationId xmlns:a16="http://schemas.microsoft.com/office/drawing/2014/main" id="{7F649F48-7067-2B06-F730-DFCAF59249E7}"/>
+              </a:ext>
+            </a:extLst>
+          </p:cNvPr>
+          <p:cNvSpPr/>
+          <p:nvPr/>
+        </p:nvSpPr>
+        <p:spPr>
+          <a:xfrm>
+            <a:off x="1283398" y="1143000"/>
+            <a:ext cx="8080490" cy="4572000"/>
+          </a:xfrm>
+          <a:prstGeom prst="rect">
+            <a:avLst/>
+          </a:prstGeom>
+          <a:noFill/>
+        </p:spPr>
+        <p:style>
+          <a:lnRef idx="2">
+            <a:schemeClr val="accent1">
+              <a:shade val="15000"/>
+            </a:schemeClr>
+          </a:lnRef>
+          <a:fillRef idx="1">
+            <a:schemeClr val="accent1"/>
+          </a:fillRef>
+          <a:effectRef idx="0">
+            <a:schemeClr val="accent1"/>
+          </a:effectRef>
+          <a:fontRef idx="minor">
+            <a:schemeClr val="lt1"/>
+          </a:fontRef>
+        </p:style>
+        <p:txBody>
+          <a:bodyPr rtlCol="0" anchor="ctr"/>
+          <a:lstStyle/>
+          <a:p>
+            <a:pPr algn="ctr"/>
+            <a:endParaRPr lang="fr-FR"/>
+          </a:p>
+        </p:txBody>
+      </p:sp>
+      <p:sp>
+        <p:nvSpPr>
+          <p:cNvPr id="5" name="ZoneTexte 4">
+            <a:extLst>
+              <a:ext uri="{FF2B5EF4-FFF2-40B4-BE49-F238E27FC236}">
+                <a16:creationId xmlns:a16="http://schemas.microsoft.com/office/drawing/2014/main" id="{8C74829C-CB10-45F7-EC89-794B88204646}"/>
+              </a:ext>
+            </a:extLst>
+          </p:cNvPr>
+          <p:cNvSpPr txBox="1"/>
+          <p:nvPr/>
+        </p:nvSpPr>
+        <p:spPr>
+          <a:xfrm>
+            <a:off x="5178472" y="3253212"/>
+            <a:ext cx="308098" cy="369332"/>
+          </a:xfrm>
+          <a:prstGeom prst="rect">
+            <a:avLst/>
+          </a:prstGeom>
+          <a:noFill/>
+        </p:spPr>
+        <p:txBody>
+          <a:bodyPr wrap="none" rtlCol="0">
+            <a:spAutoFit/>
+          </a:bodyPr>
+          <a:lstStyle/>
+          <a:p>
+            <a:r>
+              <a:rPr lang="fr-FR" dirty="0">
+                <a:solidFill>
+                  <a:srgbClr val="FF0000"/>
+                </a:solidFill>
+              </a:rPr>
+              <a:t>+</a:t>
+            </a:r>
+          </a:p>
+        </p:txBody>
+      </p:sp>
+      <p:sp>
+        <p:nvSpPr>
+          <p:cNvPr id="2" name="ZoneTexte 1">
+            <a:extLst>
+              <a:ext uri="{FF2B5EF4-FFF2-40B4-BE49-F238E27FC236}">
+                <a16:creationId xmlns:a16="http://schemas.microsoft.com/office/drawing/2014/main" id="{60FDB903-3FAE-90D1-0AA2-68A23F7A13E7}"/>
+              </a:ext>
+            </a:extLst>
+          </p:cNvPr>
+          <p:cNvSpPr txBox="1"/>
+          <p:nvPr/>
+        </p:nvSpPr>
+        <p:spPr>
+          <a:xfrm>
+            <a:off x="5208776" y="3429000"/>
+            <a:ext cx="893514" cy="276999"/>
+          </a:xfrm>
+          <a:prstGeom prst="rect">
+            <a:avLst/>
+          </a:prstGeom>
+          <a:noFill/>
+        </p:spPr>
+        <p:txBody>
+          <a:bodyPr wrap="none" rtlCol="0">
+            <a:spAutoFit/>
+          </a:bodyPr>
+          <a:lstStyle/>
+          <a:p>
+            <a:r>
+              <a:rPr lang="fr-FR" sz="1200" dirty="0"/>
+              <a:t>(</a:t>
+            </a:r>
+            <a:r>
+              <a:rPr lang="fr-FR" sz="1200" dirty="0" err="1"/>
+              <a:t>Xci,Yci</a:t>
+            </a:r>
+            <a:r>
+              <a:rPr lang="fr-FR" sz="1200" dirty="0"/>
+              <a:t>)</a:t>
+            </a:r>
+            <a:r>
+              <a:rPr lang="fr-FR" sz="1000" dirty="0" err="1"/>
+              <a:t>img</a:t>
+            </a:r>
+            <a:endParaRPr lang="fr-FR" sz="1200" dirty="0"/>
+          </a:p>
+        </p:txBody>
+      </p:sp>
+      <mc:AlternateContent xmlns:mc="http://schemas.openxmlformats.org/markup-compatibility/2006">
+        <mc:Choice xmlns:a14="http://schemas.microsoft.com/office/drawing/2010/main" Requires="a14">
+          <p:sp>
+            <p:nvSpPr>
+              <p:cNvPr id="3" name="ZoneTexte 2">
+                <a:extLst>
+                  <a:ext uri="{FF2B5EF4-FFF2-40B4-BE49-F238E27FC236}">
+                    <a16:creationId xmlns:a16="http://schemas.microsoft.com/office/drawing/2014/main" id="{80DCF76A-8FD6-9D33-3C43-C72B5B8364EC}"/>
+                  </a:ext>
+                </a:extLst>
+              </p:cNvPr>
+              <p:cNvSpPr txBox="1"/>
+              <p:nvPr/>
+            </p:nvSpPr>
+            <p:spPr>
+              <a:xfrm>
+                <a:off x="9552147" y="1078532"/>
+                <a:ext cx="2234138" cy="2062744"/>
+              </a:xfrm>
+              <a:prstGeom prst="rect">
+                <a:avLst/>
+              </a:prstGeom>
+              <a:noFill/>
+            </p:spPr>
+            <p:txBody>
+              <a:bodyPr wrap="none" rtlCol="0">
+                <a:spAutoFit/>
+              </a:bodyPr>
+              <a:lstStyle/>
+              <a:p>
+                <a:r>
+                  <a:rPr lang="fr-FR" sz="1200" b="1" u="sng" dirty="0"/>
+                  <a:t>Centre</a:t>
+                </a:r>
+                <a:r>
+                  <a:rPr lang="fr-FR" sz="1200" u="sng" dirty="0"/>
+                  <a:t> de l’image :</a:t>
+                </a:r>
+              </a:p>
+              <a:p>
+                <a:r>
+                  <a:rPr lang="fr-FR" sz="1200" dirty="0" err="1"/>
+                  <a:t>Xci</a:t>
+                </a:r>
+                <a:r>
+                  <a:rPr lang="fr-FR" sz="1200" dirty="0"/>
+                  <a:t> = </a:t>
+                </a:r>
+                <a14:m>
+                  <m:oMath xmlns:m="http://schemas.openxmlformats.org/officeDocument/2006/math">
+                    <m:f>
+                      <m:fPr>
+                        <m:ctrlPr>
+                          <a:rPr lang="fr-FR" sz="1200" i="1" smtClean="0">
+                            <a:latin typeface="Cambria Math" panose="02040503050406030204" pitchFamily="18" charset="0"/>
+                          </a:rPr>
+                        </m:ctrlPr>
+                      </m:fPr>
+                      <m:num>
+                        <m:r>
+                          <a:rPr lang="fr-FR" sz="1200" b="0" i="1" smtClean="0">
+                            <a:latin typeface="Cambria Math" panose="02040503050406030204" pitchFamily="18" charset="0"/>
+                          </a:rPr>
+                          <m:t>𝑊</m:t>
+                        </m:r>
+                      </m:num>
+                      <m:den>
+                        <m:r>
+                          <a:rPr lang="fr-FR" sz="1200" b="0" i="1" smtClean="0">
+                            <a:latin typeface="Cambria Math" panose="02040503050406030204" pitchFamily="18" charset="0"/>
+                          </a:rPr>
+                          <m:t>2</m:t>
+                        </m:r>
+                      </m:den>
+                    </m:f>
+                  </m:oMath>
+                </a14:m>
+                <a:r>
+                  <a:rPr lang="fr-FR" sz="1200" dirty="0"/>
+                  <a:t> </a:t>
+                </a:r>
+              </a:p>
+              <a:p>
+                <a:r>
+                  <a:rPr lang="fr-FR" sz="1200" dirty="0" err="1"/>
+                  <a:t>Yci</a:t>
+                </a:r>
+                <a:r>
+                  <a:rPr lang="fr-FR" sz="1200" dirty="0"/>
+                  <a:t> = </a:t>
+                </a:r>
+                <a14:m>
+                  <m:oMath xmlns:m="http://schemas.openxmlformats.org/officeDocument/2006/math">
+                    <m:f>
+                      <m:fPr>
+                        <m:ctrlPr>
+                          <a:rPr lang="fr-FR" sz="1200" i="1" smtClean="0">
+                            <a:latin typeface="Cambria Math" panose="02040503050406030204" pitchFamily="18" charset="0"/>
+                          </a:rPr>
+                        </m:ctrlPr>
+                      </m:fPr>
+                      <m:num>
+                        <m:r>
+                          <a:rPr lang="fr-FR" sz="1200" b="0" i="1" smtClean="0">
+                            <a:latin typeface="Cambria Math" panose="02040503050406030204" pitchFamily="18" charset="0"/>
+                          </a:rPr>
+                          <m:t>𝐻</m:t>
+                        </m:r>
+                      </m:num>
+                      <m:den>
+                        <m:r>
+                          <a:rPr lang="fr-FR" sz="1200" b="0" i="1" smtClean="0">
+                            <a:latin typeface="Cambria Math" panose="02040503050406030204" pitchFamily="18" charset="0"/>
+                          </a:rPr>
+                          <m:t>𝑑</m:t>
+                        </m:r>
+                      </m:den>
+                    </m:f>
+                  </m:oMath>
+                </a14:m>
+                <a:endParaRPr lang="fr-FR" sz="1200" dirty="0"/>
+              </a:p>
+              <a:p>
+                <a:r>
+                  <a:rPr lang="fr-FR" sz="1200" dirty="0"/>
+                  <a:t> </a:t>
+                </a:r>
+              </a:p>
+              <a:p>
+                <a:r>
+                  <a:rPr lang="fr-FR" sz="1200" u="sng" dirty="0"/>
+                  <a:t>Centre de </a:t>
+                </a:r>
+                <a:r>
+                  <a:rPr lang="fr-FR" sz="1200" b="1" u="sng" dirty="0"/>
+                  <a:t>l’objet</a:t>
+                </a:r>
+                <a:r>
+                  <a:rPr lang="fr-FR" sz="1200" u="sng" dirty="0"/>
+                  <a:t> dans l’image:</a:t>
+                </a:r>
+              </a:p>
+              <a:p>
+                <a:r>
+                  <a:rPr lang="fr-FR" sz="1200" dirty="0" err="1"/>
+                  <a:t>Xco</a:t>
+                </a:r>
+                <a:r>
+                  <a:rPr lang="fr-FR" sz="1200" dirty="0"/>
+                  <a:t> = </a:t>
+                </a:r>
+                <a14:m>
+                  <m:oMath xmlns:m="http://schemas.openxmlformats.org/officeDocument/2006/math">
+                    <m:f>
+                      <m:fPr>
+                        <m:ctrlPr>
+                          <a:rPr lang="fr-FR" sz="1200" i="1" smtClean="0">
+                            <a:latin typeface="Cambria Math" panose="02040503050406030204" pitchFamily="18" charset="0"/>
+                          </a:rPr>
+                        </m:ctrlPr>
+                      </m:fPr>
+                      <m:num>
+                        <m:r>
+                          <a:rPr lang="fr-FR" sz="1200" b="0" i="1" smtClean="0">
+                            <a:latin typeface="Cambria Math" panose="02040503050406030204" pitchFamily="18" charset="0"/>
+                          </a:rPr>
+                          <m:t>𝑊</m:t>
+                        </m:r>
+                      </m:num>
+                      <m:den>
+                        <m:r>
+                          <a:rPr lang="fr-FR" sz="1200" b="0" i="1" smtClean="0">
+                            <a:latin typeface="Cambria Math" panose="02040503050406030204" pitchFamily="18" charset="0"/>
+                          </a:rPr>
+                          <m:t>2</m:t>
+                        </m:r>
+                      </m:den>
+                    </m:f>
+                  </m:oMath>
+                </a14:m>
+                <a:r>
+                  <a:rPr lang="fr-FR" sz="1200" dirty="0"/>
+                  <a:t> + X</a:t>
+                </a:r>
+              </a:p>
+              <a:p>
+                <a:r>
+                  <a:rPr lang="fr-FR" sz="1200" dirty="0" err="1"/>
+                  <a:t>Yco</a:t>
+                </a:r>
+                <a:r>
+                  <a:rPr lang="fr-FR" sz="1200" dirty="0"/>
+                  <a:t> = </a:t>
+                </a:r>
+                <a14:m>
+                  <m:oMath xmlns:m="http://schemas.openxmlformats.org/officeDocument/2006/math">
+                    <m:f>
+                      <m:fPr>
+                        <m:ctrlPr>
+                          <a:rPr lang="fr-FR" sz="1200" i="1" smtClean="0">
+                            <a:latin typeface="Cambria Math" panose="02040503050406030204" pitchFamily="18" charset="0"/>
+                          </a:rPr>
+                        </m:ctrlPr>
+                      </m:fPr>
+                      <m:num>
+                        <m:r>
+                          <a:rPr lang="fr-FR" sz="1200" b="0" i="1" smtClean="0">
+                            <a:latin typeface="Cambria Math" panose="02040503050406030204" pitchFamily="18" charset="0"/>
+                          </a:rPr>
+                          <m:t>𝐻</m:t>
+                        </m:r>
+                      </m:num>
+                      <m:den>
+                        <m:r>
+                          <a:rPr lang="fr-FR" sz="1200" b="0" i="1" smtClean="0">
+                            <a:latin typeface="Cambria Math" panose="02040503050406030204" pitchFamily="18" charset="0"/>
+                          </a:rPr>
+                          <m:t>𝑑</m:t>
+                        </m:r>
+                      </m:den>
+                    </m:f>
+                    <m:r>
+                      <a:rPr lang="fr-FR" sz="1200" b="0" i="0" smtClean="0">
+                        <a:latin typeface="Cambria Math" panose="02040503050406030204" pitchFamily="18" charset="0"/>
+                      </a:rPr>
+                      <m:t>+</m:t>
+                    </m:r>
+                    <m:r>
+                      <m:rPr>
+                        <m:sty m:val="p"/>
+                      </m:rPr>
+                      <a:rPr lang="fr-FR" sz="1200" b="0" i="0" smtClean="0">
+                        <a:latin typeface="Cambria Math" panose="02040503050406030204" pitchFamily="18" charset="0"/>
+                      </a:rPr>
+                      <m:t>Y</m:t>
+                    </m:r>
+                  </m:oMath>
+                </a14:m>
+                <a:endParaRPr lang="fr-FR" sz="1200" u="sng" dirty="0"/>
+              </a:p>
+              <a:p>
+                <a:endParaRPr lang="fr-FR" sz="1200" u="sng" dirty="0"/>
+              </a:p>
+              <a:p>
+                <a:r>
+                  <a:rPr lang="fr-FR" sz="1200" b="1" u="sng" dirty="0"/>
+                  <a:t>Angle</a:t>
+                </a:r>
+                <a:r>
+                  <a:rPr lang="fr-FR" sz="1200" u="sng" dirty="0"/>
+                  <a:t> </a:t>
+                </a:r>
+                <a:r>
+                  <a:rPr lang="fr-FR" sz="1200" b="1" u="sng" dirty="0"/>
+                  <a:t>objet/centre </a:t>
+                </a:r>
+                <a:r>
+                  <a:rPr lang="fr-FR" sz="1200" u="sng" dirty="0"/>
+                  <a:t>image :</a:t>
+                </a:r>
+              </a:p>
+            </p:txBody>
+          </p:sp>
+        </mc:Choice>
+        <mc:Fallback>
+          <p:sp>
+            <p:nvSpPr>
+              <p:cNvPr id="3" name="ZoneTexte 2">
+                <a:extLst>
+                  <a:ext uri="{FF2B5EF4-FFF2-40B4-BE49-F238E27FC236}">
+                    <a16:creationId xmlns:a16="http://schemas.microsoft.com/office/drawing/2014/main" id="{80DCF76A-8FD6-9D33-3C43-C72B5B8364EC}"/>
+                  </a:ext>
+                </a:extLst>
+              </p:cNvPr>
+              <p:cNvSpPr txBox="1">
+                <a:spLocks noRot="1" noChangeAspect="1" noMove="1" noResize="1" noEditPoints="1" noAdjustHandles="1" noChangeArrowheads="1" noChangeShapeType="1" noTextEdit="1"/>
+              </p:cNvSpPr>
+              <p:nvPr/>
+            </p:nvSpPr>
+            <p:spPr>
+              <a:xfrm>
+                <a:off x="9552147" y="1078532"/>
+                <a:ext cx="2234138" cy="2062744"/>
+              </a:xfrm>
+              <a:prstGeom prst="rect">
+                <a:avLst/>
+              </a:prstGeom>
+              <a:blipFill>
+                <a:blip r:embed="rId2"/>
+                <a:stretch>
+                  <a:fillRect l="-273" t="-296" b="-1479"/>
+                </a:stretch>
+              </a:blipFill>
+            </p:spPr>
+            <p:txBody>
+              <a:bodyPr/>
+              <a:lstStyle/>
+              <a:p>
+                <a:r>
+                  <a:rPr lang="fr-FR">
+                    <a:noFill/>
+                  </a:rPr>
+                  <a:t> </a:t>
+                </a:r>
+              </a:p>
+            </p:txBody>
+          </p:sp>
+        </mc:Fallback>
+      </mc:AlternateContent>
+      <p:cxnSp>
+        <p:nvCxnSpPr>
+          <p:cNvPr id="8" name="Connecteur droit avec flèche 7">
+            <a:extLst>
+              <a:ext uri="{FF2B5EF4-FFF2-40B4-BE49-F238E27FC236}">
+                <a16:creationId xmlns:a16="http://schemas.microsoft.com/office/drawing/2014/main" id="{53D59A6E-BA4A-7658-3F0B-E00C007927AC}"/>
+              </a:ext>
+            </a:extLst>
+          </p:cNvPr>
+          <p:cNvCxnSpPr/>
+          <p:nvPr/>
+        </p:nvCxnSpPr>
+        <p:spPr>
+          <a:xfrm>
+            <a:off x="976544" y="1143000"/>
+            <a:ext cx="0" cy="4572000"/>
+          </a:xfrm>
+          <a:prstGeom prst="straightConnector1">
+            <a:avLst/>
+          </a:prstGeom>
+          <a:ln>
+            <a:headEnd type="triangle"/>
+            <a:tailEnd type="triangle"/>
+          </a:ln>
+        </p:spPr>
+        <p:style>
+          <a:lnRef idx="2">
+            <a:schemeClr val="accent1"/>
+          </a:lnRef>
+          <a:fillRef idx="0">
+            <a:schemeClr val="accent1"/>
+          </a:fillRef>
+          <a:effectRef idx="1">
+            <a:schemeClr val="accent1"/>
+          </a:effectRef>
+          <a:fontRef idx="minor">
+            <a:schemeClr val="tx1"/>
+          </a:fontRef>
+        </p:style>
+      </p:cxnSp>
+      <p:cxnSp>
+        <p:nvCxnSpPr>
+          <p:cNvPr id="13" name="Connecteur droit avec flèche 12">
+            <a:extLst>
+              <a:ext uri="{FF2B5EF4-FFF2-40B4-BE49-F238E27FC236}">
+                <a16:creationId xmlns:a16="http://schemas.microsoft.com/office/drawing/2014/main" id="{FC1540CD-1859-E4EE-612F-2C2230E3A1DF}"/>
+              </a:ext>
+            </a:extLst>
+          </p:cNvPr>
+          <p:cNvCxnSpPr/>
+          <p:nvPr/>
+        </p:nvCxnSpPr>
+        <p:spPr>
+          <a:xfrm>
+            <a:off x="1283398" y="6072326"/>
+            <a:ext cx="8080490" cy="0"/>
+          </a:xfrm>
+          <a:prstGeom prst="straightConnector1">
+            <a:avLst/>
+          </a:prstGeom>
+          <a:ln>
+            <a:headEnd type="triangle"/>
+            <a:tailEnd type="triangle"/>
+          </a:ln>
+        </p:spPr>
+        <p:style>
+          <a:lnRef idx="2">
+            <a:schemeClr val="accent1"/>
+          </a:lnRef>
+          <a:fillRef idx="0">
+            <a:schemeClr val="accent1"/>
+          </a:fillRef>
+          <a:effectRef idx="1">
+            <a:schemeClr val="accent1"/>
+          </a:effectRef>
+          <a:fontRef idx="minor">
+            <a:schemeClr val="tx1"/>
+          </a:fontRef>
+        </p:style>
+      </p:cxnSp>
+      <p:cxnSp>
+        <p:nvCxnSpPr>
+          <p:cNvPr id="15" name="Connecteur droit 14">
+            <a:extLst>
+              <a:ext uri="{FF2B5EF4-FFF2-40B4-BE49-F238E27FC236}">
+                <a16:creationId xmlns:a16="http://schemas.microsoft.com/office/drawing/2014/main" id="{EEB17CBA-E776-A9AF-0690-B01AF7A6B787}"/>
+              </a:ext>
+            </a:extLst>
+          </p:cNvPr>
+          <p:cNvCxnSpPr/>
+          <p:nvPr/>
+        </p:nvCxnSpPr>
+        <p:spPr>
+          <a:xfrm flipH="1">
+            <a:off x="719092" y="1143000"/>
+            <a:ext cx="564306" cy="0"/>
+          </a:xfrm>
+          <a:prstGeom prst="line">
+            <a:avLst/>
+          </a:prstGeom>
+          <a:ln>
+            <a:prstDash val="sysDot"/>
+          </a:ln>
+        </p:spPr>
+        <p:style>
+          <a:lnRef idx="2">
+            <a:schemeClr val="accent1"/>
+          </a:lnRef>
+          <a:fillRef idx="0">
+            <a:schemeClr val="accent1"/>
+          </a:fillRef>
+          <a:effectRef idx="1">
+            <a:schemeClr val="accent1"/>
+          </a:effectRef>
+          <a:fontRef idx="minor">
+            <a:schemeClr val="tx1"/>
+          </a:fontRef>
+        </p:style>
+      </p:cxnSp>
+      <p:cxnSp>
+        <p:nvCxnSpPr>
+          <p:cNvPr id="16" name="Connecteur droit 15">
+            <a:extLst>
+              <a:ext uri="{FF2B5EF4-FFF2-40B4-BE49-F238E27FC236}">
+                <a16:creationId xmlns:a16="http://schemas.microsoft.com/office/drawing/2014/main" id="{608582AE-AF30-1729-E712-9429BC229BAE}"/>
+              </a:ext>
+            </a:extLst>
+          </p:cNvPr>
+          <p:cNvCxnSpPr/>
+          <p:nvPr/>
+        </p:nvCxnSpPr>
+        <p:spPr>
+          <a:xfrm flipH="1">
+            <a:off x="745273" y="5715000"/>
+            <a:ext cx="564306" cy="0"/>
+          </a:xfrm>
+          <a:prstGeom prst="line">
+            <a:avLst/>
+          </a:prstGeom>
+          <a:ln>
+            <a:prstDash val="sysDot"/>
+          </a:ln>
+        </p:spPr>
+        <p:style>
+          <a:lnRef idx="2">
+            <a:schemeClr val="accent1"/>
+          </a:lnRef>
+          <a:fillRef idx="0">
+            <a:schemeClr val="accent1"/>
+          </a:fillRef>
+          <a:effectRef idx="1">
+            <a:schemeClr val="accent1"/>
+          </a:effectRef>
+          <a:fontRef idx="minor">
+            <a:schemeClr val="tx1"/>
+          </a:fontRef>
+        </p:style>
+      </p:cxnSp>
+      <p:cxnSp>
+        <p:nvCxnSpPr>
+          <p:cNvPr id="17" name="Connecteur droit 16">
+            <a:extLst>
+              <a:ext uri="{FF2B5EF4-FFF2-40B4-BE49-F238E27FC236}">
+                <a16:creationId xmlns:a16="http://schemas.microsoft.com/office/drawing/2014/main" id="{2647DC8B-ADA1-D767-60B6-F15115A87C2E}"/>
+              </a:ext>
+            </a:extLst>
+          </p:cNvPr>
+          <p:cNvCxnSpPr>
+            <a:cxnSpLocks/>
+          </p:cNvCxnSpPr>
+          <p:nvPr/>
+        </p:nvCxnSpPr>
+        <p:spPr>
+          <a:xfrm>
+            <a:off x="1283398" y="5715000"/>
+            <a:ext cx="0" cy="508247"/>
+          </a:xfrm>
+          <a:prstGeom prst="line">
+            <a:avLst/>
+          </a:prstGeom>
+          <a:ln>
+            <a:prstDash val="sysDot"/>
+          </a:ln>
+        </p:spPr>
+        <p:style>
+          <a:lnRef idx="2">
+            <a:schemeClr val="accent1"/>
+          </a:lnRef>
+          <a:fillRef idx="0">
+            <a:schemeClr val="accent1"/>
+          </a:fillRef>
+          <a:effectRef idx="1">
+            <a:schemeClr val="accent1"/>
+          </a:effectRef>
+          <a:fontRef idx="minor">
+            <a:schemeClr val="tx1"/>
+          </a:fontRef>
+        </p:style>
+      </p:cxnSp>
+      <p:cxnSp>
+        <p:nvCxnSpPr>
+          <p:cNvPr id="20" name="Connecteur droit 19">
+            <a:extLst>
+              <a:ext uri="{FF2B5EF4-FFF2-40B4-BE49-F238E27FC236}">
+                <a16:creationId xmlns:a16="http://schemas.microsoft.com/office/drawing/2014/main" id="{2B613D94-58AF-56BF-F925-6284DDAC1768}"/>
+              </a:ext>
+            </a:extLst>
+          </p:cNvPr>
+          <p:cNvCxnSpPr>
+            <a:cxnSpLocks/>
+          </p:cNvCxnSpPr>
+          <p:nvPr/>
+        </p:nvCxnSpPr>
+        <p:spPr>
+          <a:xfrm>
+            <a:off x="9363888" y="5715000"/>
+            <a:ext cx="0" cy="508247"/>
+          </a:xfrm>
+          <a:prstGeom prst="line">
+            <a:avLst/>
+          </a:prstGeom>
+          <a:ln>
+            <a:prstDash val="sysDot"/>
+          </a:ln>
+        </p:spPr>
+        <p:style>
+          <a:lnRef idx="2">
+            <a:schemeClr val="accent1"/>
+          </a:lnRef>
+          <a:fillRef idx="0">
+            <a:schemeClr val="accent1"/>
+          </a:fillRef>
+          <a:effectRef idx="1">
+            <a:schemeClr val="accent1"/>
+          </a:effectRef>
+          <a:fontRef idx="minor">
+            <a:schemeClr val="tx1"/>
+          </a:fontRef>
+        </p:style>
+      </p:cxnSp>
+      <p:sp>
+        <p:nvSpPr>
+          <p:cNvPr id="21" name="ZoneTexte 20">
+            <a:extLst>
+              <a:ext uri="{FF2B5EF4-FFF2-40B4-BE49-F238E27FC236}">
+                <a16:creationId xmlns:a16="http://schemas.microsoft.com/office/drawing/2014/main" id="{B8DDC20C-3948-2114-045F-7C9BC9702457}"/>
+              </a:ext>
+            </a:extLst>
+          </p:cNvPr>
+          <p:cNvSpPr txBox="1"/>
+          <p:nvPr/>
+        </p:nvSpPr>
+        <p:spPr>
+          <a:xfrm>
+            <a:off x="5128718" y="6102087"/>
+            <a:ext cx="535724" cy="276999"/>
+          </a:xfrm>
+          <a:prstGeom prst="rect">
+            <a:avLst/>
+          </a:prstGeom>
+          <a:noFill/>
+        </p:spPr>
+        <p:txBody>
+          <a:bodyPr wrap="none" rtlCol="0">
+            <a:spAutoFit/>
+          </a:bodyPr>
+          <a:lstStyle/>
+          <a:p>
+            <a:r>
+              <a:rPr lang="fr-FR" sz="1200" dirty="0" err="1">
+                <a:highlight>
+                  <a:srgbClr val="FFFF00"/>
+                </a:highlight>
+              </a:rPr>
+              <a:t>W</a:t>
+            </a:r>
+            <a:r>
+              <a:rPr lang="fr-FR" sz="1000" dirty="0" err="1">
+                <a:highlight>
+                  <a:srgbClr val="FFFF00"/>
+                </a:highlight>
+              </a:rPr>
+              <a:t>img</a:t>
+            </a:r>
+            <a:endParaRPr lang="fr-FR" sz="1200" dirty="0">
+              <a:highlight>
+                <a:srgbClr val="FFFF00"/>
+              </a:highlight>
+            </a:endParaRPr>
+          </a:p>
+        </p:txBody>
+      </p:sp>
+      <p:sp>
+        <p:nvSpPr>
+          <p:cNvPr id="22" name="ZoneTexte 21">
+            <a:extLst>
+              <a:ext uri="{FF2B5EF4-FFF2-40B4-BE49-F238E27FC236}">
+                <a16:creationId xmlns:a16="http://schemas.microsoft.com/office/drawing/2014/main" id="{C157BBBF-C28A-D317-E157-6A39B5DA7BB2}"/>
+              </a:ext>
+            </a:extLst>
+          </p:cNvPr>
+          <p:cNvSpPr txBox="1"/>
+          <p:nvPr/>
+        </p:nvSpPr>
+        <p:spPr>
+          <a:xfrm>
+            <a:off x="555776" y="3310015"/>
+            <a:ext cx="495649" cy="276999"/>
+          </a:xfrm>
+          <a:prstGeom prst="rect">
+            <a:avLst/>
+          </a:prstGeom>
+          <a:noFill/>
+        </p:spPr>
+        <p:txBody>
+          <a:bodyPr wrap="none" rtlCol="0">
+            <a:spAutoFit/>
+          </a:bodyPr>
+          <a:lstStyle/>
+          <a:p>
+            <a:r>
+              <a:rPr lang="fr-FR" sz="1200" dirty="0" err="1">
+                <a:highlight>
+                  <a:srgbClr val="FFFF00"/>
+                </a:highlight>
+              </a:rPr>
+              <a:t>H</a:t>
+            </a:r>
+            <a:r>
+              <a:rPr lang="fr-FR" sz="1000" dirty="0" err="1">
+                <a:highlight>
+                  <a:srgbClr val="FFFF00"/>
+                </a:highlight>
+              </a:rPr>
+              <a:t>img</a:t>
+            </a:r>
+            <a:endParaRPr lang="fr-FR" sz="1200" dirty="0">
+              <a:highlight>
+                <a:srgbClr val="FFFF00"/>
+              </a:highlight>
+            </a:endParaRPr>
+          </a:p>
+        </p:txBody>
+      </p:sp>
+      <p:sp>
+        <p:nvSpPr>
+          <p:cNvPr id="23" name="Rectangle 22">
+            <a:extLst>
+              <a:ext uri="{FF2B5EF4-FFF2-40B4-BE49-F238E27FC236}">
+                <a16:creationId xmlns:a16="http://schemas.microsoft.com/office/drawing/2014/main" id="{052B2D82-7987-010C-133F-BD9B9A4E0B06}"/>
+              </a:ext>
+            </a:extLst>
+          </p:cNvPr>
+          <p:cNvSpPr/>
+          <p:nvPr/>
+        </p:nvSpPr>
+        <p:spPr>
+          <a:xfrm>
+            <a:off x="2467993" y="2175029"/>
+            <a:ext cx="1163714" cy="1586014"/>
+          </a:xfrm>
+          <a:prstGeom prst="rect">
+            <a:avLst/>
+          </a:prstGeom>
+          <a:noFill/>
+          <a:ln>
+            <a:prstDash val="dash"/>
+          </a:ln>
+        </p:spPr>
+        <p:style>
+          <a:lnRef idx="2">
+            <a:schemeClr val="accent1">
+              <a:shade val="15000"/>
+            </a:schemeClr>
+          </a:lnRef>
+          <a:fillRef idx="1">
+            <a:schemeClr val="accent1"/>
+          </a:fillRef>
+          <a:effectRef idx="0">
+            <a:schemeClr val="accent1"/>
+          </a:effectRef>
+          <a:fontRef idx="minor">
+            <a:schemeClr val="lt1"/>
+          </a:fontRef>
+        </p:style>
+        <p:txBody>
+          <a:bodyPr rtlCol="0" anchor="ctr"/>
+          <a:lstStyle/>
+          <a:p>
+            <a:pPr algn="ctr"/>
+            <a:endParaRPr lang="fr-FR"/>
+          </a:p>
+        </p:txBody>
+      </p:sp>
+      <p:sp>
+        <p:nvSpPr>
+          <p:cNvPr id="24" name="ZoneTexte 23">
+            <a:extLst>
+              <a:ext uri="{FF2B5EF4-FFF2-40B4-BE49-F238E27FC236}">
+                <a16:creationId xmlns:a16="http://schemas.microsoft.com/office/drawing/2014/main" id="{65B8FD1B-8B1C-46F8-17A5-87C00511F036}"/>
+              </a:ext>
+            </a:extLst>
+          </p:cNvPr>
+          <p:cNvSpPr txBox="1"/>
+          <p:nvPr/>
+        </p:nvSpPr>
+        <p:spPr>
+          <a:xfrm>
+            <a:off x="2895801" y="2783369"/>
+            <a:ext cx="308098" cy="369332"/>
+          </a:xfrm>
+          <a:prstGeom prst="rect">
+            <a:avLst/>
+          </a:prstGeom>
+          <a:noFill/>
+        </p:spPr>
+        <p:txBody>
+          <a:bodyPr wrap="none" rtlCol="0">
+            <a:spAutoFit/>
+          </a:bodyPr>
+          <a:lstStyle/>
+          <a:p>
+            <a:r>
+              <a:rPr lang="fr-FR" dirty="0">
+                <a:solidFill>
+                  <a:srgbClr val="FF0000"/>
+                </a:solidFill>
+              </a:rPr>
+              <a:t>+</a:t>
+            </a:r>
+          </a:p>
+        </p:txBody>
+      </p:sp>
+      <p:sp>
+        <p:nvSpPr>
+          <p:cNvPr id="25" name="ZoneTexte 24">
+            <a:extLst>
+              <a:ext uri="{FF2B5EF4-FFF2-40B4-BE49-F238E27FC236}">
+                <a16:creationId xmlns:a16="http://schemas.microsoft.com/office/drawing/2014/main" id="{BD1E62DE-DA0D-7DBB-E152-D302A27E98B6}"/>
+              </a:ext>
+            </a:extLst>
+          </p:cNvPr>
+          <p:cNvSpPr txBox="1"/>
+          <p:nvPr/>
+        </p:nvSpPr>
+        <p:spPr>
+          <a:xfrm>
+            <a:off x="1918250" y="2829536"/>
+            <a:ext cx="474810" cy="276999"/>
+          </a:xfrm>
+          <a:prstGeom prst="rect">
+            <a:avLst/>
+          </a:prstGeom>
+          <a:noFill/>
+        </p:spPr>
+        <p:txBody>
+          <a:bodyPr wrap="none" rtlCol="0">
+            <a:spAutoFit/>
+          </a:bodyPr>
+          <a:lstStyle/>
+          <a:p>
+            <a:r>
+              <a:rPr lang="fr-FR" sz="1200" dirty="0" err="1">
+                <a:highlight>
+                  <a:srgbClr val="FFFF00"/>
+                </a:highlight>
+              </a:rPr>
+              <a:t>H</a:t>
+            </a:r>
+            <a:r>
+              <a:rPr lang="fr-FR" sz="1000" dirty="0" err="1">
+                <a:highlight>
+                  <a:srgbClr val="FFFF00"/>
+                </a:highlight>
+              </a:rPr>
+              <a:t>obj</a:t>
+            </a:r>
+            <a:endParaRPr lang="fr-FR" sz="1200" dirty="0">
+              <a:highlight>
+                <a:srgbClr val="FFFF00"/>
+              </a:highlight>
+            </a:endParaRPr>
+          </a:p>
+        </p:txBody>
+      </p:sp>
+      <p:sp>
+        <p:nvSpPr>
+          <p:cNvPr id="26" name="ZoneTexte 25">
+            <a:extLst>
+              <a:ext uri="{FF2B5EF4-FFF2-40B4-BE49-F238E27FC236}">
+                <a16:creationId xmlns:a16="http://schemas.microsoft.com/office/drawing/2014/main" id="{6573CF39-CF47-B53F-14F1-2487937FB826}"/>
+              </a:ext>
+            </a:extLst>
+          </p:cNvPr>
+          <p:cNvSpPr txBox="1"/>
+          <p:nvPr/>
+        </p:nvSpPr>
+        <p:spPr>
+          <a:xfrm>
+            <a:off x="2798018" y="3800493"/>
+            <a:ext cx="503664" cy="276999"/>
+          </a:xfrm>
+          <a:prstGeom prst="rect">
+            <a:avLst/>
+          </a:prstGeom>
+          <a:noFill/>
+        </p:spPr>
+        <p:txBody>
+          <a:bodyPr wrap="none" rtlCol="0">
+            <a:spAutoFit/>
+          </a:bodyPr>
+          <a:lstStyle/>
+          <a:p>
+            <a:r>
+              <a:rPr lang="fr-FR" sz="1200" dirty="0" err="1">
+                <a:highlight>
+                  <a:srgbClr val="FFFF00"/>
+                </a:highlight>
+              </a:rPr>
+              <a:t>W</a:t>
+            </a:r>
+            <a:r>
+              <a:rPr lang="fr-FR" sz="1000" dirty="0" err="1">
+                <a:highlight>
+                  <a:srgbClr val="FFFF00"/>
+                </a:highlight>
+              </a:rPr>
+              <a:t>obj</a:t>
+            </a:r>
+            <a:endParaRPr lang="fr-FR" sz="1200" dirty="0">
+              <a:highlight>
+                <a:srgbClr val="FFFF00"/>
+              </a:highlight>
+            </a:endParaRPr>
+          </a:p>
+        </p:txBody>
+      </p:sp>
+      <p:sp>
+        <p:nvSpPr>
+          <p:cNvPr id="28" name="ZoneTexte 27">
+            <a:extLst>
+              <a:ext uri="{FF2B5EF4-FFF2-40B4-BE49-F238E27FC236}">
+                <a16:creationId xmlns:a16="http://schemas.microsoft.com/office/drawing/2014/main" id="{4A31C3FA-1F53-7F9C-B608-95BC82D65CC6}"/>
+              </a:ext>
+            </a:extLst>
+          </p:cNvPr>
+          <p:cNvSpPr txBox="1"/>
+          <p:nvPr/>
+        </p:nvSpPr>
+        <p:spPr>
+          <a:xfrm>
+            <a:off x="2597020" y="2656877"/>
+            <a:ext cx="956159" cy="276999"/>
+          </a:xfrm>
+          <a:prstGeom prst="rect">
+            <a:avLst/>
+          </a:prstGeom>
+          <a:noFill/>
+        </p:spPr>
+        <p:txBody>
+          <a:bodyPr wrap="none" rtlCol="0">
+            <a:spAutoFit/>
+          </a:bodyPr>
+          <a:lstStyle/>
+          <a:p>
+            <a:r>
+              <a:rPr lang="fr-FR" sz="1200" dirty="0"/>
+              <a:t>(</a:t>
+            </a:r>
+            <a:r>
+              <a:rPr lang="fr-FR" sz="1200" dirty="0" err="1"/>
+              <a:t>Xco,Yco</a:t>
+            </a:r>
+            <a:r>
+              <a:rPr lang="fr-FR" sz="1200" dirty="0"/>
+              <a:t>)</a:t>
+            </a:r>
+            <a:r>
+              <a:rPr lang="fr-FR" sz="1000" dirty="0" err="1"/>
+              <a:t>obj</a:t>
+            </a:r>
+            <a:endParaRPr lang="fr-FR" sz="1200" dirty="0"/>
+          </a:p>
+        </p:txBody>
+      </p:sp>
+      <p:cxnSp>
+        <p:nvCxnSpPr>
+          <p:cNvPr id="30" name="Connecteur droit 29">
+            <a:extLst>
+              <a:ext uri="{FF2B5EF4-FFF2-40B4-BE49-F238E27FC236}">
+                <a16:creationId xmlns:a16="http://schemas.microsoft.com/office/drawing/2014/main" id="{9C51AE01-15C7-53CF-09D8-D6F0BD621882}"/>
+              </a:ext>
+            </a:extLst>
+          </p:cNvPr>
+          <p:cNvCxnSpPr>
+            <a:cxnSpLocks/>
+          </p:cNvCxnSpPr>
+          <p:nvPr/>
+        </p:nvCxnSpPr>
+        <p:spPr>
+          <a:xfrm>
+            <a:off x="3049850" y="2968035"/>
+            <a:ext cx="2273793" cy="469843"/>
+          </a:xfrm>
+          <a:prstGeom prst="line">
+            <a:avLst/>
+          </a:prstGeom>
+          <a:ln/>
+        </p:spPr>
+        <p:style>
+          <a:lnRef idx="2">
+            <a:schemeClr val="accent4"/>
+          </a:lnRef>
+          <a:fillRef idx="0">
+            <a:schemeClr val="accent4"/>
+          </a:fillRef>
+          <a:effectRef idx="1">
+            <a:schemeClr val="accent4"/>
+          </a:effectRef>
+          <a:fontRef idx="minor">
+            <a:schemeClr val="tx1"/>
+          </a:fontRef>
+        </p:style>
+      </p:cxnSp>
+      <p:sp>
+        <p:nvSpPr>
+          <p:cNvPr id="35" name="Arc 34">
+            <a:extLst>
+              <a:ext uri="{FF2B5EF4-FFF2-40B4-BE49-F238E27FC236}">
+                <a16:creationId xmlns:a16="http://schemas.microsoft.com/office/drawing/2014/main" id="{9B90BEC4-9A92-2CEB-366A-C07C68926EE0}"/>
+              </a:ext>
+            </a:extLst>
+          </p:cNvPr>
+          <p:cNvSpPr/>
+          <p:nvPr/>
+        </p:nvSpPr>
+        <p:spPr>
+          <a:xfrm rot="14812374">
+            <a:off x="4481260" y="3249424"/>
+            <a:ext cx="223792" cy="257485"/>
+          </a:xfrm>
+          <a:prstGeom prst="arc">
+            <a:avLst/>
+          </a:prstGeom>
+        </p:spPr>
+        <p:style>
+          <a:lnRef idx="2">
+            <a:schemeClr val="accent4"/>
+          </a:lnRef>
+          <a:fillRef idx="0">
+            <a:schemeClr val="accent4"/>
+          </a:fillRef>
+          <a:effectRef idx="1">
+            <a:schemeClr val="accent4"/>
+          </a:effectRef>
+          <a:fontRef idx="minor">
+            <a:schemeClr val="tx1"/>
+          </a:fontRef>
+        </p:style>
+        <p:txBody>
+          <a:bodyPr rtlCol="0" anchor="ctr"/>
+          <a:lstStyle/>
+          <a:p>
+            <a:pPr algn="ctr"/>
+            <a:endParaRPr lang="fr-FR"/>
+          </a:p>
+        </p:txBody>
+      </p:sp>
+      <p:cxnSp>
+        <p:nvCxnSpPr>
+          <p:cNvPr id="38" name="Connecteur droit 37">
+            <a:extLst>
+              <a:ext uri="{FF2B5EF4-FFF2-40B4-BE49-F238E27FC236}">
+                <a16:creationId xmlns:a16="http://schemas.microsoft.com/office/drawing/2014/main" id="{EFA7B8B4-F77A-7D6F-00CA-921C1C22056F}"/>
+              </a:ext>
+            </a:extLst>
+          </p:cNvPr>
+          <p:cNvCxnSpPr/>
+          <p:nvPr/>
+        </p:nvCxnSpPr>
+        <p:spPr>
+          <a:xfrm flipH="1">
+            <a:off x="3932808" y="3448514"/>
+            <a:ext cx="1390835" cy="0"/>
+          </a:xfrm>
+          <a:prstGeom prst="line">
+            <a:avLst/>
+          </a:prstGeom>
+        </p:spPr>
+        <p:style>
+          <a:lnRef idx="2">
+            <a:schemeClr val="accent4"/>
+          </a:lnRef>
+          <a:fillRef idx="0">
+            <a:schemeClr val="accent4"/>
+          </a:fillRef>
+          <a:effectRef idx="1">
+            <a:schemeClr val="accent4"/>
+          </a:effectRef>
+          <a:fontRef idx="minor">
+            <a:schemeClr val="tx1"/>
+          </a:fontRef>
+        </p:style>
+      </p:cxnSp>
+      <p:sp>
+        <p:nvSpPr>
+          <p:cNvPr id="39" name="ZoneTexte 38">
+            <a:extLst>
+              <a:ext uri="{FF2B5EF4-FFF2-40B4-BE49-F238E27FC236}">
+                <a16:creationId xmlns:a16="http://schemas.microsoft.com/office/drawing/2014/main" id="{85847318-6F14-2F6A-EA1A-19493D864118}"/>
+              </a:ext>
+            </a:extLst>
+          </p:cNvPr>
+          <p:cNvSpPr txBox="1"/>
+          <p:nvPr/>
+        </p:nvSpPr>
+        <p:spPr>
+          <a:xfrm>
+            <a:off x="3839359" y="3171734"/>
+            <a:ext cx="364202" cy="276999"/>
+          </a:xfrm>
+          <a:prstGeom prst="rect">
+            <a:avLst/>
+          </a:prstGeom>
+          <a:noFill/>
+        </p:spPr>
+        <p:txBody>
+          <a:bodyPr wrap="none" rtlCol="0">
+            <a:spAutoFit/>
+          </a:bodyPr>
+          <a:lstStyle/>
+          <a:p>
+            <a:r>
+              <a:rPr lang="az-Cyrl-AZ" sz="1200" dirty="0"/>
+              <a:t>Ө</a:t>
+            </a:r>
+            <a:r>
+              <a:rPr lang="fr-FR" sz="1200" dirty="0"/>
+              <a:t>x</a:t>
+            </a:r>
+          </a:p>
+        </p:txBody>
+      </p:sp>
+      <p:sp>
+        <p:nvSpPr>
+          <p:cNvPr id="41" name="ZoneTexte 40">
+            <a:extLst>
+              <a:ext uri="{FF2B5EF4-FFF2-40B4-BE49-F238E27FC236}">
+                <a16:creationId xmlns:a16="http://schemas.microsoft.com/office/drawing/2014/main" id="{4F894FEF-A480-F6D0-7043-909935286757}"/>
+              </a:ext>
+            </a:extLst>
+          </p:cNvPr>
+          <p:cNvSpPr txBox="1"/>
+          <p:nvPr/>
+        </p:nvSpPr>
+        <p:spPr>
+          <a:xfrm>
+            <a:off x="2155655" y="1817703"/>
+            <a:ext cx="753091" cy="276999"/>
+          </a:xfrm>
+          <a:prstGeom prst="rect">
+            <a:avLst/>
+          </a:prstGeom>
+          <a:noFill/>
+        </p:spPr>
+        <p:txBody>
+          <a:bodyPr wrap="none" rtlCol="0">
+            <a:spAutoFit/>
+          </a:bodyPr>
+          <a:lstStyle/>
+          <a:p>
+            <a:r>
+              <a:rPr lang="fr-FR" sz="1200" dirty="0">
+                <a:highlight>
+                  <a:srgbClr val="FFFF00"/>
+                </a:highlight>
+              </a:rPr>
+              <a:t>(X,Y)</a:t>
+            </a:r>
+            <a:r>
+              <a:rPr lang="fr-FR" sz="1000" dirty="0">
+                <a:highlight>
+                  <a:srgbClr val="FFFF00"/>
+                </a:highlight>
+              </a:rPr>
+              <a:t>objet</a:t>
+            </a:r>
+            <a:endParaRPr lang="fr-FR" sz="1200" dirty="0">
+              <a:highlight>
+                <a:srgbClr val="FFFF00"/>
+              </a:highlight>
+            </a:endParaRPr>
+          </a:p>
+        </p:txBody>
+      </p:sp>
+      <p:sp>
+        <p:nvSpPr>
+          <p:cNvPr id="42" name="ZoneTexte 41">
+            <a:extLst>
+              <a:ext uri="{FF2B5EF4-FFF2-40B4-BE49-F238E27FC236}">
+                <a16:creationId xmlns:a16="http://schemas.microsoft.com/office/drawing/2014/main" id="{A4CFC3C2-7BBD-A4EB-6CC3-ADB6031CF36C}"/>
+              </a:ext>
+            </a:extLst>
+          </p:cNvPr>
+          <p:cNvSpPr txBox="1"/>
+          <p:nvPr/>
+        </p:nvSpPr>
+        <p:spPr>
+          <a:xfrm>
+            <a:off x="2313943" y="1990362"/>
+            <a:ext cx="308098" cy="369332"/>
+          </a:xfrm>
+          <a:prstGeom prst="rect">
+            <a:avLst/>
+          </a:prstGeom>
+          <a:noFill/>
+        </p:spPr>
+        <p:txBody>
+          <a:bodyPr wrap="none" rtlCol="0">
+            <a:spAutoFit/>
+          </a:bodyPr>
+          <a:lstStyle/>
+          <a:p>
+            <a:r>
+              <a:rPr lang="fr-FR" dirty="0">
+                <a:solidFill>
+                  <a:srgbClr val="FF0000"/>
+                </a:solidFill>
+              </a:rPr>
+              <a:t>+</a:t>
+            </a:r>
+          </a:p>
+        </p:txBody>
+      </p:sp>
+      <p:sp>
+        <p:nvSpPr>
+          <p:cNvPr id="43" name="ZoneTexte 42">
+            <a:extLst>
+              <a:ext uri="{FF2B5EF4-FFF2-40B4-BE49-F238E27FC236}">
+                <a16:creationId xmlns:a16="http://schemas.microsoft.com/office/drawing/2014/main" id="{4A93B967-3B53-0690-1857-A51F0A52822F}"/>
+              </a:ext>
+            </a:extLst>
+          </p:cNvPr>
+          <p:cNvSpPr txBox="1"/>
+          <p:nvPr/>
+        </p:nvSpPr>
+        <p:spPr>
+          <a:xfrm>
+            <a:off x="34449" y="116733"/>
+            <a:ext cx="1369286" cy="261610"/>
+          </a:xfrm>
+          <a:prstGeom prst="rect">
+            <a:avLst/>
+          </a:prstGeom>
+          <a:noFill/>
+        </p:spPr>
+        <p:txBody>
+          <a:bodyPr wrap="none" rtlCol="0">
+            <a:spAutoFit/>
+          </a:bodyPr>
+          <a:lstStyle/>
+          <a:p>
+            <a:r>
+              <a:rPr lang="fr-FR" sz="1100" dirty="0">
+                <a:highlight>
+                  <a:srgbClr val="FFFF00"/>
+                </a:highlight>
+              </a:rPr>
+              <a:t>Ce que l’on connait</a:t>
+            </a:r>
+          </a:p>
+        </p:txBody>
+      </p:sp>
+      <p:sp>
+        <p:nvSpPr>
+          <p:cNvPr id="44" name="ZoneTexte 43">
+            <a:extLst>
+              <a:ext uri="{FF2B5EF4-FFF2-40B4-BE49-F238E27FC236}">
+                <a16:creationId xmlns:a16="http://schemas.microsoft.com/office/drawing/2014/main" id="{1F232B7B-F177-793D-4D93-7A4A37A20FC5}"/>
+              </a:ext>
+            </a:extLst>
+          </p:cNvPr>
+          <p:cNvSpPr txBox="1"/>
+          <p:nvPr/>
+        </p:nvSpPr>
+        <p:spPr>
+          <a:xfrm>
+            <a:off x="8748144" y="810449"/>
+            <a:ext cx="709874" cy="307777"/>
+          </a:xfrm>
+          <a:prstGeom prst="rect">
+            <a:avLst/>
+          </a:prstGeom>
+          <a:noFill/>
+        </p:spPr>
+        <p:txBody>
+          <a:bodyPr wrap="none" rtlCol="0">
+            <a:spAutoFit/>
+          </a:bodyPr>
+          <a:lstStyle/>
+          <a:p>
+            <a:r>
+              <a:rPr lang="fr-FR" sz="1400" b="1" dirty="0"/>
+              <a:t>Yolov4</a:t>
+            </a:r>
+            <a:endParaRPr lang="fr-FR" b="1" dirty="0"/>
+          </a:p>
+        </p:txBody>
+      </p:sp>
+      <mc:AlternateContent xmlns:mc="http://schemas.openxmlformats.org/markup-compatibility/2006">
+        <mc:Choice xmlns:a14="http://schemas.microsoft.com/office/drawing/2010/main" Requires="a14">
+          <p:sp>
+            <p:nvSpPr>
+              <p:cNvPr id="45" name="ZoneTexte 44">
+                <a:extLst>
+                  <a:ext uri="{FF2B5EF4-FFF2-40B4-BE49-F238E27FC236}">
+                    <a16:creationId xmlns:a16="http://schemas.microsoft.com/office/drawing/2014/main" id="{C804A102-7676-8754-C38C-D11FBE697320}"/>
+                  </a:ext>
+                </a:extLst>
+              </p:cNvPr>
+              <p:cNvSpPr txBox="1"/>
+              <p:nvPr/>
+            </p:nvSpPr>
+            <p:spPr>
+              <a:xfrm>
+                <a:off x="9552147" y="3056796"/>
+                <a:ext cx="1388713" cy="642740"/>
+              </a:xfrm>
+              <a:prstGeom prst="rect">
+                <a:avLst/>
+              </a:prstGeom>
+              <a:noFill/>
+            </p:spPr>
+            <p:txBody>
+              <a:bodyPr wrap="none" rtlCol="0">
+                <a:spAutoFit/>
+              </a:bodyPr>
+              <a:lstStyle/>
+              <a:p>
+                <a:pPr/>
+                <a14:m>
+                  <m:oMathPara xmlns:m="http://schemas.openxmlformats.org/officeDocument/2006/math">
+                    <m:oMathParaPr>
+                      <m:jc m:val="centerGroup"/>
+                    </m:oMathParaPr>
+                    <m:oMath xmlns:m="http://schemas.openxmlformats.org/officeDocument/2006/math">
+                      <m:r>
+                        <m:rPr>
+                          <m:nor/>
+                        </m:rPr>
+                        <a:rPr lang="pl-PL" sz="1200" smtClean="0"/>
+                        <m:t>θx</m:t>
+                      </m:r>
+                      <m:r>
+                        <m:rPr>
+                          <m:nor/>
+                        </m:rPr>
+                        <a:rPr lang="pl-PL" sz="1200" smtClean="0"/>
+                        <m:t>​</m:t>
+                      </m:r>
+                      <m:r>
+                        <m:rPr>
+                          <m:nor/>
+                        </m:rPr>
+                        <a:rPr lang="fr-FR" sz="1200" b="0" i="0" smtClean="0"/>
+                        <m:t> </m:t>
+                      </m:r>
+                      <m:r>
+                        <m:rPr>
+                          <m:nor/>
+                        </m:rPr>
+                        <a:rPr lang="pl-PL" sz="1200" smtClean="0"/>
+                        <m:t>=</m:t>
+                      </m:r>
+                      <m:f>
+                        <m:fPr>
+                          <m:ctrlPr>
+                            <a:rPr lang="pl-PL" sz="1200" i="1" smtClean="0">
+                              <a:latin typeface="Cambria Math" panose="02040503050406030204" pitchFamily="18" charset="0"/>
+                            </a:rPr>
+                          </m:ctrlPr>
+                        </m:fPr>
+                        <m:num>
+                          <m:r>
+                            <a:rPr lang="fr-FR" sz="1200" b="0" i="1" smtClean="0">
+                              <a:latin typeface="Cambria Math" panose="02040503050406030204" pitchFamily="18" charset="0"/>
+                            </a:rPr>
+                            <m:t>𝑥𝑐𝑜</m:t>
+                          </m:r>
+                          <m:r>
+                            <a:rPr lang="fr-FR" sz="1200" b="0" i="1" smtClean="0">
+                              <a:latin typeface="Cambria Math" panose="02040503050406030204" pitchFamily="18" charset="0"/>
+                            </a:rPr>
+                            <m:t> −</m:t>
+                          </m:r>
+                          <m:f>
+                            <m:fPr>
+                              <m:ctrlPr>
+                                <a:rPr lang="fr-FR" sz="1200" b="0" i="1" smtClean="0">
+                                  <a:latin typeface="Cambria Math" panose="02040503050406030204" pitchFamily="18" charset="0"/>
+                                </a:rPr>
+                              </m:ctrlPr>
+                            </m:fPr>
+                            <m:num>
+                              <m:r>
+                                <a:rPr lang="fr-FR" sz="1200" b="0" i="1" smtClean="0">
+                                  <a:latin typeface="Cambria Math" panose="02040503050406030204" pitchFamily="18" charset="0"/>
+                                </a:rPr>
+                                <m:t>𝑤</m:t>
+                              </m:r>
+                            </m:num>
+                            <m:den>
+                              <m:r>
+                                <a:rPr lang="fr-FR" sz="1200" b="0" i="1" smtClean="0">
+                                  <a:latin typeface="Cambria Math" panose="02040503050406030204" pitchFamily="18" charset="0"/>
+                                </a:rPr>
+                                <m:t>2</m:t>
+                              </m:r>
+                            </m:den>
+                          </m:f>
+                        </m:num>
+                        <m:den>
+                          <m:f>
+                            <m:fPr>
+                              <m:ctrlPr>
+                                <a:rPr lang="fr-FR" sz="1200" i="1">
+                                  <a:latin typeface="Cambria Math" panose="02040503050406030204" pitchFamily="18" charset="0"/>
+                                </a:rPr>
+                              </m:ctrlPr>
+                            </m:fPr>
+                            <m:num>
+                              <m:r>
+                                <a:rPr lang="fr-FR" sz="1200" i="1">
+                                  <a:latin typeface="Cambria Math" panose="02040503050406030204" pitchFamily="18" charset="0"/>
+                                </a:rPr>
+                                <m:t>𝑤</m:t>
+                              </m:r>
+                            </m:num>
+                            <m:den>
+                              <m:r>
+                                <a:rPr lang="fr-FR" sz="1200" i="1">
+                                  <a:latin typeface="Cambria Math" panose="02040503050406030204" pitchFamily="18" charset="0"/>
+                                </a:rPr>
+                                <m:t>2</m:t>
+                              </m:r>
+                            </m:den>
+                          </m:f>
+                        </m:den>
+                      </m:f>
+                      <m:r>
+                        <a:rPr lang="fr-FR" sz="1200" b="0" i="1" smtClean="0">
+                          <a:latin typeface="Cambria Math" panose="02040503050406030204" pitchFamily="18" charset="0"/>
+                        </a:rPr>
+                        <m:t> ∗ </m:t>
+                      </m:r>
+                      <m:f>
+                        <m:fPr>
+                          <m:ctrlPr>
+                            <a:rPr lang="fr-FR" sz="1200" b="0" i="1" smtClean="0">
+                              <a:latin typeface="Cambria Math" panose="02040503050406030204" pitchFamily="18" charset="0"/>
+                            </a:rPr>
+                          </m:ctrlPr>
+                        </m:fPr>
+                        <m:num>
+                          <m:r>
+                            <a:rPr lang="fr-FR" sz="1200" b="0" i="1" smtClean="0">
+                              <a:latin typeface="Cambria Math" panose="02040503050406030204" pitchFamily="18" charset="0"/>
+                              <a:ea typeface="Cambria Math" panose="02040503050406030204" pitchFamily="18" charset="0"/>
+                            </a:rPr>
+                            <m:t>𝛼</m:t>
+                          </m:r>
+                        </m:num>
+                        <m:den>
+                          <m:r>
+                            <a:rPr lang="fr-FR" sz="1200" b="0" i="1" smtClean="0">
+                              <a:latin typeface="Cambria Math" panose="02040503050406030204" pitchFamily="18" charset="0"/>
+                            </a:rPr>
+                            <m:t>2</m:t>
+                          </m:r>
+                        </m:den>
+                      </m:f>
+                    </m:oMath>
+                  </m:oMathPara>
+                </a14:m>
+                <a:endParaRPr lang="fr-FR" sz="1200" dirty="0"/>
+              </a:p>
+            </p:txBody>
+          </p:sp>
+        </mc:Choice>
+        <mc:Fallback>
+          <p:sp>
+            <p:nvSpPr>
+              <p:cNvPr id="45" name="ZoneTexte 44">
+                <a:extLst>
+                  <a:ext uri="{FF2B5EF4-FFF2-40B4-BE49-F238E27FC236}">
+                    <a16:creationId xmlns:a16="http://schemas.microsoft.com/office/drawing/2014/main" id="{C804A102-7676-8754-C38C-D11FBE697320}"/>
+                  </a:ext>
+                </a:extLst>
+              </p:cNvPr>
+              <p:cNvSpPr txBox="1">
+                <a:spLocks noRot="1" noChangeAspect="1" noMove="1" noResize="1" noEditPoints="1" noAdjustHandles="1" noChangeArrowheads="1" noChangeShapeType="1" noTextEdit="1"/>
+              </p:cNvSpPr>
+              <p:nvPr/>
+            </p:nvSpPr>
+            <p:spPr>
+              <a:xfrm>
+                <a:off x="9552147" y="3056796"/>
+                <a:ext cx="1388713" cy="642740"/>
+              </a:xfrm>
+              <a:prstGeom prst="rect">
+                <a:avLst/>
+              </a:prstGeom>
+              <a:blipFill>
+                <a:blip r:embed="rId3"/>
+                <a:stretch>
+                  <a:fillRect/>
+                </a:stretch>
+              </a:blipFill>
+            </p:spPr>
+            <p:txBody>
+              <a:bodyPr/>
+              <a:lstStyle/>
+              <a:p>
+                <a:r>
+                  <a:rPr lang="fr-FR">
+                    <a:noFill/>
+                  </a:rPr>
+                  <a:t> </a:t>
+                </a:r>
+              </a:p>
+            </p:txBody>
+          </p:sp>
+        </mc:Fallback>
+      </mc:AlternateContent>
+      <mc:AlternateContent xmlns:mc="http://schemas.openxmlformats.org/markup-compatibility/2006">
+        <mc:Choice xmlns:a14="http://schemas.microsoft.com/office/drawing/2010/main" Requires="a14">
+          <p:sp>
+            <p:nvSpPr>
+              <p:cNvPr id="46" name="ZoneTexte 45">
+                <a:extLst>
+                  <a:ext uri="{FF2B5EF4-FFF2-40B4-BE49-F238E27FC236}">
+                    <a16:creationId xmlns:a16="http://schemas.microsoft.com/office/drawing/2014/main" id="{950D597A-727E-C16B-0C9D-485F334A65D2}"/>
+                  </a:ext>
+                </a:extLst>
+              </p:cNvPr>
+              <p:cNvSpPr txBox="1"/>
+              <p:nvPr/>
+            </p:nvSpPr>
+            <p:spPr>
+              <a:xfrm>
+                <a:off x="9552147" y="3632794"/>
+                <a:ext cx="1395126" cy="642740"/>
+              </a:xfrm>
+              <a:prstGeom prst="rect">
+                <a:avLst/>
+              </a:prstGeom>
+              <a:noFill/>
+            </p:spPr>
+            <p:txBody>
+              <a:bodyPr wrap="none" rtlCol="0">
+                <a:spAutoFit/>
+              </a:bodyPr>
+              <a:lstStyle/>
+              <a:p>
+                <a:pPr/>
+                <a14:m>
+                  <m:oMathPara xmlns:m="http://schemas.openxmlformats.org/officeDocument/2006/math">
+                    <m:oMathParaPr>
+                      <m:jc m:val="centerGroup"/>
+                    </m:oMathParaPr>
+                    <m:oMath xmlns:m="http://schemas.openxmlformats.org/officeDocument/2006/math">
+                      <m:r>
+                        <m:rPr>
+                          <m:nor/>
+                        </m:rPr>
+                        <a:rPr lang="pl-PL" sz="1200" smtClean="0"/>
+                        <m:t>θ</m:t>
+                      </m:r>
+                      <m:r>
+                        <m:rPr>
+                          <m:nor/>
+                        </m:rPr>
+                        <a:rPr lang="fr-FR" sz="1200" b="0" i="0" smtClean="0"/>
+                        <m:t>y</m:t>
+                      </m:r>
+                      <m:r>
+                        <m:rPr>
+                          <m:nor/>
+                        </m:rPr>
+                        <a:rPr lang="pl-PL" sz="1200" smtClean="0"/>
+                        <m:t>​</m:t>
+                      </m:r>
+                      <m:r>
+                        <m:rPr>
+                          <m:nor/>
+                        </m:rPr>
+                        <a:rPr lang="fr-FR" sz="1200" b="0" i="0" smtClean="0"/>
+                        <m:t> </m:t>
+                      </m:r>
+                      <m:r>
+                        <m:rPr>
+                          <m:nor/>
+                        </m:rPr>
+                        <a:rPr lang="pl-PL" sz="1200" smtClean="0"/>
+                        <m:t>=</m:t>
+                      </m:r>
+                      <m:f>
+                        <m:fPr>
+                          <m:ctrlPr>
+                            <a:rPr lang="pl-PL" sz="1200" i="1" smtClean="0">
+                              <a:latin typeface="Cambria Math" panose="02040503050406030204" pitchFamily="18" charset="0"/>
+                            </a:rPr>
+                          </m:ctrlPr>
+                        </m:fPr>
+                        <m:num>
+                          <m:r>
+                            <a:rPr lang="fr-FR" sz="1200" b="0" i="1" smtClean="0">
+                              <a:latin typeface="Cambria Math" panose="02040503050406030204" pitchFamily="18" charset="0"/>
+                            </a:rPr>
+                            <m:t>𝑦𝑐𝑜</m:t>
+                          </m:r>
+                          <m:r>
+                            <a:rPr lang="fr-FR" sz="1200" b="0" i="1" smtClean="0">
+                              <a:latin typeface="Cambria Math" panose="02040503050406030204" pitchFamily="18" charset="0"/>
+                            </a:rPr>
+                            <m:t> −</m:t>
+                          </m:r>
+                          <m:f>
+                            <m:fPr>
+                              <m:ctrlPr>
+                                <a:rPr lang="fr-FR" sz="1200" b="0" i="1" smtClean="0">
+                                  <a:latin typeface="Cambria Math" panose="02040503050406030204" pitchFamily="18" charset="0"/>
+                                </a:rPr>
+                              </m:ctrlPr>
+                            </m:fPr>
+                            <m:num>
+                              <m:r>
+                                <a:rPr lang="fr-FR" sz="1200" b="0" i="1" smtClean="0">
+                                  <a:latin typeface="Cambria Math" panose="02040503050406030204" pitchFamily="18" charset="0"/>
+                                </a:rPr>
+                                <m:t>𝑤</m:t>
+                              </m:r>
+                            </m:num>
+                            <m:den>
+                              <m:r>
+                                <a:rPr lang="fr-FR" sz="1200" b="0" i="1" smtClean="0">
+                                  <a:latin typeface="Cambria Math" panose="02040503050406030204" pitchFamily="18" charset="0"/>
+                                </a:rPr>
+                                <m:t>2</m:t>
+                              </m:r>
+                            </m:den>
+                          </m:f>
+                        </m:num>
+                        <m:den>
+                          <m:f>
+                            <m:fPr>
+                              <m:ctrlPr>
+                                <a:rPr lang="fr-FR" sz="1200" i="1">
+                                  <a:latin typeface="Cambria Math" panose="02040503050406030204" pitchFamily="18" charset="0"/>
+                                </a:rPr>
+                              </m:ctrlPr>
+                            </m:fPr>
+                            <m:num>
+                              <m:r>
+                                <a:rPr lang="fr-FR" sz="1200" i="1">
+                                  <a:latin typeface="Cambria Math" panose="02040503050406030204" pitchFamily="18" charset="0"/>
+                                </a:rPr>
+                                <m:t>𝑤</m:t>
+                              </m:r>
+                            </m:num>
+                            <m:den>
+                              <m:r>
+                                <a:rPr lang="fr-FR" sz="1200" i="1">
+                                  <a:latin typeface="Cambria Math" panose="02040503050406030204" pitchFamily="18" charset="0"/>
+                                </a:rPr>
+                                <m:t>2</m:t>
+                              </m:r>
+                            </m:den>
+                          </m:f>
+                        </m:den>
+                      </m:f>
+                      <m:r>
+                        <a:rPr lang="fr-FR" sz="1200" b="0" i="1" smtClean="0">
+                          <a:latin typeface="Cambria Math" panose="02040503050406030204" pitchFamily="18" charset="0"/>
+                        </a:rPr>
+                        <m:t> ∗ </m:t>
+                      </m:r>
+                      <m:f>
+                        <m:fPr>
+                          <m:ctrlPr>
+                            <a:rPr lang="fr-FR" sz="1200" b="0" i="1" smtClean="0">
+                              <a:latin typeface="Cambria Math" panose="02040503050406030204" pitchFamily="18" charset="0"/>
+                            </a:rPr>
+                          </m:ctrlPr>
+                        </m:fPr>
+                        <m:num>
+                          <m:r>
+                            <a:rPr lang="fr-FR" sz="1200" b="0" i="1" smtClean="0">
+                              <a:latin typeface="Cambria Math" panose="02040503050406030204" pitchFamily="18" charset="0"/>
+                              <a:ea typeface="Cambria Math" panose="02040503050406030204" pitchFamily="18" charset="0"/>
+                            </a:rPr>
+                            <m:t>𝛽</m:t>
+                          </m:r>
+                        </m:num>
+                        <m:den>
+                          <m:r>
+                            <a:rPr lang="fr-FR" sz="1200" b="0" i="1" smtClean="0">
+                              <a:latin typeface="Cambria Math" panose="02040503050406030204" pitchFamily="18" charset="0"/>
+                            </a:rPr>
+                            <m:t>2</m:t>
+                          </m:r>
+                        </m:den>
+                      </m:f>
+                    </m:oMath>
+                  </m:oMathPara>
+                </a14:m>
+                <a:endParaRPr lang="fr-FR" sz="1200" dirty="0"/>
+              </a:p>
+            </p:txBody>
+          </p:sp>
+        </mc:Choice>
+        <mc:Fallback>
+          <p:sp>
+            <p:nvSpPr>
+              <p:cNvPr id="46" name="ZoneTexte 45">
+                <a:extLst>
+                  <a:ext uri="{FF2B5EF4-FFF2-40B4-BE49-F238E27FC236}">
+                    <a16:creationId xmlns:a16="http://schemas.microsoft.com/office/drawing/2014/main" id="{950D597A-727E-C16B-0C9D-485F334A65D2}"/>
+                  </a:ext>
+                </a:extLst>
+              </p:cNvPr>
+              <p:cNvSpPr txBox="1">
+                <a:spLocks noRot="1" noChangeAspect="1" noMove="1" noResize="1" noEditPoints="1" noAdjustHandles="1" noChangeArrowheads="1" noChangeShapeType="1" noTextEdit="1"/>
+              </p:cNvSpPr>
+              <p:nvPr/>
+            </p:nvSpPr>
+            <p:spPr>
+              <a:xfrm>
+                <a:off x="9552147" y="3632794"/>
+                <a:ext cx="1395126" cy="642740"/>
+              </a:xfrm>
+              <a:prstGeom prst="rect">
+                <a:avLst/>
+              </a:prstGeom>
+              <a:blipFill>
+                <a:blip r:embed="rId4"/>
+                <a:stretch>
+                  <a:fillRect/>
+                </a:stretch>
+              </a:blipFill>
+            </p:spPr>
+            <p:txBody>
+              <a:bodyPr/>
+              <a:lstStyle/>
+              <a:p>
+                <a:r>
+                  <a:rPr lang="fr-FR">
+                    <a:noFill/>
+                  </a:rPr>
+                  <a:t> </a:t>
+                </a:r>
+              </a:p>
+            </p:txBody>
+          </p:sp>
+        </mc:Fallback>
+      </mc:AlternateContent>
+      <p:sp>
+        <p:nvSpPr>
+          <p:cNvPr id="47" name="ZoneTexte 46">
+            <a:extLst>
+              <a:ext uri="{FF2B5EF4-FFF2-40B4-BE49-F238E27FC236}">
+                <a16:creationId xmlns:a16="http://schemas.microsoft.com/office/drawing/2014/main" id="{16B49964-5BAE-74FC-ABCA-C2D07050D051}"/>
+              </a:ext>
+            </a:extLst>
+          </p:cNvPr>
+          <p:cNvSpPr txBox="1"/>
+          <p:nvPr/>
+        </p:nvSpPr>
+        <p:spPr>
+          <a:xfrm>
+            <a:off x="6609673" y="6479657"/>
+            <a:ext cx="3027495" cy="276999"/>
+          </a:xfrm>
+          <a:prstGeom prst="rect">
+            <a:avLst/>
+          </a:prstGeom>
+          <a:noFill/>
+        </p:spPr>
+        <p:txBody>
+          <a:bodyPr wrap="none" rtlCol="0">
+            <a:spAutoFit/>
+          </a:bodyPr>
+          <a:lstStyle/>
+          <a:p>
+            <a:r>
+              <a:rPr lang="el-GR" sz="1200" dirty="0">
+                <a:solidFill>
+                  <a:srgbClr val="FF0000"/>
+                </a:solidFill>
+              </a:rPr>
+              <a:t>α</a:t>
+            </a:r>
+            <a:r>
+              <a:rPr lang="fr-FR" sz="1200" dirty="0">
+                <a:solidFill>
+                  <a:srgbClr val="FF0000"/>
+                </a:solidFill>
+              </a:rPr>
+              <a:t>, β, f : paramètre intrinsèque de la caméra</a:t>
+            </a:r>
+          </a:p>
+        </p:txBody>
+      </p:sp>
+      <mc:AlternateContent xmlns:mc="http://schemas.openxmlformats.org/markup-compatibility/2006">
+        <mc:Choice xmlns:a14="http://schemas.microsoft.com/office/drawing/2010/main" Requires="a14">
+          <p:sp>
+            <p:nvSpPr>
+              <p:cNvPr id="6" name="ZoneTexte 5">
+                <a:extLst>
+                  <a:ext uri="{FF2B5EF4-FFF2-40B4-BE49-F238E27FC236}">
+                    <a16:creationId xmlns:a16="http://schemas.microsoft.com/office/drawing/2014/main" id="{8AE2CB02-C9BD-B489-E5D2-A37F06FBB50E}"/>
+                  </a:ext>
+                </a:extLst>
+              </p:cNvPr>
+              <p:cNvSpPr txBox="1"/>
+              <p:nvPr/>
+            </p:nvSpPr>
+            <p:spPr>
+              <a:xfrm>
+                <a:off x="9691541" y="4515549"/>
+                <a:ext cx="1027910" cy="383438"/>
+              </a:xfrm>
+              <a:prstGeom prst="rect">
+                <a:avLst/>
+              </a:prstGeom>
+              <a:noFill/>
+            </p:spPr>
+            <p:txBody>
+              <a:bodyPr wrap="none" lIns="0" tIns="0" rIns="0" bIns="0" rtlCol="0">
+                <a:spAutoFit/>
+              </a:bodyPr>
+              <a:lstStyle/>
+              <a:p>
+                <a14:m>
+                  <m:oMathPara xmlns:m="http://schemas.openxmlformats.org/officeDocument/2006/math">
+                    <m:oMathParaPr>
+                      <m:jc m:val="centerGroup"/>
+                    </m:oMathParaPr>
+                    <m:oMath xmlns:m="http://schemas.openxmlformats.org/officeDocument/2006/math">
+                      <m:r>
+                        <a:rPr lang="fr-FR" sz="1200" b="0" i="1" smtClean="0">
+                          <a:latin typeface="Cambria Math" panose="02040503050406030204" pitchFamily="18" charset="0"/>
+                        </a:rPr>
+                        <m:t>𝐷</m:t>
+                      </m:r>
+                      <m:r>
+                        <a:rPr lang="fr-FR" sz="1200" b="0" i="1" smtClean="0">
+                          <a:latin typeface="Cambria Math" panose="02040503050406030204" pitchFamily="18" charset="0"/>
+                        </a:rPr>
+                        <m:t>= </m:t>
+                      </m:r>
+                      <m:f>
+                        <m:fPr>
+                          <m:ctrlPr>
+                            <a:rPr lang="fr-FR" sz="1200" b="0" i="1" smtClean="0">
+                              <a:latin typeface="Cambria Math" panose="02040503050406030204" pitchFamily="18" charset="0"/>
+                            </a:rPr>
+                          </m:ctrlPr>
+                        </m:fPr>
+                        <m:num>
+                          <m:r>
+                            <a:rPr lang="fr-FR" sz="1200" b="0" i="1" smtClean="0">
+                              <a:latin typeface="Cambria Math" panose="02040503050406030204" pitchFamily="18" charset="0"/>
+                            </a:rPr>
+                            <m:t>𝑓</m:t>
+                          </m:r>
+                          <m:r>
+                            <a:rPr lang="fr-FR" sz="1200" b="0" i="1" smtClean="0">
+                              <a:latin typeface="Cambria Math" panose="02040503050406030204" pitchFamily="18" charset="0"/>
+                            </a:rPr>
+                            <m:t>∗</m:t>
+                          </m:r>
+                          <m:r>
+                            <a:rPr lang="fr-FR" sz="1200" b="0" i="1" smtClean="0">
+                              <a:latin typeface="Cambria Math" panose="02040503050406030204" pitchFamily="18" charset="0"/>
+                            </a:rPr>
+                            <m:t>𝑊𝑖𝑚𝑔</m:t>
+                          </m:r>
+                        </m:num>
+                        <m:den>
+                          <m:r>
+                            <a:rPr lang="fr-FR" sz="1200" b="0" i="1" smtClean="0">
+                              <a:latin typeface="Cambria Math" panose="02040503050406030204" pitchFamily="18" charset="0"/>
+                            </a:rPr>
+                            <m:t>𝑊𝑜𝑏𝑗</m:t>
+                          </m:r>
+                        </m:den>
+                      </m:f>
+                    </m:oMath>
+                  </m:oMathPara>
+                </a14:m>
+                <a:endParaRPr lang="fr-FR" sz="1200" dirty="0"/>
+              </a:p>
+            </p:txBody>
+          </p:sp>
+        </mc:Choice>
+        <mc:Fallback>
+          <p:sp>
+            <p:nvSpPr>
+              <p:cNvPr id="6" name="ZoneTexte 5">
+                <a:extLst>
+                  <a:ext uri="{FF2B5EF4-FFF2-40B4-BE49-F238E27FC236}">
+                    <a16:creationId xmlns:a16="http://schemas.microsoft.com/office/drawing/2014/main" id="{8AE2CB02-C9BD-B489-E5D2-A37F06FBB50E}"/>
+                  </a:ext>
+                </a:extLst>
+              </p:cNvPr>
+              <p:cNvSpPr txBox="1">
+                <a:spLocks noRot="1" noChangeAspect="1" noMove="1" noResize="1" noEditPoints="1" noAdjustHandles="1" noChangeArrowheads="1" noChangeShapeType="1" noTextEdit="1"/>
+              </p:cNvSpPr>
+              <p:nvPr/>
+            </p:nvSpPr>
+            <p:spPr>
+              <a:xfrm>
+                <a:off x="9691541" y="4515549"/>
+                <a:ext cx="1027910" cy="383438"/>
+              </a:xfrm>
+              <a:prstGeom prst="rect">
+                <a:avLst/>
+              </a:prstGeom>
+              <a:blipFill>
+                <a:blip r:embed="rId5"/>
+                <a:stretch>
+                  <a:fillRect l="-3571" t="-6349" r="-4762" b="-17460"/>
+                </a:stretch>
+              </a:blipFill>
+            </p:spPr>
+            <p:txBody>
+              <a:bodyPr/>
+              <a:lstStyle/>
+              <a:p>
+                <a:r>
+                  <a:rPr lang="fr-FR">
+                    <a:noFill/>
+                  </a:rPr>
+                  <a:t> </a:t>
+                </a:r>
+              </a:p>
+            </p:txBody>
+          </p:sp>
+        </mc:Fallback>
+      </mc:AlternateContent>
+      <mc:AlternateContent xmlns:mc="http://schemas.openxmlformats.org/markup-compatibility/2006">
+        <mc:Choice xmlns:a14="http://schemas.microsoft.com/office/drawing/2010/main" Requires="a14">
+          <p:sp>
+            <p:nvSpPr>
+              <p:cNvPr id="7" name="ZoneTexte 6">
+                <a:extLst>
+                  <a:ext uri="{FF2B5EF4-FFF2-40B4-BE49-F238E27FC236}">
+                    <a16:creationId xmlns:a16="http://schemas.microsoft.com/office/drawing/2014/main" id="{AC02EE02-BB33-939E-8F02-B016CE8503F4}"/>
+                  </a:ext>
+                </a:extLst>
+              </p:cNvPr>
+              <p:cNvSpPr txBox="1"/>
+              <p:nvPr/>
+            </p:nvSpPr>
+            <p:spPr>
+              <a:xfrm>
+                <a:off x="9691541" y="5677800"/>
+                <a:ext cx="1102994" cy="184666"/>
+              </a:xfrm>
+              <a:prstGeom prst="rect">
+                <a:avLst/>
+              </a:prstGeom>
+              <a:noFill/>
+            </p:spPr>
+            <p:txBody>
+              <a:bodyPr wrap="none" lIns="0" tIns="0" rIns="0" bIns="0" rtlCol="0">
+                <a:spAutoFit/>
+              </a:bodyPr>
+              <a:lstStyle/>
+              <a:p>
+                <a14:m>
+                  <m:oMathPara xmlns:m="http://schemas.openxmlformats.org/officeDocument/2006/math">
+                    <m:oMathParaPr>
+                      <m:jc m:val="centerGroup"/>
+                    </m:oMathParaPr>
+                    <m:oMath xmlns:m="http://schemas.openxmlformats.org/officeDocument/2006/math">
+                      <m:r>
+                        <a:rPr lang="fr-FR" sz="1200" b="0" i="1" smtClean="0">
+                          <a:latin typeface="Cambria Math" panose="02040503050406030204" pitchFamily="18" charset="0"/>
+                        </a:rPr>
+                        <m:t>𝑋</m:t>
+                      </m:r>
+                      <m:r>
+                        <a:rPr lang="fr-FR" sz="1200" b="0" i="1" smtClean="0">
+                          <a:latin typeface="Cambria Math" panose="02040503050406030204" pitchFamily="18" charset="0"/>
+                        </a:rPr>
+                        <m:t>=</m:t>
+                      </m:r>
+                      <m:r>
+                        <a:rPr lang="fr-FR" sz="1200" b="0" i="1" smtClean="0">
+                          <a:latin typeface="Cambria Math" panose="02040503050406030204" pitchFamily="18" charset="0"/>
+                        </a:rPr>
+                        <m:t>𝐷</m:t>
+                      </m:r>
+                      <m:r>
+                        <a:rPr lang="fr-FR" sz="1200" b="0" i="1" smtClean="0">
+                          <a:latin typeface="Cambria Math" panose="02040503050406030204" pitchFamily="18" charset="0"/>
+                        </a:rPr>
+                        <m:t>∗</m:t>
+                      </m:r>
+                      <m:r>
+                        <m:rPr>
+                          <m:sty m:val="p"/>
+                        </m:rPr>
+                        <a:rPr lang="fr-FR" sz="1200" b="0" i="0" smtClean="0">
+                          <a:latin typeface="Cambria Math" panose="02040503050406030204" pitchFamily="18" charset="0"/>
+                        </a:rPr>
+                        <m:t>tan</m:t>
+                      </m:r>
+                      <m:r>
+                        <a:rPr lang="fr-FR" sz="1200" b="0" i="1" smtClean="0">
+                          <a:latin typeface="Cambria Math" panose="02040503050406030204" pitchFamily="18" charset="0"/>
+                        </a:rPr>
+                        <m:t>⁡(</m:t>
+                      </m:r>
+                      <m:r>
+                        <a:rPr lang="fr-FR" sz="1200" b="0" i="1" smtClean="0">
+                          <a:latin typeface="Cambria Math" panose="02040503050406030204" pitchFamily="18" charset="0"/>
+                          <a:ea typeface="Cambria Math" panose="02040503050406030204" pitchFamily="18" charset="0"/>
+                        </a:rPr>
+                        <m:t>𝜃</m:t>
+                      </m:r>
+                      <m:r>
+                        <a:rPr lang="fr-FR" sz="1200" b="0" i="1" smtClean="0">
+                          <a:latin typeface="Cambria Math" panose="02040503050406030204" pitchFamily="18" charset="0"/>
+                          <a:ea typeface="Cambria Math" panose="02040503050406030204" pitchFamily="18" charset="0"/>
+                        </a:rPr>
+                        <m:t>𝑥</m:t>
+                      </m:r>
+                      <m:r>
+                        <a:rPr lang="fr-FR" sz="1200" b="0" i="1" smtClean="0">
+                          <a:latin typeface="Cambria Math" panose="02040503050406030204" pitchFamily="18" charset="0"/>
+                          <a:ea typeface="Cambria Math" panose="02040503050406030204" pitchFamily="18" charset="0"/>
+                        </a:rPr>
+                        <m:t>)</m:t>
+                      </m:r>
+                    </m:oMath>
+                  </m:oMathPara>
+                </a14:m>
+                <a:endParaRPr lang="fr-FR" sz="1200" dirty="0"/>
+              </a:p>
+            </p:txBody>
+          </p:sp>
+        </mc:Choice>
+        <mc:Fallback>
+          <p:sp>
+            <p:nvSpPr>
+              <p:cNvPr id="7" name="ZoneTexte 6">
+                <a:extLst>
+                  <a:ext uri="{FF2B5EF4-FFF2-40B4-BE49-F238E27FC236}">
+                    <a16:creationId xmlns:a16="http://schemas.microsoft.com/office/drawing/2014/main" id="{AC02EE02-BB33-939E-8F02-B016CE8503F4}"/>
+                  </a:ext>
+                </a:extLst>
+              </p:cNvPr>
+              <p:cNvSpPr txBox="1">
+                <a:spLocks noRot="1" noChangeAspect="1" noMove="1" noResize="1" noEditPoints="1" noAdjustHandles="1" noChangeArrowheads="1" noChangeShapeType="1" noTextEdit="1"/>
+              </p:cNvSpPr>
+              <p:nvPr/>
+            </p:nvSpPr>
+            <p:spPr>
+              <a:xfrm>
+                <a:off x="9691541" y="5677800"/>
+                <a:ext cx="1102994" cy="184666"/>
+              </a:xfrm>
+              <a:prstGeom prst="rect">
+                <a:avLst/>
+              </a:prstGeom>
+              <a:blipFill>
+                <a:blip r:embed="rId6"/>
+                <a:stretch>
+                  <a:fillRect l="-3315" t="-3226" r="-4420" b="-35484"/>
+                </a:stretch>
+              </a:blipFill>
+            </p:spPr>
+            <p:txBody>
+              <a:bodyPr/>
+              <a:lstStyle/>
+              <a:p>
+                <a:r>
+                  <a:rPr lang="fr-FR">
+                    <a:noFill/>
+                  </a:rPr>
+                  <a:t> </a:t>
+                </a:r>
+              </a:p>
+            </p:txBody>
+          </p:sp>
+        </mc:Fallback>
+      </mc:AlternateContent>
+      <p:sp>
+        <p:nvSpPr>
+          <p:cNvPr id="9" name="ZoneTexte 8">
+            <a:extLst>
+              <a:ext uri="{FF2B5EF4-FFF2-40B4-BE49-F238E27FC236}">
+                <a16:creationId xmlns:a16="http://schemas.microsoft.com/office/drawing/2014/main" id="{487C2527-DCF8-21AE-D6C5-C03C0E9473D3}"/>
+              </a:ext>
+            </a:extLst>
+          </p:cNvPr>
+          <p:cNvSpPr txBox="1"/>
+          <p:nvPr/>
+        </p:nvSpPr>
+        <p:spPr>
+          <a:xfrm>
+            <a:off x="9552147" y="4187194"/>
+            <a:ext cx="1260345" cy="276999"/>
+          </a:xfrm>
+          <a:prstGeom prst="rect">
+            <a:avLst/>
+          </a:prstGeom>
+          <a:noFill/>
+        </p:spPr>
+        <p:txBody>
+          <a:bodyPr wrap="none" rtlCol="0">
+            <a:spAutoFit/>
+          </a:bodyPr>
+          <a:lstStyle/>
+          <a:p>
+            <a:r>
+              <a:rPr lang="fr-FR" sz="1200" b="1" u="sng" dirty="0"/>
+              <a:t>Distance</a:t>
+            </a:r>
+            <a:r>
+              <a:rPr lang="fr-FR" sz="1200" u="sng" dirty="0"/>
+              <a:t> objet :</a:t>
+            </a:r>
+          </a:p>
+        </p:txBody>
+      </p:sp>
+      <p:sp>
+        <p:nvSpPr>
+          <p:cNvPr id="10" name="ZoneTexte 9">
+            <a:extLst>
+              <a:ext uri="{FF2B5EF4-FFF2-40B4-BE49-F238E27FC236}">
+                <a16:creationId xmlns:a16="http://schemas.microsoft.com/office/drawing/2014/main" id="{9278EE38-407B-73FD-752F-1F19E3AFC9E3}"/>
+              </a:ext>
+            </a:extLst>
+          </p:cNvPr>
+          <p:cNvSpPr txBox="1"/>
+          <p:nvPr/>
+        </p:nvSpPr>
+        <p:spPr>
+          <a:xfrm>
+            <a:off x="9549798" y="4933553"/>
+            <a:ext cx="2505353" cy="646331"/>
+          </a:xfrm>
+          <a:prstGeom prst="rect">
+            <a:avLst/>
+          </a:prstGeom>
+          <a:noFill/>
+        </p:spPr>
+        <p:txBody>
+          <a:bodyPr wrap="square" rtlCol="0">
+            <a:spAutoFit/>
+          </a:bodyPr>
+          <a:lstStyle/>
+          <a:p>
+            <a:r>
+              <a:rPr lang="fr-FR" sz="1200" b="1" u="sng" dirty="0"/>
+              <a:t>Position</a:t>
+            </a:r>
+            <a:r>
+              <a:rPr lang="fr-FR" sz="1200" u="sng" dirty="0"/>
+              <a:t> absolue (rajouter les coordonnées drone pour avoir dans le repère </a:t>
+            </a:r>
+            <a:r>
+              <a:rPr lang="fr-FR" sz="1200" u="sng" dirty="0" err="1"/>
+              <a:t>opti</a:t>
+            </a:r>
+            <a:r>
+              <a:rPr lang="fr-FR" sz="1200" u="sng" dirty="0"/>
+              <a:t>):</a:t>
+            </a:r>
+          </a:p>
+        </p:txBody>
+      </p:sp>
+      <mc:AlternateContent xmlns:mc="http://schemas.openxmlformats.org/markup-compatibility/2006">
+        <mc:Choice xmlns:a14="http://schemas.microsoft.com/office/drawing/2010/main" Requires="a14">
+          <p:sp>
+            <p:nvSpPr>
+              <p:cNvPr id="11" name="ZoneTexte 10">
+                <a:extLst>
+                  <a:ext uri="{FF2B5EF4-FFF2-40B4-BE49-F238E27FC236}">
+                    <a16:creationId xmlns:a16="http://schemas.microsoft.com/office/drawing/2014/main" id="{70D825BB-8081-DD88-88DB-AB45E09D7668}"/>
+                  </a:ext>
+                </a:extLst>
+              </p:cNvPr>
+              <p:cNvSpPr txBox="1"/>
+              <p:nvPr/>
+            </p:nvSpPr>
+            <p:spPr>
+              <a:xfrm>
+                <a:off x="9697887" y="5940392"/>
+                <a:ext cx="1099340" cy="184666"/>
+              </a:xfrm>
+              <a:prstGeom prst="rect">
+                <a:avLst/>
+              </a:prstGeom>
+              <a:noFill/>
+            </p:spPr>
+            <p:txBody>
+              <a:bodyPr wrap="none" lIns="0" tIns="0" rIns="0" bIns="0" rtlCol="0">
+                <a:spAutoFit/>
+              </a:bodyPr>
+              <a:lstStyle/>
+              <a:p>
+                <a14:m>
+                  <m:oMathPara xmlns:m="http://schemas.openxmlformats.org/officeDocument/2006/math">
+                    <m:oMathParaPr>
+                      <m:jc m:val="centerGroup"/>
+                    </m:oMathParaPr>
+                    <m:oMath xmlns:m="http://schemas.openxmlformats.org/officeDocument/2006/math">
+                      <m:r>
+                        <a:rPr lang="fr-FR" sz="1200" b="0" i="1" smtClean="0">
+                          <a:latin typeface="Cambria Math" panose="02040503050406030204" pitchFamily="18" charset="0"/>
+                        </a:rPr>
+                        <m:t>𝑌</m:t>
+                      </m:r>
+                      <m:r>
+                        <a:rPr lang="fr-FR" sz="1200" b="0" i="1" smtClean="0">
+                          <a:latin typeface="Cambria Math" panose="02040503050406030204" pitchFamily="18" charset="0"/>
+                        </a:rPr>
+                        <m:t>=</m:t>
+                      </m:r>
+                      <m:r>
+                        <a:rPr lang="fr-FR" sz="1200" b="0" i="1" smtClean="0">
+                          <a:latin typeface="Cambria Math" panose="02040503050406030204" pitchFamily="18" charset="0"/>
+                        </a:rPr>
+                        <m:t>𝐷</m:t>
+                      </m:r>
+                      <m:r>
+                        <a:rPr lang="fr-FR" sz="1200" b="0" i="1" smtClean="0">
+                          <a:latin typeface="Cambria Math" panose="02040503050406030204" pitchFamily="18" charset="0"/>
+                        </a:rPr>
+                        <m:t>∗</m:t>
+                      </m:r>
+                      <m:r>
+                        <m:rPr>
+                          <m:sty m:val="p"/>
+                        </m:rPr>
+                        <a:rPr lang="fr-FR" sz="1200" b="0" i="0" smtClean="0">
+                          <a:latin typeface="Cambria Math" panose="02040503050406030204" pitchFamily="18" charset="0"/>
+                        </a:rPr>
+                        <m:t>tan</m:t>
+                      </m:r>
+                      <m:r>
+                        <a:rPr lang="fr-FR" sz="1200" b="0" i="1" smtClean="0">
+                          <a:latin typeface="Cambria Math" panose="02040503050406030204" pitchFamily="18" charset="0"/>
+                        </a:rPr>
+                        <m:t>⁡(</m:t>
+                      </m:r>
+                      <m:r>
+                        <a:rPr lang="fr-FR" sz="1200" b="0" i="1" smtClean="0">
+                          <a:latin typeface="Cambria Math" panose="02040503050406030204" pitchFamily="18" charset="0"/>
+                          <a:ea typeface="Cambria Math" panose="02040503050406030204" pitchFamily="18" charset="0"/>
+                        </a:rPr>
+                        <m:t>𝜃</m:t>
+                      </m:r>
+                      <m:r>
+                        <a:rPr lang="fr-FR" sz="1200" b="0" i="1" smtClean="0">
+                          <a:latin typeface="Cambria Math" panose="02040503050406030204" pitchFamily="18" charset="0"/>
+                          <a:ea typeface="Cambria Math" panose="02040503050406030204" pitchFamily="18" charset="0"/>
+                        </a:rPr>
+                        <m:t>𝑦</m:t>
+                      </m:r>
+                      <m:r>
+                        <a:rPr lang="fr-FR" sz="1200" b="0" i="1" smtClean="0">
+                          <a:latin typeface="Cambria Math" panose="02040503050406030204" pitchFamily="18" charset="0"/>
+                          <a:ea typeface="Cambria Math" panose="02040503050406030204" pitchFamily="18" charset="0"/>
+                        </a:rPr>
+                        <m:t>)</m:t>
+                      </m:r>
+                    </m:oMath>
+                  </m:oMathPara>
+                </a14:m>
+                <a:endParaRPr lang="fr-FR" sz="1200" dirty="0"/>
+              </a:p>
+            </p:txBody>
+          </p:sp>
+        </mc:Choice>
+        <mc:Fallback>
+          <p:sp>
+            <p:nvSpPr>
+              <p:cNvPr id="11" name="ZoneTexte 10">
+                <a:extLst>
+                  <a:ext uri="{FF2B5EF4-FFF2-40B4-BE49-F238E27FC236}">
+                    <a16:creationId xmlns:a16="http://schemas.microsoft.com/office/drawing/2014/main" id="{70D825BB-8081-DD88-88DB-AB45E09D7668}"/>
+                  </a:ext>
+                </a:extLst>
+              </p:cNvPr>
+              <p:cNvSpPr txBox="1">
+                <a:spLocks noRot="1" noChangeAspect="1" noMove="1" noResize="1" noEditPoints="1" noAdjustHandles="1" noChangeArrowheads="1" noChangeShapeType="1" noTextEdit="1"/>
+              </p:cNvSpPr>
+              <p:nvPr/>
+            </p:nvSpPr>
+            <p:spPr>
+              <a:xfrm>
+                <a:off x="9697887" y="5940392"/>
+                <a:ext cx="1099340" cy="184666"/>
+              </a:xfrm>
+              <a:prstGeom prst="rect">
+                <a:avLst/>
+              </a:prstGeom>
+              <a:blipFill>
+                <a:blip r:embed="rId7"/>
+                <a:stretch>
+                  <a:fillRect l="-3333" t="-3226" r="-4444" b="-35484"/>
+                </a:stretch>
+              </a:blipFill>
+            </p:spPr>
+            <p:txBody>
+              <a:bodyPr/>
+              <a:lstStyle/>
+              <a:p>
+                <a:r>
+                  <a:rPr lang="fr-FR">
+                    <a:noFill/>
+                  </a:rPr>
+                  <a:t> </a:t>
+                </a:r>
+              </a:p>
+            </p:txBody>
+          </p:sp>
+        </mc:Fallback>
+      </mc:AlternateContent>
+      <mc:AlternateContent xmlns:mc="http://schemas.openxmlformats.org/markup-compatibility/2006">
+        <mc:Choice xmlns:a14="http://schemas.microsoft.com/office/drawing/2010/main" Requires="a14">
+          <p:sp>
+            <p:nvSpPr>
+              <p:cNvPr id="12" name="ZoneTexte 11">
+                <a:extLst>
+                  <a:ext uri="{FF2B5EF4-FFF2-40B4-BE49-F238E27FC236}">
+                    <a16:creationId xmlns:a16="http://schemas.microsoft.com/office/drawing/2014/main" id="{79727652-B570-89DB-86E7-2186F7C4F27F}"/>
+                  </a:ext>
+                </a:extLst>
+              </p:cNvPr>
+              <p:cNvSpPr txBox="1"/>
+              <p:nvPr/>
+            </p:nvSpPr>
+            <p:spPr>
+              <a:xfrm>
+                <a:off x="9697887" y="6183659"/>
+                <a:ext cx="438453" cy="184666"/>
+              </a:xfrm>
+              <a:prstGeom prst="rect">
+                <a:avLst/>
+              </a:prstGeom>
+              <a:noFill/>
+            </p:spPr>
+            <p:txBody>
+              <a:bodyPr wrap="none" lIns="0" tIns="0" rIns="0" bIns="0" rtlCol="0">
+                <a:spAutoFit/>
+              </a:bodyPr>
+              <a:lstStyle/>
+              <a:p>
+                <a14:m>
+                  <m:oMathPara xmlns:m="http://schemas.openxmlformats.org/officeDocument/2006/math">
+                    <m:oMathParaPr>
+                      <m:jc m:val="centerGroup"/>
+                    </m:oMathParaPr>
+                    <m:oMath xmlns:m="http://schemas.openxmlformats.org/officeDocument/2006/math">
+                      <m:r>
+                        <a:rPr lang="fr-FR" sz="1200" b="0" i="1" smtClean="0">
+                          <a:latin typeface="Cambria Math" panose="02040503050406030204" pitchFamily="18" charset="0"/>
+                        </a:rPr>
+                        <m:t>𝑍</m:t>
+                      </m:r>
+                      <m:r>
+                        <a:rPr lang="fr-FR" sz="1200" b="0" i="1" smtClean="0">
+                          <a:latin typeface="Cambria Math" panose="02040503050406030204" pitchFamily="18" charset="0"/>
+                        </a:rPr>
+                        <m:t>=</m:t>
+                      </m:r>
+                      <m:r>
+                        <a:rPr lang="fr-FR" sz="1200" b="0" i="1" smtClean="0">
+                          <a:latin typeface="Cambria Math" panose="02040503050406030204" pitchFamily="18" charset="0"/>
+                        </a:rPr>
+                        <m:t>𝐷</m:t>
+                      </m:r>
+                    </m:oMath>
+                  </m:oMathPara>
+                </a14:m>
+                <a:endParaRPr lang="fr-FR" sz="1200" dirty="0"/>
+              </a:p>
+            </p:txBody>
+          </p:sp>
+        </mc:Choice>
+        <mc:Fallback>
+          <p:sp>
+            <p:nvSpPr>
+              <p:cNvPr id="12" name="ZoneTexte 11">
+                <a:extLst>
+                  <a:ext uri="{FF2B5EF4-FFF2-40B4-BE49-F238E27FC236}">
+                    <a16:creationId xmlns:a16="http://schemas.microsoft.com/office/drawing/2014/main" id="{79727652-B570-89DB-86E7-2186F7C4F27F}"/>
+                  </a:ext>
+                </a:extLst>
+              </p:cNvPr>
+              <p:cNvSpPr txBox="1">
+                <a:spLocks noRot="1" noChangeAspect="1" noMove="1" noResize="1" noEditPoints="1" noAdjustHandles="1" noChangeArrowheads="1" noChangeShapeType="1" noTextEdit="1"/>
+              </p:cNvSpPr>
+              <p:nvPr/>
+            </p:nvSpPr>
+            <p:spPr>
+              <a:xfrm>
+                <a:off x="9697887" y="6183659"/>
+                <a:ext cx="438453" cy="184666"/>
+              </a:xfrm>
+              <a:prstGeom prst="rect">
+                <a:avLst/>
+              </a:prstGeom>
+              <a:blipFill>
+                <a:blip r:embed="rId8"/>
+                <a:stretch>
+                  <a:fillRect l="-8333" r="-6944" b="-3226"/>
+                </a:stretch>
+              </a:blipFill>
+            </p:spPr>
+            <p:txBody>
+              <a:bodyPr/>
+              <a:lstStyle/>
+              <a:p>
+                <a:r>
+                  <a:rPr lang="fr-FR">
+                    <a:noFill/>
+                  </a:rPr>
+                  <a:t> </a:t>
+                </a:r>
+              </a:p>
+            </p:txBody>
+          </p:sp>
+        </mc:Fallback>
+      </mc:AlternateContent>
+      <mc:AlternateContent xmlns:mc="http://schemas.openxmlformats.org/markup-compatibility/2006">
+        <mc:Choice xmlns:a14="http://schemas.microsoft.com/office/drawing/2010/main" Requires="a14">
+          <p:sp>
+            <p:nvSpPr>
+              <p:cNvPr id="14" name="ZoneTexte 13">
+                <a:extLst>
+                  <a:ext uri="{FF2B5EF4-FFF2-40B4-BE49-F238E27FC236}">
+                    <a16:creationId xmlns:a16="http://schemas.microsoft.com/office/drawing/2014/main" id="{C023C1A6-5973-D904-0C61-394A1587F015}"/>
+                  </a:ext>
+                </a:extLst>
+              </p:cNvPr>
+              <p:cNvSpPr txBox="1"/>
+              <p:nvPr/>
+            </p:nvSpPr>
+            <p:spPr>
+              <a:xfrm>
+                <a:off x="10794535" y="4530641"/>
+                <a:ext cx="994247" cy="383438"/>
+              </a:xfrm>
+              <a:prstGeom prst="rect">
+                <a:avLst/>
+              </a:prstGeom>
+              <a:noFill/>
+            </p:spPr>
+            <p:txBody>
+              <a:bodyPr wrap="none" lIns="0" tIns="0" rIns="0" bIns="0" rtlCol="0">
+                <a:spAutoFit/>
+              </a:bodyPr>
+              <a:lstStyle/>
+              <a:p>
+                <a14:m>
+                  <m:oMathPara xmlns:m="http://schemas.openxmlformats.org/officeDocument/2006/math">
+                    <m:oMathParaPr>
+                      <m:jc m:val="centerGroup"/>
+                    </m:oMathParaPr>
+                    <m:oMath xmlns:m="http://schemas.openxmlformats.org/officeDocument/2006/math">
+                      <m:r>
+                        <a:rPr lang="fr-FR" sz="1200" b="0" i="1" smtClean="0">
+                          <a:latin typeface="Cambria Math" panose="02040503050406030204" pitchFamily="18" charset="0"/>
+                        </a:rPr>
+                        <m:t>𝐷</m:t>
+                      </m:r>
+                      <m:r>
+                        <a:rPr lang="fr-FR" sz="1200" b="0" i="1" smtClean="0">
+                          <a:latin typeface="Cambria Math" panose="02040503050406030204" pitchFamily="18" charset="0"/>
+                        </a:rPr>
+                        <m:t>= </m:t>
+                      </m:r>
+                      <m:f>
+                        <m:fPr>
+                          <m:ctrlPr>
+                            <a:rPr lang="fr-FR" sz="1200" b="0" i="1" smtClean="0">
+                              <a:latin typeface="Cambria Math" panose="02040503050406030204" pitchFamily="18" charset="0"/>
+                            </a:rPr>
+                          </m:ctrlPr>
+                        </m:fPr>
+                        <m:num>
+                          <m:r>
+                            <a:rPr lang="fr-FR" sz="1200" b="0" i="1" smtClean="0">
+                              <a:latin typeface="Cambria Math" panose="02040503050406030204" pitchFamily="18" charset="0"/>
+                            </a:rPr>
+                            <m:t>𝑓</m:t>
+                          </m:r>
+                          <m:r>
+                            <a:rPr lang="fr-FR" sz="1200" b="0" i="1" smtClean="0">
+                              <a:latin typeface="Cambria Math" panose="02040503050406030204" pitchFamily="18" charset="0"/>
+                            </a:rPr>
+                            <m:t>∗</m:t>
+                          </m:r>
+                          <m:r>
+                            <a:rPr lang="fr-FR" sz="1200" b="0" i="1" smtClean="0">
+                              <a:latin typeface="Cambria Math" panose="02040503050406030204" pitchFamily="18" charset="0"/>
+                            </a:rPr>
+                            <m:t>𝐻𝑖𝑚𝑔</m:t>
+                          </m:r>
+                        </m:num>
+                        <m:den>
+                          <m:r>
+                            <a:rPr lang="fr-FR" sz="1200" b="0" i="1" smtClean="0">
+                              <a:latin typeface="Cambria Math" panose="02040503050406030204" pitchFamily="18" charset="0"/>
+                            </a:rPr>
+                            <m:t>𝐻𝑜𝑏𝑗</m:t>
+                          </m:r>
+                        </m:den>
+                      </m:f>
+                    </m:oMath>
+                  </m:oMathPara>
+                </a14:m>
+                <a:endParaRPr lang="fr-FR" sz="1200" dirty="0"/>
+              </a:p>
+            </p:txBody>
+          </p:sp>
+        </mc:Choice>
+        <mc:Fallback>
+          <p:sp>
+            <p:nvSpPr>
+              <p:cNvPr id="14" name="ZoneTexte 13">
+                <a:extLst>
+                  <a:ext uri="{FF2B5EF4-FFF2-40B4-BE49-F238E27FC236}">
+                    <a16:creationId xmlns:a16="http://schemas.microsoft.com/office/drawing/2014/main" id="{C023C1A6-5973-D904-0C61-394A1587F015}"/>
+                  </a:ext>
+                </a:extLst>
+              </p:cNvPr>
+              <p:cNvSpPr txBox="1">
+                <a:spLocks noRot="1" noChangeAspect="1" noMove="1" noResize="1" noEditPoints="1" noAdjustHandles="1" noChangeArrowheads="1" noChangeShapeType="1" noTextEdit="1"/>
+              </p:cNvSpPr>
+              <p:nvPr/>
+            </p:nvSpPr>
+            <p:spPr>
+              <a:xfrm>
+                <a:off x="10794535" y="4530641"/>
+                <a:ext cx="994247" cy="383438"/>
+              </a:xfrm>
+              <a:prstGeom prst="rect">
+                <a:avLst/>
+              </a:prstGeom>
+              <a:blipFill>
+                <a:blip r:embed="rId9"/>
+                <a:stretch>
+                  <a:fillRect l="-3681" t="-4762" r="-4294" b="-17460"/>
+                </a:stretch>
+              </a:blipFill>
+            </p:spPr>
+            <p:txBody>
+              <a:bodyPr/>
+              <a:lstStyle/>
+              <a:p>
+                <a:r>
+                  <a:rPr lang="fr-FR">
+                    <a:noFill/>
+                  </a:rPr>
+                  <a:t> </a:t>
+                </a:r>
+              </a:p>
+            </p:txBody>
+          </p:sp>
+        </mc:Fallback>
+      </mc:AlternateContent>
+    </p:spTree>
+    <p:extLst>
+      <p:ext uri="{BB962C8B-B14F-4D97-AF65-F5344CB8AC3E}">
+        <p14:creationId xmlns:p14="http://schemas.microsoft.com/office/powerpoint/2010/main" val="1428980678"/>
       </p:ext>
     </p:extLst>
   </p:cSld>

</xml_diff>

<commit_message>
matlab system cameraordinateur pptx quentin presentation
</commit_message>
<xml_diff>
--- a/Referentiel_Drone.pptx
+++ b/Referentiel_Drone.pptx
@@ -7,6 +7,14 @@
   <p:sldIdLst>
     <p:sldId id="256" r:id="rId2"/>
     <p:sldId id="257" r:id="rId3"/>
+    <p:sldId id="258" r:id="rId4"/>
+    <p:sldId id="259" r:id="rId5"/>
+    <p:sldId id="260" r:id="rId6"/>
+    <p:sldId id="261" r:id="rId7"/>
+    <p:sldId id="262" r:id="rId8"/>
+    <p:sldId id="263" r:id="rId9"/>
+    <p:sldId id="264" r:id="rId10"/>
+    <p:sldId id="265" r:id="rId11"/>
   </p:sldIdLst>
   <p:sldSz cx="12192000" cy="6858000"/>
   <p:notesSz cx="6858000" cy="9144000"/>
@@ -116,13 +124,285 @@
 <file path=ppt/revisionInfo.xml><?xml version="1.0" encoding="utf-8"?>
 <p1510:revInfo xmlns:a="http://schemas.openxmlformats.org/drawingml/2006/main" xmlns:r="http://schemas.openxmlformats.org/officeDocument/2006/relationships" xmlns:p1510="http://schemas.microsoft.com/office/powerpoint/2015/10/main">
   <p1510:revLst>
-    <p1510:client id="{07E99882-B2BF-4008-9622-A79916673A23}" v="208" dt="2024-06-18T07:08:34.967"/>
+    <p1510:client id="{69936BA1-B803-1841-961F-D9E0EE5E15FE}" v="13" dt="2024-06-19T14:41:44.070"/>
   </p1510:revLst>
 </p1510:revInfo>
 </file>
 
 <file path=ppt/changesInfos/changesInfo1.xml><?xml version="1.0" encoding="utf-8"?>
 <pc:chgInfo xmlns:a="http://schemas.openxmlformats.org/drawingml/2006/main" xmlns:r="http://schemas.openxmlformats.org/officeDocument/2006/relationships" xmlns:ac="http://schemas.microsoft.com/office/drawing/2013/main/command" xmlns:pc="http://schemas.microsoft.com/office/powerpoint/2013/main/command">
+  <pc:docChgLst>
+    <pc:chgData name="Quentin LANDON" userId="ebdf6100-7026-48c0-a530-f25f8df816c1" providerId="ADAL" clId="{69936BA1-B803-1841-961F-D9E0EE5E15FE}"/>
+    <pc:docChg chg="custSel addSld delSld modSld">
+      <pc:chgData name="Quentin LANDON" userId="ebdf6100-7026-48c0-a530-f25f8df816c1" providerId="ADAL" clId="{69936BA1-B803-1841-961F-D9E0EE5E15FE}" dt="2024-06-19T14:44:13.844" v="69" actId="478"/>
+      <pc:docMkLst>
+        <pc:docMk/>
+      </pc:docMkLst>
+      <pc:sldChg chg="addSp delSp modSp new mod">
+        <pc:chgData name="Quentin LANDON" userId="ebdf6100-7026-48c0-a530-f25f8df816c1" providerId="ADAL" clId="{69936BA1-B803-1841-961F-D9E0EE5E15FE}" dt="2024-06-19T14:39:15.742" v="31" actId="14100"/>
+        <pc:sldMkLst>
+          <pc:docMk/>
+          <pc:sldMk cId="3245958775" sldId="258"/>
+        </pc:sldMkLst>
+        <pc:spChg chg="mod">
+          <ac:chgData name="Quentin LANDON" userId="ebdf6100-7026-48c0-a530-f25f8df816c1" providerId="ADAL" clId="{69936BA1-B803-1841-961F-D9E0EE5E15FE}" dt="2024-06-19T14:37:40.298" v="26" actId="20577"/>
+          <ac:spMkLst>
+            <pc:docMk/>
+            <pc:sldMk cId="3245958775" sldId="258"/>
+            <ac:spMk id="2" creationId="{DE990D4A-C93D-07A7-74FD-6DC00682F356}"/>
+          </ac:spMkLst>
+        </pc:spChg>
+        <pc:spChg chg="del">
+          <ac:chgData name="Quentin LANDON" userId="ebdf6100-7026-48c0-a530-f25f8df816c1" providerId="ADAL" clId="{69936BA1-B803-1841-961F-D9E0EE5E15FE}" dt="2024-06-19T14:37:27.469" v="1"/>
+          <ac:spMkLst>
+            <pc:docMk/>
+            <pc:sldMk cId="3245958775" sldId="258"/>
+            <ac:spMk id="3" creationId="{EE6BF894-E936-EE06-6FB6-C87369F03B5E}"/>
+          </ac:spMkLst>
+        </pc:spChg>
+        <pc:picChg chg="add mod">
+          <ac:chgData name="Quentin LANDON" userId="ebdf6100-7026-48c0-a530-f25f8df816c1" providerId="ADAL" clId="{69936BA1-B803-1841-961F-D9E0EE5E15FE}" dt="2024-06-19T14:39:15.742" v="31" actId="14100"/>
+          <ac:picMkLst>
+            <pc:docMk/>
+            <pc:sldMk cId="3245958775" sldId="258"/>
+            <ac:picMk id="5" creationId="{21F3572F-7DFB-E1B1-5BD5-A70E03C8206D}"/>
+          </ac:picMkLst>
+        </pc:picChg>
+        <pc:picChg chg="add mod">
+          <ac:chgData name="Quentin LANDON" userId="ebdf6100-7026-48c0-a530-f25f8df816c1" providerId="ADAL" clId="{69936BA1-B803-1841-961F-D9E0EE5E15FE}" dt="2024-06-19T14:39:11.708" v="29" actId="1076"/>
+          <ac:picMkLst>
+            <pc:docMk/>
+            <pc:sldMk cId="3245958775" sldId="258"/>
+            <ac:picMk id="1026" creationId="{E6E93F1D-553B-91AE-18BE-4AAAF13BA17D}"/>
+          </ac:picMkLst>
+        </pc:picChg>
+      </pc:sldChg>
+      <pc:sldChg chg="addSp delSp modSp new mod">
+        <pc:chgData name="Quentin LANDON" userId="ebdf6100-7026-48c0-a530-f25f8df816c1" providerId="ADAL" clId="{69936BA1-B803-1841-961F-D9E0EE5E15FE}" dt="2024-06-19T14:40:17.274" v="38" actId="1076"/>
+        <pc:sldMkLst>
+          <pc:docMk/>
+          <pc:sldMk cId="498804183" sldId="259"/>
+        </pc:sldMkLst>
+        <pc:spChg chg="del">
+          <ac:chgData name="Quentin LANDON" userId="ebdf6100-7026-48c0-a530-f25f8df816c1" providerId="ADAL" clId="{69936BA1-B803-1841-961F-D9E0EE5E15FE}" dt="2024-06-19T14:39:26.584" v="35" actId="478"/>
+          <ac:spMkLst>
+            <pc:docMk/>
+            <pc:sldMk cId="498804183" sldId="259"/>
+            <ac:spMk id="2" creationId="{DC36EB96-F37B-4197-7E81-D392ECE6E7D7}"/>
+          </ac:spMkLst>
+        </pc:spChg>
+        <pc:spChg chg="del">
+          <ac:chgData name="Quentin LANDON" userId="ebdf6100-7026-48c0-a530-f25f8df816c1" providerId="ADAL" clId="{69936BA1-B803-1841-961F-D9E0EE5E15FE}" dt="2024-06-19T14:40:13.841" v="36"/>
+          <ac:spMkLst>
+            <pc:docMk/>
+            <pc:sldMk cId="498804183" sldId="259"/>
+            <ac:spMk id="3" creationId="{2BB3159D-0350-B747-6694-C29E3BB0F9B8}"/>
+          </ac:spMkLst>
+        </pc:spChg>
+        <pc:picChg chg="add mod">
+          <ac:chgData name="Quentin LANDON" userId="ebdf6100-7026-48c0-a530-f25f8df816c1" providerId="ADAL" clId="{69936BA1-B803-1841-961F-D9E0EE5E15FE}" dt="2024-06-19T14:40:17.274" v="38" actId="1076"/>
+          <ac:picMkLst>
+            <pc:docMk/>
+            <pc:sldMk cId="498804183" sldId="259"/>
+            <ac:picMk id="5" creationId="{9FF69295-4DD8-9678-D7E0-CD260E67650B}"/>
+          </ac:picMkLst>
+        </pc:picChg>
+      </pc:sldChg>
+      <pc:sldChg chg="add del">
+        <pc:chgData name="Quentin LANDON" userId="ebdf6100-7026-48c0-a530-f25f8df816c1" providerId="ADAL" clId="{69936BA1-B803-1841-961F-D9E0EE5E15FE}" dt="2024-06-19T14:39:21.557" v="33"/>
+        <pc:sldMkLst>
+          <pc:docMk/>
+          <pc:sldMk cId="2693853765" sldId="259"/>
+        </pc:sldMkLst>
+      </pc:sldChg>
+      <pc:sldChg chg="addSp delSp modSp new mod">
+        <pc:chgData name="Quentin LANDON" userId="ebdf6100-7026-48c0-a530-f25f8df816c1" providerId="ADAL" clId="{69936BA1-B803-1841-961F-D9E0EE5E15FE}" dt="2024-06-19T14:43:31.238" v="67" actId="478"/>
+        <pc:sldMkLst>
+          <pc:docMk/>
+          <pc:sldMk cId="2289306000" sldId="260"/>
+        </pc:sldMkLst>
+        <pc:spChg chg="del">
+          <ac:chgData name="Quentin LANDON" userId="ebdf6100-7026-48c0-a530-f25f8df816c1" providerId="ADAL" clId="{69936BA1-B803-1841-961F-D9E0EE5E15FE}" dt="2024-06-19T14:43:31.238" v="67" actId="478"/>
+          <ac:spMkLst>
+            <pc:docMk/>
+            <pc:sldMk cId="2289306000" sldId="260"/>
+            <ac:spMk id="2" creationId="{FE658C22-7AE7-B7CC-BC97-1AF1768F2D30}"/>
+          </ac:spMkLst>
+        </pc:spChg>
+        <pc:spChg chg="del">
+          <ac:chgData name="Quentin LANDON" userId="ebdf6100-7026-48c0-a530-f25f8df816c1" providerId="ADAL" clId="{69936BA1-B803-1841-961F-D9E0EE5E15FE}" dt="2024-06-19T14:40:27.878" v="40"/>
+          <ac:spMkLst>
+            <pc:docMk/>
+            <pc:sldMk cId="2289306000" sldId="260"/>
+            <ac:spMk id="3" creationId="{9A47DE95-A0BC-DE64-5A7C-295182951572}"/>
+          </ac:spMkLst>
+        </pc:spChg>
+        <pc:picChg chg="add mod">
+          <ac:chgData name="Quentin LANDON" userId="ebdf6100-7026-48c0-a530-f25f8df816c1" providerId="ADAL" clId="{69936BA1-B803-1841-961F-D9E0EE5E15FE}" dt="2024-06-19T14:40:30.056" v="43" actId="1076"/>
+          <ac:picMkLst>
+            <pc:docMk/>
+            <pc:sldMk cId="2289306000" sldId="260"/>
+            <ac:picMk id="5" creationId="{8CD30542-7F68-5501-6B38-DF8CF2272A9C}"/>
+          </ac:picMkLst>
+        </pc:picChg>
+      </pc:sldChg>
+      <pc:sldChg chg="addSp delSp modSp new mod">
+        <pc:chgData name="Quentin LANDON" userId="ebdf6100-7026-48c0-a530-f25f8df816c1" providerId="ADAL" clId="{69936BA1-B803-1841-961F-D9E0EE5E15FE}" dt="2024-06-19T14:43:49.078" v="68" actId="478"/>
+        <pc:sldMkLst>
+          <pc:docMk/>
+          <pc:sldMk cId="1235708827" sldId="261"/>
+        </pc:sldMkLst>
+        <pc:spChg chg="del">
+          <ac:chgData name="Quentin LANDON" userId="ebdf6100-7026-48c0-a530-f25f8df816c1" providerId="ADAL" clId="{69936BA1-B803-1841-961F-D9E0EE5E15FE}" dt="2024-06-19T14:43:49.078" v="68" actId="478"/>
+          <ac:spMkLst>
+            <pc:docMk/>
+            <pc:sldMk cId="1235708827" sldId="261"/>
+            <ac:spMk id="2" creationId="{A687CDC0-C543-F4ED-68D1-9692A6ABF6CE}"/>
+          </ac:spMkLst>
+        </pc:spChg>
+        <pc:spChg chg="del">
+          <ac:chgData name="Quentin LANDON" userId="ebdf6100-7026-48c0-a530-f25f8df816c1" providerId="ADAL" clId="{69936BA1-B803-1841-961F-D9E0EE5E15FE}" dt="2024-06-19T14:40:46.825" v="45"/>
+          <ac:spMkLst>
+            <pc:docMk/>
+            <pc:sldMk cId="1235708827" sldId="261"/>
+            <ac:spMk id="3" creationId="{FC3E41F1-79F0-F79F-53DC-E284B883D6C5}"/>
+          </ac:spMkLst>
+        </pc:spChg>
+        <pc:picChg chg="add mod">
+          <ac:chgData name="Quentin LANDON" userId="ebdf6100-7026-48c0-a530-f25f8df816c1" providerId="ADAL" clId="{69936BA1-B803-1841-961F-D9E0EE5E15FE}" dt="2024-06-19T14:40:48.129" v="47" actId="962"/>
+          <ac:picMkLst>
+            <pc:docMk/>
+            <pc:sldMk cId="1235708827" sldId="261"/>
+            <ac:picMk id="5" creationId="{955DA0E9-E965-1D37-D415-D1FDA59C2BE8}"/>
+          </ac:picMkLst>
+        </pc:picChg>
+      </pc:sldChg>
+      <pc:sldChg chg="addSp delSp modSp new mod">
+        <pc:chgData name="Quentin LANDON" userId="ebdf6100-7026-48c0-a530-f25f8df816c1" providerId="ADAL" clId="{69936BA1-B803-1841-961F-D9E0EE5E15FE}" dt="2024-06-19T14:44:13.844" v="69" actId="478"/>
+        <pc:sldMkLst>
+          <pc:docMk/>
+          <pc:sldMk cId="2548612482" sldId="262"/>
+        </pc:sldMkLst>
+        <pc:spChg chg="del">
+          <ac:chgData name="Quentin LANDON" userId="ebdf6100-7026-48c0-a530-f25f8df816c1" providerId="ADAL" clId="{69936BA1-B803-1841-961F-D9E0EE5E15FE}" dt="2024-06-19T14:44:13.844" v="69" actId="478"/>
+          <ac:spMkLst>
+            <pc:docMk/>
+            <pc:sldMk cId="2548612482" sldId="262"/>
+            <ac:spMk id="2" creationId="{BAAE1C8C-9922-D3FC-5B1B-21FE4169A9DC}"/>
+          </ac:spMkLst>
+        </pc:spChg>
+        <pc:spChg chg="del">
+          <ac:chgData name="Quentin LANDON" userId="ebdf6100-7026-48c0-a530-f25f8df816c1" providerId="ADAL" clId="{69936BA1-B803-1841-961F-D9E0EE5E15FE}" dt="2024-06-19T14:40:59.686" v="49"/>
+          <ac:spMkLst>
+            <pc:docMk/>
+            <pc:sldMk cId="2548612482" sldId="262"/>
+            <ac:spMk id="3" creationId="{77552822-38FE-733E-BE1F-DBCC442350A6}"/>
+          </ac:spMkLst>
+        </pc:spChg>
+        <pc:picChg chg="add mod">
+          <ac:chgData name="Quentin LANDON" userId="ebdf6100-7026-48c0-a530-f25f8df816c1" providerId="ADAL" clId="{69936BA1-B803-1841-961F-D9E0EE5E15FE}" dt="2024-06-19T14:41:01.171" v="51" actId="962"/>
+          <ac:picMkLst>
+            <pc:docMk/>
+            <pc:sldMk cId="2548612482" sldId="262"/>
+            <ac:picMk id="5" creationId="{E0087336-6493-5613-F8EB-5871ACCA9662}"/>
+          </ac:picMkLst>
+        </pc:picChg>
+      </pc:sldChg>
+      <pc:sldChg chg="addSp delSp modSp new mod">
+        <pc:chgData name="Quentin LANDON" userId="ebdf6100-7026-48c0-a530-f25f8df816c1" providerId="ADAL" clId="{69936BA1-B803-1841-961F-D9E0EE5E15FE}" dt="2024-06-19T14:41:16.108" v="56" actId="478"/>
+        <pc:sldMkLst>
+          <pc:docMk/>
+          <pc:sldMk cId="1427496044" sldId="263"/>
+        </pc:sldMkLst>
+        <pc:spChg chg="del mod">
+          <ac:chgData name="Quentin LANDON" userId="ebdf6100-7026-48c0-a530-f25f8df816c1" providerId="ADAL" clId="{69936BA1-B803-1841-961F-D9E0EE5E15FE}" dt="2024-06-19T14:41:16.108" v="56" actId="478"/>
+          <ac:spMkLst>
+            <pc:docMk/>
+            <pc:sldMk cId="1427496044" sldId="263"/>
+            <ac:spMk id="2" creationId="{A720E8F2-DF0A-6D74-C579-B403F5702257}"/>
+          </ac:spMkLst>
+        </pc:spChg>
+        <pc:spChg chg="del">
+          <ac:chgData name="Quentin LANDON" userId="ebdf6100-7026-48c0-a530-f25f8df816c1" providerId="ADAL" clId="{69936BA1-B803-1841-961F-D9E0EE5E15FE}" dt="2024-06-19T14:41:14.309" v="53"/>
+          <ac:spMkLst>
+            <pc:docMk/>
+            <pc:sldMk cId="1427496044" sldId="263"/>
+            <ac:spMk id="3" creationId="{1C7F2747-8453-7D2D-8991-B87E6CB4B250}"/>
+          </ac:spMkLst>
+        </pc:spChg>
+        <pc:picChg chg="add mod">
+          <ac:chgData name="Quentin LANDON" userId="ebdf6100-7026-48c0-a530-f25f8df816c1" providerId="ADAL" clId="{69936BA1-B803-1841-961F-D9E0EE5E15FE}" dt="2024-06-19T14:41:15.560" v="54" actId="27614"/>
+          <ac:picMkLst>
+            <pc:docMk/>
+            <pc:sldMk cId="1427496044" sldId="263"/>
+            <ac:picMk id="5" creationId="{40EAA2BF-B281-7739-983F-EA89206FAC8F}"/>
+          </ac:picMkLst>
+        </pc:picChg>
+      </pc:sldChg>
+      <pc:sldChg chg="addSp delSp modSp new mod">
+        <pc:chgData name="Quentin LANDON" userId="ebdf6100-7026-48c0-a530-f25f8df816c1" providerId="ADAL" clId="{69936BA1-B803-1841-961F-D9E0EE5E15FE}" dt="2024-06-19T14:41:33.581" v="61" actId="478"/>
+        <pc:sldMkLst>
+          <pc:docMk/>
+          <pc:sldMk cId="1866419326" sldId="264"/>
+        </pc:sldMkLst>
+        <pc:spChg chg="del mod">
+          <ac:chgData name="Quentin LANDON" userId="ebdf6100-7026-48c0-a530-f25f8df816c1" providerId="ADAL" clId="{69936BA1-B803-1841-961F-D9E0EE5E15FE}" dt="2024-06-19T14:41:33.581" v="61" actId="478"/>
+          <ac:spMkLst>
+            <pc:docMk/>
+            <pc:sldMk cId="1866419326" sldId="264"/>
+            <ac:spMk id="2" creationId="{96030D24-7FEA-32E8-7A0F-B81409B831D8}"/>
+          </ac:spMkLst>
+        </pc:spChg>
+        <pc:spChg chg="del">
+          <ac:chgData name="Quentin LANDON" userId="ebdf6100-7026-48c0-a530-f25f8df816c1" providerId="ADAL" clId="{69936BA1-B803-1841-961F-D9E0EE5E15FE}" dt="2024-06-19T14:41:31.405" v="58"/>
+          <ac:spMkLst>
+            <pc:docMk/>
+            <pc:sldMk cId="1866419326" sldId="264"/>
+            <ac:spMk id="3" creationId="{7E27AA1F-186B-AC75-7EB3-0554F947DD99}"/>
+          </ac:spMkLst>
+        </pc:spChg>
+        <pc:picChg chg="add mod">
+          <ac:chgData name="Quentin LANDON" userId="ebdf6100-7026-48c0-a530-f25f8df816c1" providerId="ADAL" clId="{69936BA1-B803-1841-961F-D9E0EE5E15FE}" dt="2024-06-19T14:41:32.658" v="59" actId="27614"/>
+          <ac:picMkLst>
+            <pc:docMk/>
+            <pc:sldMk cId="1866419326" sldId="264"/>
+            <ac:picMk id="5" creationId="{FC84F7F3-A3F9-4EBE-95D4-1192095B49B9}"/>
+          </ac:picMkLst>
+        </pc:picChg>
+      </pc:sldChg>
+      <pc:sldChg chg="addSp delSp modSp new mod">
+        <pc:chgData name="Quentin LANDON" userId="ebdf6100-7026-48c0-a530-f25f8df816c1" providerId="ADAL" clId="{69936BA1-B803-1841-961F-D9E0EE5E15FE}" dt="2024-06-19T14:41:46" v="66" actId="478"/>
+        <pc:sldMkLst>
+          <pc:docMk/>
+          <pc:sldMk cId="2629344860" sldId="265"/>
+        </pc:sldMkLst>
+        <pc:spChg chg="del">
+          <ac:chgData name="Quentin LANDON" userId="ebdf6100-7026-48c0-a530-f25f8df816c1" providerId="ADAL" clId="{69936BA1-B803-1841-961F-D9E0EE5E15FE}" dt="2024-06-19T14:41:46" v="66" actId="478"/>
+          <ac:spMkLst>
+            <pc:docMk/>
+            <pc:sldMk cId="2629344860" sldId="265"/>
+            <ac:spMk id="2" creationId="{9D1EF26A-CDC2-1AC6-25E3-34A77A673134}"/>
+          </ac:spMkLst>
+        </pc:spChg>
+        <pc:spChg chg="del">
+          <ac:chgData name="Quentin LANDON" userId="ebdf6100-7026-48c0-a530-f25f8df816c1" providerId="ADAL" clId="{69936BA1-B803-1841-961F-D9E0EE5E15FE}" dt="2024-06-19T14:41:44.070" v="63"/>
+          <ac:spMkLst>
+            <pc:docMk/>
+            <pc:sldMk cId="2629344860" sldId="265"/>
+            <ac:spMk id="3" creationId="{D9C4EF85-16EF-7E58-CA69-7FE731A63190}"/>
+          </ac:spMkLst>
+        </pc:spChg>
+        <pc:picChg chg="add mod">
+          <ac:chgData name="Quentin LANDON" userId="ebdf6100-7026-48c0-a530-f25f8df816c1" providerId="ADAL" clId="{69936BA1-B803-1841-961F-D9E0EE5E15FE}" dt="2024-06-19T14:41:45.321" v="65" actId="962"/>
+          <ac:picMkLst>
+            <pc:docMk/>
+            <pc:sldMk cId="2629344860" sldId="265"/>
+            <ac:picMk id="5" creationId="{7179CB78-D78A-E754-BD8F-F949B4689484}"/>
+          </ac:picMkLst>
+        </pc:picChg>
+      </pc:sldChg>
+    </pc:docChg>
+  </pc:docChgLst>
   <pc:docChgLst>
     <pc:chgData name="Quentin LANDON" userId="ebdf6100-7026-48c0-a530-f25f8df816c1" providerId="ADAL" clId="{07E99882-B2BF-4008-9622-A79916673A23}"/>
     <pc:docChg chg="undo custSel addSld modSld">
@@ -648,7 +928,7 @@
           <a:p>
             <a:fld id="{0397A277-8FA9-694E-B483-394C5BB43F1B}" type="datetimeFigureOut">
               <a:rPr lang="fr-FR" smtClean="0"/>
-              <a:t>18/06/2024</a:t>
+              <a:t>19/06/2024</a:t>
             </a:fld>
             <a:endParaRPr lang="fr-FR"/>
           </a:p>
@@ -846,7 +1126,7 @@
           <a:p>
             <a:fld id="{0397A277-8FA9-694E-B483-394C5BB43F1B}" type="datetimeFigureOut">
               <a:rPr lang="fr-FR" smtClean="0"/>
-              <a:t>18/06/2024</a:t>
+              <a:t>19/06/2024</a:t>
             </a:fld>
             <a:endParaRPr lang="fr-FR"/>
           </a:p>
@@ -1054,7 +1334,7 @@
           <a:p>
             <a:fld id="{0397A277-8FA9-694E-B483-394C5BB43F1B}" type="datetimeFigureOut">
               <a:rPr lang="fr-FR" smtClean="0"/>
-              <a:t>18/06/2024</a:t>
+              <a:t>19/06/2024</a:t>
             </a:fld>
             <a:endParaRPr lang="fr-FR"/>
           </a:p>
@@ -1252,7 +1532,7 @@
           <a:p>
             <a:fld id="{0397A277-8FA9-694E-B483-394C5BB43F1B}" type="datetimeFigureOut">
               <a:rPr lang="fr-FR" smtClean="0"/>
-              <a:t>18/06/2024</a:t>
+              <a:t>19/06/2024</a:t>
             </a:fld>
             <a:endParaRPr lang="fr-FR"/>
           </a:p>
@@ -1527,7 +1807,7 @@
           <a:p>
             <a:fld id="{0397A277-8FA9-694E-B483-394C5BB43F1B}" type="datetimeFigureOut">
               <a:rPr lang="fr-FR" smtClean="0"/>
-              <a:t>18/06/2024</a:t>
+              <a:t>19/06/2024</a:t>
             </a:fld>
             <a:endParaRPr lang="fr-FR"/>
           </a:p>
@@ -1792,7 +2072,7 @@
           <a:p>
             <a:fld id="{0397A277-8FA9-694E-B483-394C5BB43F1B}" type="datetimeFigureOut">
               <a:rPr lang="fr-FR" smtClean="0"/>
-              <a:t>18/06/2024</a:t>
+              <a:t>19/06/2024</a:t>
             </a:fld>
             <a:endParaRPr lang="fr-FR"/>
           </a:p>
@@ -2204,7 +2484,7 @@
           <a:p>
             <a:fld id="{0397A277-8FA9-694E-B483-394C5BB43F1B}" type="datetimeFigureOut">
               <a:rPr lang="fr-FR" smtClean="0"/>
-              <a:t>18/06/2024</a:t>
+              <a:t>19/06/2024</a:t>
             </a:fld>
             <a:endParaRPr lang="fr-FR"/>
           </a:p>
@@ -2345,7 +2625,7 @@
           <a:p>
             <a:fld id="{0397A277-8FA9-694E-B483-394C5BB43F1B}" type="datetimeFigureOut">
               <a:rPr lang="fr-FR" smtClean="0"/>
-              <a:t>18/06/2024</a:t>
+              <a:t>19/06/2024</a:t>
             </a:fld>
             <a:endParaRPr lang="fr-FR"/>
           </a:p>
@@ -2458,7 +2738,7 @@
           <a:p>
             <a:fld id="{0397A277-8FA9-694E-B483-394C5BB43F1B}" type="datetimeFigureOut">
               <a:rPr lang="fr-FR" smtClean="0"/>
-              <a:t>18/06/2024</a:t>
+              <a:t>19/06/2024</a:t>
             </a:fld>
             <a:endParaRPr lang="fr-FR"/>
           </a:p>
@@ -2769,7 +3049,7 @@
           <a:p>
             <a:fld id="{0397A277-8FA9-694E-B483-394C5BB43F1B}" type="datetimeFigureOut">
               <a:rPr lang="fr-FR" smtClean="0"/>
-              <a:t>18/06/2024</a:t>
+              <a:t>19/06/2024</a:t>
             </a:fld>
             <a:endParaRPr lang="fr-FR"/>
           </a:p>
@@ -3057,7 +3337,7 @@
           <a:p>
             <a:fld id="{0397A277-8FA9-694E-B483-394C5BB43F1B}" type="datetimeFigureOut">
               <a:rPr lang="fr-FR" smtClean="0"/>
-              <a:t>18/06/2024</a:t>
+              <a:t>19/06/2024</a:t>
             </a:fld>
             <a:endParaRPr lang="fr-FR"/>
           </a:p>
@@ -3298,7 +3578,7 @@
           <a:p>
             <a:fld id="{0397A277-8FA9-694E-B483-394C5BB43F1B}" type="datetimeFigureOut">
               <a:rPr lang="fr-FR" smtClean="0"/>
-              <a:t>18/06/2024</a:t>
+              <a:t>19/06/2024</a:t>
             </a:fld>
             <a:endParaRPr lang="fr-FR"/>
           </a:p>
@@ -5478,6 +5758,65 @@
 </p:sld>
 </file>
 
+<file path=ppt/slides/slide10.xml><?xml version="1.0" encoding="utf-8"?>
+<p:sld xmlns:a="http://schemas.openxmlformats.org/drawingml/2006/main" xmlns:r="http://schemas.openxmlformats.org/officeDocument/2006/relationships" xmlns:p="http://schemas.openxmlformats.org/presentationml/2006/main">
+  <p:cSld>
+    <p:spTree>
+      <p:nvGrpSpPr>
+        <p:cNvPr id="1" name=""/>
+        <p:cNvGrpSpPr/>
+        <p:nvPr/>
+      </p:nvGrpSpPr>
+      <p:grpSpPr>
+        <a:xfrm>
+          <a:off x="0" y="0"/>
+          <a:ext cx="0" cy="0"/>
+          <a:chOff x="0" y="0"/>
+          <a:chExt cx="0" cy="0"/>
+        </a:xfrm>
+      </p:grpSpPr>
+      <p:pic>
+        <p:nvPicPr>
+          <p:cNvPr id="5" name="Espace réservé du contenu 4" descr="Une image contenant texte, Police, reçu, capture d’écran&#10;&#10;Description générée automatiquement">
+            <a:extLst>
+              <a:ext uri="{FF2B5EF4-FFF2-40B4-BE49-F238E27FC236}">
+                <a16:creationId xmlns:a16="http://schemas.microsoft.com/office/drawing/2014/main" id="{7179CB78-D78A-E754-BD8F-F949B4689484}"/>
+              </a:ext>
+            </a:extLst>
+          </p:cNvPr>
+          <p:cNvPicPr>
+            <a:picLocks noGrp="1" noChangeAspect="1"/>
+          </p:cNvPicPr>
+          <p:nvPr>
+            <p:ph idx="1"/>
+          </p:nvPr>
+        </p:nvPicPr>
+        <p:blipFill>
+          <a:blip r:embed="rId2"/>
+          <a:stretch>
+            <a:fillRect/>
+          </a:stretch>
+        </p:blipFill>
+        <p:spPr>
+          <a:xfrm>
+            <a:off x="1670050" y="2845594"/>
+            <a:ext cx="8851900" cy="2311400"/>
+          </a:xfrm>
+        </p:spPr>
+      </p:pic>
+    </p:spTree>
+    <p:extLst>
+      <p:ext uri="{BB962C8B-B14F-4D97-AF65-F5344CB8AC3E}">
+        <p14:creationId xmlns:p14="http://schemas.microsoft.com/office/powerpoint/2010/main" val="2629344860"/>
+      </p:ext>
+    </p:extLst>
+  </p:cSld>
+  <p:clrMapOvr>
+    <a:masterClrMapping/>
+  </p:clrMapOvr>
+</p:sld>
+</file>
+
 <file path=ppt/slides/slide2.xml><?xml version="1.0" encoding="utf-8"?>
 <p:sld xmlns:a="http://schemas.openxmlformats.org/drawingml/2006/main" xmlns:r="http://schemas.openxmlformats.org/officeDocument/2006/relationships" xmlns:p="http://schemas.openxmlformats.org/presentationml/2006/main">
   <p:cSld>
@@ -5629,8 +5968,8 @@
           </a:p>
         </p:txBody>
       </p:sp>
-      <mc:AlternateContent xmlns:mc="http://schemas.openxmlformats.org/markup-compatibility/2006">
-        <mc:Choice xmlns:a14="http://schemas.microsoft.com/office/drawing/2010/main" Requires="a14">
+      <mc:AlternateContent xmlns:mc="http://schemas.openxmlformats.org/markup-compatibility/2006" xmlns:a14="http://schemas.microsoft.com/office/drawing/2010/main">
+        <mc:Choice Requires="a14">
           <p:sp>
             <p:nvSpPr>
               <p:cNvPr id="3" name="ZoneTexte 2">
@@ -5893,7 +6232,7 @@
             </p:txBody>
           </p:sp>
         </mc:Choice>
-        <mc:Fallback>
+        <mc:Fallback xmlns="">
           <p:sp>
             <p:nvSpPr>
               <p:cNvPr id="3" name="ZoneTexte 2">
@@ -6847,8 +7186,8 @@
           </a:p>
         </p:txBody>
       </p:sp>
-      <mc:AlternateContent xmlns:mc="http://schemas.openxmlformats.org/markup-compatibility/2006">
-        <mc:Choice xmlns:a14="http://schemas.microsoft.com/office/drawing/2010/main" Requires="a14">
+      <mc:AlternateContent xmlns:mc="http://schemas.openxmlformats.org/markup-compatibility/2006" xmlns:a14="http://schemas.microsoft.com/office/drawing/2010/main">
+        <mc:Choice Requires="a14">
           <p:sp>
             <p:nvSpPr>
               <p:cNvPr id="45" name="ZoneTexte 44">
@@ -7027,7 +7366,7 @@
             </p:txBody>
           </p:sp>
         </mc:Choice>
-        <mc:Fallback>
+        <mc:Fallback xmlns="">
           <p:sp>
             <p:nvSpPr>
               <p:cNvPr id="45" name="ZoneTexte 44">
@@ -7072,8 +7411,8 @@
           </p:sp>
         </mc:Fallback>
       </mc:AlternateContent>
-      <mc:AlternateContent xmlns:mc="http://schemas.openxmlformats.org/markup-compatibility/2006">
-        <mc:Choice xmlns:a14="http://schemas.microsoft.com/office/drawing/2010/main" Requires="a14">
+      <mc:AlternateContent xmlns:mc="http://schemas.openxmlformats.org/markup-compatibility/2006" xmlns:a14="http://schemas.microsoft.com/office/drawing/2010/main">
+        <mc:Choice Requires="a14">
           <p:sp>
             <p:nvSpPr>
               <p:cNvPr id="46" name="ZoneTexte 45">
@@ -7259,7 +7598,7 @@
             </p:txBody>
           </p:sp>
         </mc:Choice>
-        <mc:Fallback>
+        <mc:Fallback xmlns="">
           <p:sp>
             <p:nvSpPr>
               <p:cNvPr id="46" name="ZoneTexte 45">
@@ -7351,8 +7690,8 @@
           </a:p>
         </p:txBody>
       </p:sp>
-      <mc:AlternateContent xmlns:mc="http://schemas.openxmlformats.org/markup-compatibility/2006">
-        <mc:Choice xmlns:a14="http://schemas.microsoft.com/office/drawing/2010/main" Requires="a14">
+      <mc:AlternateContent xmlns:mc="http://schemas.openxmlformats.org/markup-compatibility/2006" xmlns:a14="http://schemas.microsoft.com/office/drawing/2010/main">
+        <mc:Choice Requires="a14">
           <p:sp>
             <p:nvSpPr>
               <p:cNvPr id="6" name="ZoneTexte 5">
@@ -7381,6 +7720,7 @@
               </a:bodyPr>
               <a:lstStyle/>
               <a:p>
+                <a:pPr/>
                 <a14:m>
                   <m:oMathPara xmlns:m="http://schemas.openxmlformats.org/officeDocument/2006/math">
                     <m:oMathParaPr>
@@ -7444,7 +7784,7 @@
             </p:txBody>
           </p:sp>
         </mc:Choice>
-        <mc:Fallback>
+        <mc:Fallback xmlns="">
           <p:sp>
             <p:nvSpPr>
               <p:cNvPr id="6" name="ZoneTexte 5">
@@ -7489,8 +7829,8 @@
           </p:sp>
         </mc:Fallback>
       </mc:AlternateContent>
-      <mc:AlternateContent xmlns:mc="http://schemas.openxmlformats.org/markup-compatibility/2006">
-        <mc:Choice xmlns:a14="http://schemas.microsoft.com/office/drawing/2010/main" Requires="a14">
+      <mc:AlternateContent xmlns:mc="http://schemas.openxmlformats.org/markup-compatibility/2006" xmlns:a14="http://schemas.microsoft.com/office/drawing/2010/main">
+        <mc:Choice Requires="a14">
           <p:sp>
             <p:nvSpPr>
               <p:cNvPr id="7" name="ZoneTexte 6">
@@ -7519,6 +7859,7 @@
               </a:bodyPr>
               <a:lstStyle/>
               <a:p>
+                <a:pPr/>
                 <a14:m>
                   <m:oMathPara xmlns:m="http://schemas.openxmlformats.org/officeDocument/2006/math">
                     <m:oMathParaPr>
@@ -7593,7 +7934,7 @@
             </p:txBody>
           </p:sp>
         </mc:Choice>
-        <mc:Fallback>
+        <mc:Fallback xmlns="">
           <p:sp>
             <p:nvSpPr>
               <p:cNvPr id="7" name="ZoneTexte 6">
@@ -7724,8 +8065,8 @@
           </a:p>
         </p:txBody>
       </p:sp>
-      <mc:AlternateContent xmlns:mc="http://schemas.openxmlformats.org/markup-compatibility/2006">
-        <mc:Choice xmlns:a14="http://schemas.microsoft.com/office/drawing/2010/main" Requires="a14">
+      <mc:AlternateContent xmlns:mc="http://schemas.openxmlformats.org/markup-compatibility/2006" xmlns:a14="http://schemas.microsoft.com/office/drawing/2010/main">
+        <mc:Choice Requires="a14">
           <p:sp>
             <p:nvSpPr>
               <p:cNvPr id="11" name="ZoneTexte 10">
@@ -7754,6 +8095,7 @@
               </a:bodyPr>
               <a:lstStyle/>
               <a:p>
+                <a:pPr/>
                 <a14:m>
                   <m:oMathPara xmlns:m="http://schemas.openxmlformats.org/officeDocument/2006/math">
                     <m:oMathParaPr>
@@ -7828,7 +8170,7 @@
             </p:txBody>
           </p:sp>
         </mc:Choice>
-        <mc:Fallback>
+        <mc:Fallback xmlns="">
           <p:sp>
             <p:nvSpPr>
               <p:cNvPr id="11" name="ZoneTexte 10">
@@ -7873,8 +8215,8 @@
           </p:sp>
         </mc:Fallback>
       </mc:AlternateContent>
-      <mc:AlternateContent xmlns:mc="http://schemas.openxmlformats.org/markup-compatibility/2006">
-        <mc:Choice xmlns:a14="http://schemas.microsoft.com/office/drawing/2010/main" Requires="a14">
+      <mc:AlternateContent xmlns:mc="http://schemas.openxmlformats.org/markup-compatibility/2006" xmlns:a14="http://schemas.microsoft.com/office/drawing/2010/main">
+        <mc:Choice Requires="a14">
           <p:sp>
             <p:nvSpPr>
               <p:cNvPr id="12" name="ZoneTexte 11">
@@ -7903,6 +8245,7 @@
               </a:bodyPr>
               <a:lstStyle/>
               <a:p>
+                <a:pPr/>
                 <a14:m>
                   <m:oMathPara xmlns:m="http://schemas.openxmlformats.org/officeDocument/2006/math">
                     <m:oMathParaPr>
@@ -7935,7 +8278,7 @@
             </p:txBody>
           </p:sp>
         </mc:Choice>
-        <mc:Fallback>
+        <mc:Fallback xmlns="">
           <p:sp>
             <p:nvSpPr>
               <p:cNvPr id="12" name="ZoneTexte 11">
@@ -7980,8 +8323,8 @@
           </p:sp>
         </mc:Fallback>
       </mc:AlternateContent>
-      <mc:AlternateContent xmlns:mc="http://schemas.openxmlformats.org/markup-compatibility/2006">
-        <mc:Choice xmlns:a14="http://schemas.microsoft.com/office/drawing/2010/main" Requires="a14">
+      <mc:AlternateContent xmlns:mc="http://schemas.openxmlformats.org/markup-compatibility/2006" xmlns:a14="http://schemas.microsoft.com/office/drawing/2010/main">
+        <mc:Choice Requires="a14">
           <p:sp>
             <p:nvSpPr>
               <p:cNvPr id="14" name="ZoneTexte 13">
@@ -8010,6 +8353,7 @@
               </a:bodyPr>
               <a:lstStyle/>
               <a:p>
+                <a:pPr/>
                 <a14:m>
                   <m:oMathPara xmlns:m="http://schemas.openxmlformats.org/officeDocument/2006/math">
                     <m:oMathParaPr>
@@ -8073,7 +8417,7 @@
             </p:txBody>
           </p:sp>
         </mc:Choice>
-        <mc:Fallback>
+        <mc:Fallback xmlns="">
           <p:sp>
             <p:nvSpPr>
               <p:cNvPr id="14" name="ZoneTexte 13">
@@ -8122,6 +8466,510 @@
     <p:extLst>
       <p:ext uri="{BB962C8B-B14F-4D97-AF65-F5344CB8AC3E}">
         <p14:creationId xmlns:p14="http://schemas.microsoft.com/office/powerpoint/2010/main" val="1428980678"/>
+      </p:ext>
+    </p:extLst>
+  </p:cSld>
+  <p:clrMapOvr>
+    <a:masterClrMapping/>
+  </p:clrMapOvr>
+</p:sld>
+</file>
+
+<file path=ppt/slides/slide3.xml><?xml version="1.0" encoding="utf-8"?>
+<p:sld xmlns:a="http://schemas.openxmlformats.org/drawingml/2006/main" xmlns:r="http://schemas.openxmlformats.org/officeDocument/2006/relationships" xmlns:p="http://schemas.openxmlformats.org/presentationml/2006/main">
+  <p:cSld>
+    <p:spTree>
+      <p:nvGrpSpPr>
+        <p:cNvPr id="1" name=""/>
+        <p:cNvGrpSpPr/>
+        <p:nvPr/>
+      </p:nvGrpSpPr>
+      <p:grpSpPr>
+        <a:xfrm>
+          <a:off x="0" y="0"/>
+          <a:ext cx="0" cy="0"/>
+          <a:chOff x="0" y="0"/>
+          <a:chExt cx="0" cy="0"/>
+        </a:xfrm>
+      </p:grpSpPr>
+      <p:sp>
+        <p:nvSpPr>
+          <p:cNvPr id="2" name="Titre 1">
+            <a:extLst>
+              <a:ext uri="{FF2B5EF4-FFF2-40B4-BE49-F238E27FC236}">
+                <a16:creationId xmlns:a16="http://schemas.microsoft.com/office/drawing/2014/main" id="{DE990D4A-C93D-07A7-74FD-6DC00682F356}"/>
+              </a:ext>
+            </a:extLst>
+          </p:cNvPr>
+          <p:cNvSpPr>
+            <a:spLocks noGrp="1"/>
+          </p:cNvSpPr>
+          <p:nvPr>
+            <p:ph type="title"/>
+          </p:nvPr>
+        </p:nvSpPr>
+        <p:spPr/>
+        <p:txBody>
+          <a:bodyPr/>
+          <a:lstStyle/>
+          <a:p>
+            <a:r>
+              <a:rPr lang="fr-FR" dirty="0"/>
+              <a:t>YOLO </a:t>
+            </a:r>
+            <a:r>
+              <a:rPr lang="fr-FR" dirty="0" err="1"/>
+              <a:t>object</a:t>
+            </a:r>
+            <a:r>
+              <a:rPr lang="fr-FR" dirty="0"/>
+              <a:t> </a:t>
+            </a:r>
+            <a:r>
+              <a:rPr lang="fr-FR" dirty="0" err="1"/>
+              <a:t>detection</a:t>
+            </a:r>
+            <a:r>
+              <a:rPr lang="fr-FR" dirty="0"/>
+              <a:t> </a:t>
+            </a:r>
+          </a:p>
+        </p:txBody>
+      </p:sp>
+      <p:pic>
+        <p:nvPicPr>
+          <p:cNvPr id="5" name="Espace réservé du contenu 4" descr="Une image contenant texte, Police, capture d’écran, document&#10;&#10;Description générée automatiquement">
+            <a:extLst>
+              <a:ext uri="{FF2B5EF4-FFF2-40B4-BE49-F238E27FC236}">
+                <a16:creationId xmlns:a16="http://schemas.microsoft.com/office/drawing/2014/main" id="{21F3572F-7DFB-E1B1-5BD5-A70E03C8206D}"/>
+              </a:ext>
+            </a:extLst>
+          </p:cNvPr>
+          <p:cNvPicPr>
+            <a:picLocks noGrp="1" noChangeAspect="1"/>
+          </p:cNvPicPr>
+          <p:nvPr>
+            <p:ph idx="1"/>
+          </p:nvPr>
+        </p:nvPicPr>
+        <p:blipFill>
+          <a:blip r:embed="rId2"/>
+          <a:stretch>
+            <a:fillRect/>
+          </a:stretch>
+        </p:blipFill>
+        <p:spPr>
+          <a:xfrm>
+            <a:off x="421037" y="1690688"/>
+            <a:ext cx="6471863" cy="3338512"/>
+          </a:xfrm>
+        </p:spPr>
+      </p:pic>
+      <p:pic>
+        <p:nvPicPr>
+          <p:cNvPr id="1026" name="Picture 2" descr="Focale — Wikipédia">
+            <a:extLst>
+              <a:ext uri="{FF2B5EF4-FFF2-40B4-BE49-F238E27FC236}">
+                <a16:creationId xmlns:a16="http://schemas.microsoft.com/office/drawing/2014/main" id="{E6E93F1D-553B-91AE-18BE-4AAAF13BA17D}"/>
+              </a:ext>
+            </a:extLst>
+          </p:cNvPr>
+          <p:cNvPicPr>
+            <a:picLocks noChangeAspect="1" noChangeArrowheads="1"/>
+          </p:cNvPicPr>
+          <p:nvPr/>
+        </p:nvPicPr>
+        <p:blipFill>
+          <a:blip r:embed="rId3">
+            <a:extLst>
+              <a:ext uri="{28A0092B-C50C-407E-A947-70E740481C1C}">
+                <a14:useLocalDpi xmlns:a14="http://schemas.microsoft.com/office/drawing/2010/main" val="0"/>
+              </a:ext>
+            </a:extLst>
+          </a:blip>
+          <a:srcRect/>
+          <a:stretch>
+            <a:fillRect/>
+          </a:stretch>
+        </p:blipFill>
+        <p:spPr bwMode="auto">
+          <a:xfrm>
+            <a:off x="6850244" y="1690688"/>
+            <a:ext cx="5036016" cy="3814762"/>
+          </a:xfrm>
+          <a:prstGeom prst="rect">
+            <a:avLst/>
+          </a:prstGeom>
+          <a:noFill/>
+          <a:extLst>
+            <a:ext uri="{909E8E84-426E-40DD-AFC4-6F175D3DCCD1}">
+              <a14:hiddenFill xmlns:a14="http://schemas.microsoft.com/office/drawing/2010/main">
+                <a:solidFill>
+                  <a:srgbClr val="FFFFFF"/>
+                </a:solidFill>
+              </a14:hiddenFill>
+            </a:ext>
+          </a:extLst>
+        </p:spPr>
+      </p:pic>
+    </p:spTree>
+    <p:extLst>
+      <p:ext uri="{BB962C8B-B14F-4D97-AF65-F5344CB8AC3E}">
+        <p14:creationId xmlns:p14="http://schemas.microsoft.com/office/powerpoint/2010/main" val="3245958775"/>
+      </p:ext>
+    </p:extLst>
+  </p:cSld>
+  <p:clrMapOvr>
+    <a:masterClrMapping/>
+  </p:clrMapOvr>
+</p:sld>
+</file>
+
+<file path=ppt/slides/slide4.xml><?xml version="1.0" encoding="utf-8"?>
+<p:sld xmlns:a="http://schemas.openxmlformats.org/drawingml/2006/main" xmlns:r="http://schemas.openxmlformats.org/officeDocument/2006/relationships" xmlns:p="http://schemas.openxmlformats.org/presentationml/2006/main">
+  <p:cSld>
+    <p:spTree>
+      <p:nvGrpSpPr>
+        <p:cNvPr id="1" name=""/>
+        <p:cNvGrpSpPr/>
+        <p:nvPr/>
+      </p:nvGrpSpPr>
+      <p:grpSpPr>
+        <a:xfrm>
+          <a:off x="0" y="0"/>
+          <a:ext cx="0" cy="0"/>
+          <a:chOff x="0" y="0"/>
+          <a:chExt cx="0" cy="0"/>
+        </a:xfrm>
+      </p:grpSpPr>
+      <p:pic>
+        <p:nvPicPr>
+          <p:cNvPr id="5" name="Espace réservé du contenu 4" descr="Une image contenant texte, capture d’écran, Police, document&#10;&#10;Description générée automatiquement">
+            <a:extLst>
+              <a:ext uri="{FF2B5EF4-FFF2-40B4-BE49-F238E27FC236}">
+                <a16:creationId xmlns:a16="http://schemas.microsoft.com/office/drawing/2014/main" id="{9FF69295-4DD8-9678-D7E0-CD260E67650B}"/>
+              </a:ext>
+            </a:extLst>
+          </p:cNvPr>
+          <p:cNvPicPr>
+            <a:picLocks noGrp="1" noChangeAspect="1"/>
+          </p:cNvPicPr>
+          <p:nvPr>
+            <p:ph idx="1"/>
+          </p:nvPr>
+        </p:nvPicPr>
+        <p:blipFill>
+          <a:blip r:embed="rId2"/>
+          <a:stretch>
+            <a:fillRect/>
+          </a:stretch>
+        </p:blipFill>
+        <p:spPr>
+          <a:xfrm>
+            <a:off x="374650" y="902494"/>
+            <a:ext cx="9271000" cy="4254500"/>
+          </a:xfrm>
+        </p:spPr>
+      </p:pic>
+    </p:spTree>
+    <p:extLst>
+      <p:ext uri="{BB962C8B-B14F-4D97-AF65-F5344CB8AC3E}">
+        <p14:creationId xmlns:p14="http://schemas.microsoft.com/office/powerpoint/2010/main" val="498804183"/>
+      </p:ext>
+    </p:extLst>
+  </p:cSld>
+  <p:clrMapOvr>
+    <a:masterClrMapping/>
+  </p:clrMapOvr>
+</p:sld>
+</file>
+
+<file path=ppt/slides/slide5.xml><?xml version="1.0" encoding="utf-8"?>
+<p:sld xmlns:a="http://schemas.openxmlformats.org/drawingml/2006/main" xmlns:r="http://schemas.openxmlformats.org/officeDocument/2006/relationships" xmlns:p="http://schemas.openxmlformats.org/presentationml/2006/main">
+  <p:cSld>
+    <p:spTree>
+      <p:nvGrpSpPr>
+        <p:cNvPr id="1" name=""/>
+        <p:cNvGrpSpPr/>
+        <p:nvPr/>
+      </p:nvGrpSpPr>
+      <p:grpSpPr>
+        <a:xfrm>
+          <a:off x="0" y="0"/>
+          <a:ext cx="0" cy="0"/>
+          <a:chOff x="0" y="0"/>
+          <a:chExt cx="0" cy="0"/>
+        </a:xfrm>
+      </p:grpSpPr>
+      <p:pic>
+        <p:nvPicPr>
+          <p:cNvPr id="5" name="Espace réservé du contenu 4" descr="Une image contenant texte, Police, capture d’écran, algèbre&#10;&#10;Description générée automatiquement">
+            <a:extLst>
+              <a:ext uri="{FF2B5EF4-FFF2-40B4-BE49-F238E27FC236}">
+                <a16:creationId xmlns:a16="http://schemas.microsoft.com/office/drawing/2014/main" id="{8CD30542-7F68-5501-6B38-DF8CF2272A9C}"/>
+              </a:ext>
+            </a:extLst>
+          </p:cNvPr>
+          <p:cNvPicPr>
+            <a:picLocks noGrp="1" noChangeAspect="1"/>
+          </p:cNvPicPr>
+          <p:nvPr>
+            <p:ph idx="1"/>
+          </p:nvPr>
+        </p:nvPicPr>
+        <p:blipFill>
+          <a:blip r:embed="rId2"/>
+          <a:stretch>
+            <a:fillRect/>
+          </a:stretch>
+        </p:blipFill>
+        <p:spPr>
+          <a:xfrm>
+            <a:off x="581025" y="1978819"/>
+            <a:ext cx="9715500" cy="3644900"/>
+          </a:xfrm>
+        </p:spPr>
+      </p:pic>
+    </p:spTree>
+    <p:extLst>
+      <p:ext uri="{BB962C8B-B14F-4D97-AF65-F5344CB8AC3E}">
+        <p14:creationId xmlns:p14="http://schemas.microsoft.com/office/powerpoint/2010/main" val="2289306000"/>
+      </p:ext>
+    </p:extLst>
+  </p:cSld>
+  <p:clrMapOvr>
+    <a:masterClrMapping/>
+  </p:clrMapOvr>
+</p:sld>
+</file>
+
+<file path=ppt/slides/slide6.xml><?xml version="1.0" encoding="utf-8"?>
+<p:sld xmlns:a="http://schemas.openxmlformats.org/drawingml/2006/main" xmlns:r="http://schemas.openxmlformats.org/officeDocument/2006/relationships" xmlns:p="http://schemas.openxmlformats.org/presentationml/2006/main">
+  <p:cSld>
+    <p:spTree>
+      <p:nvGrpSpPr>
+        <p:cNvPr id="1" name=""/>
+        <p:cNvGrpSpPr/>
+        <p:nvPr/>
+      </p:nvGrpSpPr>
+      <p:grpSpPr>
+        <a:xfrm>
+          <a:off x="0" y="0"/>
+          <a:ext cx="0" cy="0"/>
+          <a:chOff x="0" y="0"/>
+          <a:chExt cx="0" cy="0"/>
+        </a:xfrm>
+      </p:grpSpPr>
+      <p:pic>
+        <p:nvPicPr>
+          <p:cNvPr id="5" name="Espace réservé du contenu 4" descr="Une image contenant texte, Police, reçu, algèbre&#10;&#10;Description générée automatiquement">
+            <a:extLst>
+              <a:ext uri="{FF2B5EF4-FFF2-40B4-BE49-F238E27FC236}">
+                <a16:creationId xmlns:a16="http://schemas.microsoft.com/office/drawing/2014/main" id="{955DA0E9-E965-1D37-D415-D1FDA59C2BE8}"/>
+              </a:ext>
+            </a:extLst>
+          </p:cNvPr>
+          <p:cNvPicPr>
+            <a:picLocks noGrp="1" noChangeAspect="1"/>
+          </p:cNvPicPr>
+          <p:nvPr>
+            <p:ph idx="1"/>
+          </p:nvPr>
+        </p:nvPicPr>
+        <p:blipFill>
+          <a:blip r:embed="rId2"/>
+          <a:stretch>
+            <a:fillRect/>
+          </a:stretch>
+        </p:blipFill>
+        <p:spPr>
+          <a:xfrm>
+            <a:off x="1466850" y="2712244"/>
+            <a:ext cx="9258300" cy="2578100"/>
+          </a:xfrm>
+        </p:spPr>
+      </p:pic>
+    </p:spTree>
+    <p:extLst>
+      <p:ext uri="{BB962C8B-B14F-4D97-AF65-F5344CB8AC3E}">
+        <p14:creationId xmlns:p14="http://schemas.microsoft.com/office/powerpoint/2010/main" val="1235708827"/>
+      </p:ext>
+    </p:extLst>
+  </p:cSld>
+  <p:clrMapOvr>
+    <a:masterClrMapping/>
+  </p:clrMapOvr>
+</p:sld>
+</file>
+
+<file path=ppt/slides/slide7.xml><?xml version="1.0" encoding="utf-8"?>
+<p:sld xmlns:a="http://schemas.openxmlformats.org/drawingml/2006/main" xmlns:r="http://schemas.openxmlformats.org/officeDocument/2006/relationships" xmlns:p="http://schemas.openxmlformats.org/presentationml/2006/main">
+  <p:cSld>
+    <p:spTree>
+      <p:nvGrpSpPr>
+        <p:cNvPr id="1" name=""/>
+        <p:cNvGrpSpPr/>
+        <p:nvPr/>
+      </p:nvGrpSpPr>
+      <p:grpSpPr>
+        <a:xfrm>
+          <a:off x="0" y="0"/>
+          <a:ext cx="0" cy="0"/>
+          <a:chOff x="0" y="0"/>
+          <a:chExt cx="0" cy="0"/>
+        </a:xfrm>
+      </p:grpSpPr>
+      <p:pic>
+        <p:nvPicPr>
+          <p:cNvPr id="5" name="Espace réservé du contenu 4" descr="Une image contenant texte, capture d’écran, Police, algèbre&#10;&#10;Description générée automatiquement">
+            <a:extLst>
+              <a:ext uri="{FF2B5EF4-FFF2-40B4-BE49-F238E27FC236}">
+                <a16:creationId xmlns:a16="http://schemas.microsoft.com/office/drawing/2014/main" id="{E0087336-6493-5613-F8EB-5871ACCA9662}"/>
+              </a:ext>
+            </a:extLst>
+          </p:cNvPr>
+          <p:cNvPicPr>
+            <a:picLocks noGrp="1" noChangeAspect="1"/>
+          </p:cNvPicPr>
+          <p:nvPr>
+            <p:ph idx="1"/>
+          </p:nvPr>
+        </p:nvPicPr>
+        <p:blipFill>
+          <a:blip r:embed="rId2"/>
+          <a:stretch>
+            <a:fillRect/>
+          </a:stretch>
+        </p:blipFill>
+        <p:spPr>
+          <a:xfrm>
+            <a:off x="1835150" y="2191544"/>
+            <a:ext cx="8521700" cy="3619500"/>
+          </a:xfrm>
+        </p:spPr>
+      </p:pic>
+    </p:spTree>
+    <p:extLst>
+      <p:ext uri="{BB962C8B-B14F-4D97-AF65-F5344CB8AC3E}">
+        <p14:creationId xmlns:p14="http://schemas.microsoft.com/office/powerpoint/2010/main" val="2548612482"/>
+      </p:ext>
+    </p:extLst>
+  </p:cSld>
+  <p:clrMapOvr>
+    <a:masterClrMapping/>
+  </p:clrMapOvr>
+</p:sld>
+</file>
+
+<file path=ppt/slides/slide8.xml><?xml version="1.0" encoding="utf-8"?>
+<p:sld xmlns:a="http://schemas.openxmlformats.org/drawingml/2006/main" xmlns:r="http://schemas.openxmlformats.org/officeDocument/2006/relationships" xmlns:p="http://schemas.openxmlformats.org/presentationml/2006/main">
+  <p:cSld>
+    <p:spTree>
+      <p:nvGrpSpPr>
+        <p:cNvPr id="1" name=""/>
+        <p:cNvGrpSpPr/>
+        <p:nvPr/>
+      </p:nvGrpSpPr>
+      <p:grpSpPr>
+        <a:xfrm>
+          <a:off x="0" y="0"/>
+          <a:ext cx="0" cy="0"/>
+          <a:chOff x="0" y="0"/>
+          <a:chExt cx="0" cy="0"/>
+        </a:xfrm>
+      </p:grpSpPr>
+      <p:pic>
+        <p:nvPicPr>
+          <p:cNvPr id="5" name="Espace réservé du contenu 4" descr="Une image contenant texte, Police, capture d’écran, algèbre&#10;&#10;Description générée automatiquement">
+            <a:extLst>
+              <a:ext uri="{FF2B5EF4-FFF2-40B4-BE49-F238E27FC236}">
+                <a16:creationId xmlns:a16="http://schemas.microsoft.com/office/drawing/2014/main" id="{40EAA2BF-B281-7739-983F-EA89206FAC8F}"/>
+              </a:ext>
+            </a:extLst>
+          </p:cNvPr>
+          <p:cNvPicPr>
+            <a:picLocks noGrp="1" noChangeAspect="1"/>
+          </p:cNvPicPr>
+          <p:nvPr>
+            <p:ph idx="1"/>
+          </p:nvPr>
+        </p:nvPicPr>
+        <p:blipFill>
+          <a:blip r:embed="rId2"/>
+          <a:stretch>
+            <a:fillRect/>
+          </a:stretch>
+        </p:blipFill>
+        <p:spPr>
+          <a:xfrm>
+            <a:off x="1790700" y="2540794"/>
+            <a:ext cx="8610600" cy="2921000"/>
+          </a:xfrm>
+        </p:spPr>
+      </p:pic>
+    </p:spTree>
+    <p:extLst>
+      <p:ext uri="{BB962C8B-B14F-4D97-AF65-F5344CB8AC3E}">
+        <p14:creationId xmlns:p14="http://schemas.microsoft.com/office/powerpoint/2010/main" val="1427496044"/>
+      </p:ext>
+    </p:extLst>
+  </p:cSld>
+  <p:clrMapOvr>
+    <a:masterClrMapping/>
+  </p:clrMapOvr>
+</p:sld>
+</file>
+
+<file path=ppt/slides/slide9.xml><?xml version="1.0" encoding="utf-8"?>
+<p:sld xmlns:a="http://schemas.openxmlformats.org/drawingml/2006/main" xmlns:r="http://schemas.openxmlformats.org/officeDocument/2006/relationships" xmlns:p="http://schemas.openxmlformats.org/presentationml/2006/main">
+  <p:cSld>
+    <p:spTree>
+      <p:nvGrpSpPr>
+        <p:cNvPr id="1" name=""/>
+        <p:cNvGrpSpPr/>
+        <p:nvPr/>
+      </p:nvGrpSpPr>
+      <p:grpSpPr>
+        <a:xfrm>
+          <a:off x="0" y="0"/>
+          <a:ext cx="0" cy="0"/>
+          <a:chOff x="0" y="0"/>
+          <a:chExt cx="0" cy="0"/>
+        </a:xfrm>
+      </p:grpSpPr>
+      <p:pic>
+        <p:nvPicPr>
+          <p:cNvPr id="5" name="Espace réservé du contenu 4" descr="Une image contenant texte, capture d’écran, Police, document&#10;&#10;Description générée automatiquement">
+            <a:extLst>
+              <a:ext uri="{FF2B5EF4-FFF2-40B4-BE49-F238E27FC236}">
+                <a16:creationId xmlns:a16="http://schemas.microsoft.com/office/drawing/2014/main" id="{FC84F7F3-A3F9-4EBE-95D4-1192095B49B9}"/>
+              </a:ext>
+            </a:extLst>
+          </p:cNvPr>
+          <p:cNvPicPr>
+            <a:picLocks noGrp="1" noChangeAspect="1"/>
+          </p:cNvPicPr>
+          <p:nvPr>
+            <p:ph idx="1"/>
+          </p:nvPr>
+        </p:nvPicPr>
+        <p:blipFill>
+          <a:blip r:embed="rId2"/>
+          <a:stretch>
+            <a:fillRect/>
+          </a:stretch>
+        </p:blipFill>
+        <p:spPr>
+          <a:xfrm>
+            <a:off x="2760539" y="1825625"/>
+            <a:ext cx="6670922" cy="4351338"/>
+          </a:xfrm>
+        </p:spPr>
+      </p:pic>
+    </p:spTree>
+    <p:extLst>
+      <p:ext uri="{BB962C8B-B14F-4D97-AF65-F5344CB8AC3E}">
+        <p14:creationId xmlns:p14="http://schemas.microsoft.com/office/powerpoint/2010/main" val="1866419326"/>
       </p:ext>
     </p:extLst>
   </p:cSld>

</xml_diff>